<commit_message>
Subsystem Implementation Blocks and Register Structure
</commit_message>
<xml_diff>
--- a/Documentation/Blocks.pptx
+++ b/Documentation/Blocks.pptx
@@ -6,6 +6,13 @@
   </p:sldMasterIdLst>
   <p:sldIdLst>
     <p:sldId id="256" r:id="rId2"/>
+    <p:sldId id="257" r:id="rId3"/>
+    <p:sldId id="259" r:id="rId4"/>
+    <p:sldId id="260" r:id="rId5"/>
+    <p:sldId id="261" r:id="rId6"/>
+    <p:sldId id="262" r:id="rId7"/>
+    <p:sldId id="263" r:id="rId8"/>
+    <p:sldId id="264" r:id="rId9"/>
   </p:sldIdLst>
   <p:sldSz cx="12192000" cy="6858000"/>
   <p:notesSz cx="6858000" cy="9144000"/>
@@ -104,6 +111,11 @@
       </a:defRPr>
     </a:lvl9pPr>
   </p:defaultTextStyle>
+  <p:extLst>
+    <p:ext uri="{EFAFB233-063F-42B5-8137-9DF3F51BA10A}">
+      <p15:sldGuideLst xmlns:p15="http://schemas.microsoft.com/office/powerpoint/2012/main"/>
+    </p:ext>
+  </p:extLst>
 </p:presentation>
 </file>
 
@@ -238,7 +250,7 @@
           <a:p>
             <a:fld id="{39BDC58A-0644-445E-898C-80217F55673D}" type="datetimeFigureOut">
               <a:rPr lang="en-IN" smtClean="0"/>
-              <a:t>31-12-2020</a:t>
+              <a:t>05-02-2021</a:t>
             </a:fld>
             <a:endParaRPr lang="en-IN"/>
           </a:p>
@@ -408,7 +420,7 @@
           <a:p>
             <a:fld id="{39BDC58A-0644-445E-898C-80217F55673D}" type="datetimeFigureOut">
               <a:rPr lang="en-IN" smtClean="0"/>
-              <a:t>31-12-2020</a:t>
+              <a:t>05-02-2021</a:t>
             </a:fld>
             <a:endParaRPr lang="en-IN"/>
           </a:p>
@@ -588,7 +600,7 @@
           <a:p>
             <a:fld id="{39BDC58A-0644-445E-898C-80217F55673D}" type="datetimeFigureOut">
               <a:rPr lang="en-IN" smtClean="0"/>
-              <a:t>31-12-2020</a:t>
+              <a:t>05-02-2021</a:t>
             </a:fld>
             <a:endParaRPr lang="en-IN"/>
           </a:p>
@@ -758,7 +770,7 @@
           <a:p>
             <a:fld id="{39BDC58A-0644-445E-898C-80217F55673D}" type="datetimeFigureOut">
               <a:rPr lang="en-IN" smtClean="0"/>
-              <a:t>31-12-2020</a:t>
+              <a:t>05-02-2021</a:t>
             </a:fld>
             <a:endParaRPr lang="en-IN"/>
           </a:p>
@@ -1004,7 +1016,7 @@
           <a:p>
             <a:fld id="{39BDC58A-0644-445E-898C-80217F55673D}" type="datetimeFigureOut">
               <a:rPr lang="en-IN" smtClean="0"/>
-              <a:t>31-12-2020</a:t>
+              <a:t>05-02-2021</a:t>
             </a:fld>
             <a:endParaRPr lang="en-IN"/>
           </a:p>
@@ -1236,7 +1248,7 @@
           <a:p>
             <a:fld id="{39BDC58A-0644-445E-898C-80217F55673D}" type="datetimeFigureOut">
               <a:rPr lang="en-IN" smtClean="0"/>
-              <a:t>31-12-2020</a:t>
+              <a:t>05-02-2021</a:t>
             </a:fld>
             <a:endParaRPr lang="en-IN"/>
           </a:p>
@@ -1603,7 +1615,7 @@
           <a:p>
             <a:fld id="{39BDC58A-0644-445E-898C-80217F55673D}" type="datetimeFigureOut">
               <a:rPr lang="en-IN" smtClean="0"/>
-              <a:t>31-12-2020</a:t>
+              <a:t>05-02-2021</a:t>
             </a:fld>
             <a:endParaRPr lang="en-IN"/>
           </a:p>
@@ -1721,7 +1733,7 @@
           <a:p>
             <a:fld id="{39BDC58A-0644-445E-898C-80217F55673D}" type="datetimeFigureOut">
               <a:rPr lang="en-IN" smtClean="0"/>
-              <a:t>31-12-2020</a:t>
+              <a:t>05-02-2021</a:t>
             </a:fld>
             <a:endParaRPr lang="en-IN"/>
           </a:p>
@@ -1816,7 +1828,7 @@
           <a:p>
             <a:fld id="{39BDC58A-0644-445E-898C-80217F55673D}" type="datetimeFigureOut">
               <a:rPr lang="en-IN" smtClean="0"/>
-              <a:t>31-12-2020</a:t>
+              <a:t>05-02-2021</a:t>
             </a:fld>
             <a:endParaRPr lang="en-IN"/>
           </a:p>
@@ -2093,7 +2105,7 @@
           <a:p>
             <a:fld id="{39BDC58A-0644-445E-898C-80217F55673D}" type="datetimeFigureOut">
               <a:rPr lang="en-IN" smtClean="0"/>
-              <a:t>31-12-2020</a:t>
+              <a:t>05-02-2021</a:t>
             </a:fld>
             <a:endParaRPr lang="en-IN"/>
           </a:p>
@@ -2346,7 +2358,7 @@
           <a:p>
             <a:fld id="{39BDC58A-0644-445E-898C-80217F55673D}" type="datetimeFigureOut">
               <a:rPr lang="en-IN" smtClean="0"/>
-              <a:t>31-12-2020</a:t>
+              <a:t>05-02-2021</a:t>
             </a:fld>
             <a:endParaRPr lang="en-IN"/>
           </a:p>
@@ -2559,7 +2571,7 @@
           <a:p>
             <a:fld id="{39BDC58A-0644-445E-898C-80217F55673D}" type="datetimeFigureOut">
               <a:rPr lang="en-IN" smtClean="0"/>
-              <a:t>31-12-2020</a:t>
+              <a:t>05-02-2021</a:t>
             </a:fld>
             <a:endParaRPr lang="en-IN"/>
           </a:p>
@@ -3967,6 +3979,4259 @@
 </p:sld>
 </file>
 
+<file path=ppt/slides/slide2.xml><?xml version="1.0" encoding="utf-8"?>
+<p:sld xmlns:a="http://schemas.openxmlformats.org/drawingml/2006/main" xmlns:r="http://schemas.openxmlformats.org/officeDocument/2006/relationships" xmlns:p="http://schemas.openxmlformats.org/presentationml/2006/main">
+  <p:cSld>
+    <p:spTree>
+      <p:nvGrpSpPr>
+        <p:cNvPr id="1" name=""/>
+        <p:cNvGrpSpPr/>
+        <p:nvPr/>
+      </p:nvGrpSpPr>
+      <p:grpSpPr>
+        <a:xfrm>
+          <a:off x="0" y="0"/>
+          <a:ext cx="0" cy="0"/>
+          <a:chOff x="0" y="0"/>
+          <a:chExt cx="0" cy="0"/>
+        </a:xfrm>
+      </p:grpSpPr>
+      <p:grpSp>
+        <p:nvGrpSpPr>
+          <p:cNvPr id="16" name="Group 15"/>
+          <p:cNvGrpSpPr/>
+          <p:nvPr/>
+        </p:nvGrpSpPr>
+        <p:grpSpPr>
+          <a:xfrm>
+            <a:off x="409434" y="40948"/>
+            <a:ext cx="11259402" cy="6755641"/>
+            <a:chOff x="409434" y="40948"/>
+            <a:chExt cx="11259402" cy="6755641"/>
+          </a:xfrm>
+        </p:grpSpPr>
+        <p:sp>
+          <p:nvSpPr>
+            <p:cNvPr id="4" name="Left-Right Arrow 3"/>
+            <p:cNvSpPr/>
+            <p:nvPr/>
+          </p:nvSpPr>
+          <p:spPr>
+            <a:xfrm>
+              <a:off x="409434" y="3889617"/>
+              <a:ext cx="11259402" cy="313898"/>
+            </a:xfrm>
+            <a:prstGeom prst="leftRightArrow">
+              <a:avLst/>
+            </a:prstGeom>
+          </p:spPr>
+          <p:style>
+            <a:lnRef idx="2">
+              <a:schemeClr val="accent2">
+                <a:shade val="50000"/>
+              </a:schemeClr>
+            </a:lnRef>
+            <a:fillRef idx="1">
+              <a:schemeClr val="accent2"/>
+            </a:fillRef>
+            <a:effectRef idx="0">
+              <a:schemeClr val="accent2"/>
+            </a:effectRef>
+            <a:fontRef idx="minor">
+              <a:schemeClr val="lt1"/>
+            </a:fontRef>
+          </p:style>
+          <p:txBody>
+            <a:bodyPr rtlCol="0" anchor="ctr"/>
+            <a:lstStyle/>
+            <a:p>
+              <a:pPr algn="ctr"/>
+              <a:endParaRPr lang="en-IN"/>
+            </a:p>
+          </p:txBody>
+        </p:sp>
+        <p:sp>
+          <p:nvSpPr>
+            <p:cNvPr id="5" name="TextBox 4"/>
+            <p:cNvSpPr txBox="1"/>
+            <p:nvPr/>
+          </p:nvSpPr>
+          <p:spPr>
+            <a:xfrm>
+              <a:off x="10140287" y="3677234"/>
+              <a:ext cx="947695" cy="369332"/>
+            </a:xfrm>
+            <a:prstGeom prst="rect">
+              <a:avLst/>
+            </a:prstGeom>
+            <a:noFill/>
+          </p:spPr>
+          <p:txBody>
+            <a:bodyPr wrap="none" rtlCol="0">
+              <a:spAutoFit/>
+            </a:bodyPr>
+            <a:lstStyle/>
+            <a:p>
+              <a:r>
+                <a:rPr lang="en-IN" dirty="0" smtClean="0">
+                  <a:latin typeface="Times New Roman" panose="02020603050405020304" pitchFamily="18" charset="0"/>
+                  <a:cs typeface="Times New Roman" panose="02020603050405020304" pitchFamily="18" charset="0"/>
+                </a:rPr>
+                <a:t>I2C Bus</a:t>
+              </a:r>
+              <a:endParaRPr lang="en-IN" dirty="0">
+                <a:latin typeface="Times New Roman" panose="02020603050405020304" pitchFamily="18" charset="0"/>
+                <a:cs typeface="Times New Roman" panose="02020603050405020304" pitchFamily="18" charset="0"/>
+              </a:endParaRPr>
+            </a:p>
+          </p:txBody>
+        </p:sp>
+        <p:sp>
+          <p:nvSpPr>
+            <p:cNvPr id="6" name="Rectangle 5"/>
+            <p:cNvSpPr/>
+            <p:nvPr/>
+          </p:nvSpPr>
+          <p:spPr>
+            <a:xfrm>
+              <a:off x="3766783" y="1310190"/>
+              <a:ext cx="2483892" cy="1310185"/>
+            </a:xfrm>
+            <a:prstGeom prst="rect">
+              <a:avLst/>
+            </a:prstGeom>
+          </p:spPr>
+          <p:style>
+            <a:lnRef idx="2">
+              <a:schemeClr val="dk1"/>
+            </a:lnRef>
+            <a:fillRef idx="1">
+              <a:schemeClr val="lt1"/>
+            </a:fillRef>
+            <a:effectRef idx="0">
+              <a:schemeClr val="dk1"/>
+            </a:effectRef>
+            <a:fontRef idx="minor">
+              <a:schemeClr val="dk1"/>
+            </a:fontRef>
+          </p:style>
+          <p:txBody>
+            <a:bodyPr rtlCol="0" anchor="ctr"/>
+            <a:lstStyle/>
+            <a:p>
+              <a:pPr algn="ctr"/>
+              <a:r>
+                <a:rPr lang="en-IN" dirty="0" smtClean="0">
+                  <a:latin typeface="Times New Roman" panose="02020603050405020304" pitchFamily="18" charset="0"/>
+                  <a:cs typeface="Times New Roman" panose="02020603050405020304" pitchFamily="18" charset="0"/>
+                </a:rPr>
+                <a:t>GPS</a:t>
+              </a:r>
+              <a:r>
+                <a:rPr lang="en-IN" dirty="0" smtClean="0">
+                  <a:latin typeface="Times New Roman" panose="02020603050405020304" pitchFamily="18" charset="0"/>
+                  <a:cs typeface="Times New Roman" panose="02020603050405020304" pitchFamily="18" charset="0"/>
+                </a:rPr>
+                <a:t> </a:t>
+              </a:r>
+              <a:r>
+                <a:rPr lang="en-IN" dirty="0" smtClean="0">
+                  <a:latin typeface="Times New Roman" panose="02020603050405020304" pitchFamily="18" charset="0"/>
+                  <a:cs typeface="Times New Roman" panose="02020603050405020304" pitchFamily="18" charset="0"/>
+                </a:rPr>
+                <a:t>Subsystem</a:t>
+              </a:r>
+              <a:endParaRPr lang="en-IN" dirty="0">
+                <a:latin typeface="Times New Roman" panose="02020603050405020304" pitchFamily="18" charset="0"/>
+                <a:cs typeface="Times New Roman" panose="02020603050405020304" pitchFamily="18" charset="0"/>
+              </a:endParaRPr>
+            </a:p>
+          </p:txBody>
+        </p:sp>
+        <p:cxnSp>
+          <p:nvCxnSpPr>
+            <p:cNvPr id="7" name="Straight Arrow Connector 6"/>
+            <p:cNvCxnSpPr>
+              <a:stCxn id="6" idx="2"/>
+            </p:cNvCxnSpPr>
+            <p:nvPr/>
+          </p:nvCxnSpPr>
+          <p:spPr>
+            <a:xfrm>
+              <a:off x="5008729" y="2620375"/>
+              <a:ext cx="0" cy="1426191"/>
+            </a:xfrm>
+            <a:prstGeom prst="straightConnector1">
+              <a:avLst/>
+            </a:prstGeom>
+            <a:ln>
+              <a:headEnd type="triangle"/>
+              <a:tailEnd type="triangle"/>
+            </a:ln>
+          </p:spPr>
+          <p:style>
+            <a:lnRef idx="1">
+              <a:schemeClr val="dk1"/>
+            </a:lnRef>
+            <a:fillRef idx="0">
+              <a:schemeClr val="dk1"/>
+            </a:fillRef>
+            <a:effectRef idx="0">
+              <a:schemeClr val="dk1"/>
+            </a:effectRef>
+            <a:fontRef idx="minor">
+              <a:schemeClr val="tx1"/>
+            </a:fontRef>
+          </p:style>
+        </p:cxnSp>
+        <p:sp>
+          <p:nvSpPr>
+            <p:cNvPr id="8" name="Rectangle 7"/>
+            <p:cNvSpPr/>
+            <p:nvPr/>
+          </p:nvSpPr>
+          <p:spPr>
+            <a:xfrm>
+              <a:off x="3766783" y="40948"/>
+              <a:ext cx="2483892" cy="846161"/>
+            </a:xfrm>
+            <a:prstGeom prst="rect">
+              <a:avLst/>
+            </a:prstGeom>
+          </p:spPr>
+          <p:style>
+            <a:lnRef idx="2">
+              <a:schemeClr val="dk1"/>
+            </a:lnRef>
+            <a:fillRef idx="1">
+              <a:schemeClr val="lt1"/>
+            </a:fillRef>
+            <a:effectRef idx="0">
+              <a:schemeClr val="dk1"/>
+            </a:effectRef>
+            <a:fontRef idx="minor">
+              <a:schemeClr val="dk1"/>
+            </a:fontRef>
+          </p:style>
+          <p:txBody>
+            <a:bodyPr rtlCol="0" anchor="ctr"/>
+            <a:lstStyle/>
+            <a:p>
+              <a:pPr algn="ctr"/>
+              <a:r>
+                <a:rPr lang="en-IN" dirty="0" smtClean="0">
+                  <a:latin typeface="Times New Roman" panose="02020603050405020304" pitchFamily="18" charset="0"/>
+                  <a:cs typeface="Times New Roman" panose="02020603050405020304" pitchFamily="18" charset="0"/>
+                </a:rPr>
+                <a:t>GPS </a:t>
+              </a:r>
+              <a:r>
+                <a:rPr lang="en-IN" dirty="0" smtClean="0">
+                  <a:latin typeface="Times New Roman" panose="02020603050405020304" pitchFamily="18" charset="0"/>
+                  <a:cs typeface="Times New Roman" panose="02020603050405020304" pitchFamily="18" charset="0"/>
+                </a:rPr>
+                <a:t>Receiver</a:t>
+              </a:r>
+              <a:endParaRPr lang="en-IN" dirty="0">
+                <a:latin typeface="Times New Roman" panose="02020603050405020304" pitchFamily="18" charset="0"/>
+                <a:cs typeface="Times New Roman" panose="02020603050405020304" pitchFamily="18" charset="0"/>
+              </a:endParaRPr>
+            </a:p>
+          </p:txBody>
+        </p:sp>
+        <p:cxnSp>
+          <p:nvCxnSpPr>
+            <p:cNvPr id="9" name="Straight Arrow Connector 8"/>
+            <p:cNvCxnSpPr>
+              <a:stCxn id="8" idx="2"/>
+              <a:endCxn id="6" idx="0"/>
+            </p:cNvCxnSpPr>
+            <p:nvPr/>
+          </p:nvCxnSpPr>
+          <p:spPr>
+            <a:xfrm>
+              <a:off x="5008729" y="887109"/>
+              <a:ext cx="0" cy="423081"/>
+            </a:xfrm>
+            <a:prstGeom prst="straightConnector1">
+              <a:avLst/>
+            </a:prstGeom>
+            <a:ln>
+              <a:tailEnd type="triangle"/>
+            </a:ln>
+          </p:spPr>
+          <p:style>
+            <a:lnRef idx="1">
+              <a:schemeClr val="dk1"/>
+            </a:lnRef>
+            <a:fillRef idx="0">
+              <a:schemeClr val="dk1"/>
+            </a:fillRef>
+            <a:effectRef idx="0">
+              <a:schemeClr val="dk1"/>
+            </a:effectRef>
+            <a:fontRef idx="minor">
+              <a:schemeClr val="tx1"/>
+            </a:fontRef>
+          </p:style>
+        </p:cxnSp>
+        <p:sp>
+          <p:nvSpPr>
+            <p:cNvPr id="10" name="Rectangle 9"/>
+            <p:cNvSpPr/>
+            <p:nvPr/>
+          </p:nvSpPr>
+          <p:spPr>
+            <a:xfrm>
+              <a:off x="6851177" y="1310190"/>
+              <a:ext cx="2483892" cy="1310185"/>
+            </a:xfrm>
+            <a:prstGeom prst="rect">
+              <a:avLst/>
+            </a:prstGeom>
+          </p:spPr>
+          <p:style>
+            <a:lnRef idx="2">
+              <a:schemeClr val="dk1"/>
+            </a:lnRef>
+            <a:fillRef idx="1">
+              <a:schemeClr val="lt1"/>
+            </a:fillRef>
+            <a:effectRef idx="0">
+              <a:schemeClr val="dk1"/>
+            </a:effectRef>
+            <a:fontRef idx="minor">
+              <a:schemeClr val="dk1"/>
+            </a:fontRef>
+          </p:style>
+          <p:txBody>
+            <a:bodyPr rtlCol="0" anchor="ctr"/>
+            <a:lstStyle/>
+            <a:p>
+              <a:pPr algn="ctr"/>
+              <a:r>
+                <a:rPr lang="en-IN" dirty="0" smtClean="0">
+                  <a:latin typeface="Times New Roman" panose="02020603050405020304" pitchFamily="18" charset="0"/>
+                  <a:cs typeface="Times New Roman" panose="02020603050405020304" pitchFamily="18" charset="0"/>
+                </a:rPr>
+                <a:t>IMU </a:t>
+              </a:r>
+              <a:r>
+                <a:rPr lang="en-IN" dirty="0" smtClean="0">
+                  <a:latin typeface="Times New Roman" panose="02020603050405020304" pitchFamily="18" charset="0"/>
+                  <a:cs typeface="Times New Roman" panose="02020603050405020304" pitchFamily="18" charset="0"/>
+                </a:rPr>
+                <a:t>Subsystem</a:t>
+              </a:r>
+              <a:endParaRPr lang="en-IN" dirty="0">
+                <a:latin typeface="Times New Roman" panose="02020603050405020304" pitchFamily="18" charset="0"/>
+                <a:cs typeface="Times New Roman" panose="02020603050405020304" pitchFamily="18" charset="0"/>
+              </a:endParaRPr>
+            </a:p>
+          </p:txBody>
+        </p:sp>
+        <p:cxnSp>
+          <p:nvCxnSpPr>
+            <p:cNvPr id="11" name="Straight Arrow Connector 10"/>
+            <p:cNvCxnSpPr>
+              <a:stCxn id="10" idx="2"/>
+            </p:cNvCxnSpPr>
+            <p:nvPr/>
+          </p:nvCxnSpPr>
+          <p:spPr>
+            <a:xfrm>
+              <a:off x="8093123" y="2620375"/>
+              <a:ext cx="0" cy="1426191"/>
+            </a:xfrm>
+            <a:prstGeom prst="straightConnector1">
+              <a:avLst/>
+            </a:prstGeom>
+            <a:ln>
+              <a:headEnd type="triangle"/>
+              <a:tailEnd type="triangle"/>
+            </a:ln>
+          </p:spPr>
+          <p:style>
+            <a:lnRef idx="1">
+              <a:schemeClr val="dk1"/>
+            </a:lnRef>
+            <a:fillRef idx="0">
+              <a:schemeClr val="dk1"/>
+            </a:fillRef>
+            <a:effectRef idx="0">
+              <a:schemeClr val="dk1"/>
+            </a:effectRef>
+            <a:fontRef idx="minor">
+              <a:schemeClr val="tx1"/>
+            </a:fontRef>
+          </p:style>
+        </p:cxnSp>
+        <p:sp>
+          <p:nvSpPr>
+            <p:cNvPr id="12" name="Rectangle 11"/>
+            <p:cNvSpPr/>
+            <p:nvPr/>
+          </p:nvSpPr>
+          <p:spPr>
+            <a:xfrm>
+              <a:off x="6851177" y="40948"/>
+              <a:ext cx="2483892" cy="846161"/>
+            </a:xfrm>
+            <a:prstGeom prst="rect">
+              <a:avLst/>
+            </a:prstGeom>
+          </p:spPr>
+          <p:style>
+            <a:lnRef idx="2">
+              <a:schemeClr val="dk1"/>
+            </a:lnRef>
+            <a:fillRef idx="1">
+              <a:schemeClr val="lt1"/>
+            </a:fillRef>
+            <a:effectRef idx="0">
+              <a:schemeClr val="dk1"/>
+            </a:effectRef>
+            <a:fontRef idx="minor">
+              <a:schemeClr val="dk1"/>
+            </a:fontRef>
+          </p:style>
+          <p:txBody>
+            <a:bodyPr rtlCol="0" anchor="ctr"/>
+            <a:lstStyle/>
+            <a:p>
+              <a:pPr algn="ctr"/>
+              <a:r>
+                <a:rPr lang="en-IN" dirty="0" smtClean="0">
+                  <a:latin typeface="Times New Roman" panose="02020603050405020304" pitchFamily="18" charset="0"/>
+                  <a:cs typeface="Times New Roman" panose="02020603050405020304" pitchFamily="18" charset="0"/>
+                </a:rPr>
+                <a:t>IMU Sensor (BNO055)</a:t>
+              </a:r>
+              <a:endParaRPr lang="en-IN" dirty="0">
+                <a:latin typeface="Times New Roman" panose="02020603050405020304" pitchFamily="18" charset="0"/>
+                <a:cs typeface="Times New Roman" panose="02020603050405020304" pitchFamily="18" charset="0"/>
+              </a:endParaRPr>
+            </a:p>
+          </p:txBody>
+        </p:sp>
+        <p:cxnSp>
+          <p:nvCxnSpPr>
+            <p:cNvPr id="13" name="Straight Arrow Connector 12"/>
+            <p:cNvCxnSpPr>
+              <a:stCxn id="12" idx="2"/>
+              <a:endCxn id="10" idx="0"/>
+            </p:cNvCxnSpPr>
+            <p:nvPr/>
+          </p:nvCxnSpPr>
+          <p:spPr>
+            <a:xfrm>
+              <a:off x="8093123" y="887109"/>
+              <a:ext cx="0" cy="423081"/>
+            </a:xfrm>
+            <a:prstGeom prst="straightConnector1">
+              <a:avLst/>
+            </a:prstGeom>
+            <a:ln>
+              <a:tailEnd type="triangle"/>
+            </a:ln>
+          </p:spPr>
+          <p:style>
+            <a:lnRef idx="1">
+              <a:schemeClr val="dk1"/>
+            </a:lnRef>
+            <a:fillRef idx="0">
+              <a:schemeClr val="dk1"/>
+            </a:fillRef>
+            <a:effectRef idx="0">
+              <a:schemeClr val="dk1"/>
+            </a:effectRef>
+            <a:fontRef idx="minor">
+              <a:schemeClr val="tx1"/>
+            </a:fontRef>
+          </p:style>
+        </p:cxnSp>
+        <p:sp>
+          <p:nvSpPr>
+            <p:cNvPr id="14" name="Rectangle 13"/>
+            <p:cNvSpPr/>
+            <p:nvPr/>
+          </p:nvSpPr>
+          <p:spPr>
+            <a:xfrm>
+              <a:off x="4148920" y="5486404"/>
+              <a:ext cx="2483892" cy="1310185"/>
+            </a:xfrm>
+            <a:prstGeom prst="rect">
+              <a:avLst/>
+            </a:prstGeom>
+          </p:spPr>
+          <p:style>
+            <a:lnRef idx="2">
+              <a:schemeClr val="dk1"/>
+            </a:lnRef>
+            <a:fillRef idx="1">
+              <a:schemeClr val="lt1"/>
+            </a:fillRef>
+            <a:effectRef idx="0">
+              <a:schemeClr val="dk1"/>
+            </a:effectRef>
+            <a:fontRef idx="minor">
+              <a:schemeClr val="dk1"/>
+            </a:fontRef>
+          </p:style>
+          <p:txBody>
+            <a:bodyPr rtlCol="0" anchor="ctr"/>
+            <a:lstStyle/>
+            <a:p>
+              <a:pPr algn="ctr"/>
+              <a:r>
+                <a:rPr lang="en-IN" dirty="0" smtClean="0">
+                  <a:latin typeface="Times New Roman" panose="02020603050405020304" pitchFamily="18" charset="0"/>
+                  <a:cs typeface="Times New Roman" panose="02020603050405020304" pitchFamily="18" charset="0"/>
+                </a:rPr>
+                <a:t>Main/Master Controller</a:t>
+              </a:r>
+              <a:endParaRPr lang="en-IN" dirty="0">
+                <a:latin typeface="Times New Roman" panose="02020603050405020304" pitchFamily="18" charset="0"/>
+                <a:cs typeface="Times New Roman" panose="02020603050405020304" pitchFamily="18" charset="0"/>
+              </a:endParaRPr>
+            </a:p>
+          </p:txBody>
+        </p:sp>
+        <p:cxnSp>
+          <p:nvCxnSpPr>
+            <p:cNvPr id="15" name="Straight Arrow Connector 14"/>
+            <p:cNvCxnSpPr>
+              <a:stCxn id="14" idx="0"/>
+            </p:cNvCxnSpPr>
+            <p:nvPr/>
+          </p:nvCxnSpPr>
+          <p:spPr>
+            <a:xfrm flipV="1">
+              <a:off x="5390866" y="4046566"/>
+              <a:ext cx="0" cy="1439838"/>
+            </a:xfrm>
+            <a:prstGeom prst="straightConnector1">
+              <a:avLst/>
+            </a:prstGeom>
+            <a:ln>
+              <a:headEnd type="triangle"/>
+              <a:tailEnd type="triangle"/>
+            </a:ln>
+          </p:spPr>
+          <p:style>
+            <a:lnRef idx="1">
+              <a:schemeClr val="dk1"/>
+            </a:lnRef>
+            <a:fillRef idx="0">
+              <a:schemeClr val="dk1"/>
+            </a:fillRef>
+            <a:effectRef idx="0">
+              <a:schemeClr val="dk1"/>
+            </a:effectRef>
+            <a:fontRef idx="minor">
+              <a:schemeClr val="tx1"/>
+            </a:fontRef>
+          </p:style>
+        </p:cxnSp>
+      </p:grpSp>
+    </p:spTree>
+    <p:extLst>
+      <p:ext uri="{BB962C8B-B14F-4D97-AF65-F5344CB8AC3E}">
+        <p14:creationId xmlns:p14="http://schemas.microsoft.com/office/powerpoint/2010/main" val="1364942530"/>
+      </p:ext>
+    </p:extLst>
+  </p:cSld>
+  <p:clrMapOvr>
+    <a:masterClrMapping/>
+  </p:clrMapOvr>
+</p:sld>
+</file>
+
+<file path=ppt/slides/slide3.xml><?xml version="1.0" encoding="utf-8"?>
+<p:sld xmlns:a="http://schemas.openxmlformats.org/drawingml/2006/main" xmlns:r="http://schemas.openxmlformats.org/officeDocument/2006/relationships" xmlns:p="http://schemas.openxmlformats.org/presentationml/2006/main">
+  <p:cSld>
+    <p:spTree>
+      <p:nvGrpSpPr>
+        <p:cNvPr id="1" name=""/>
+        <p:cNvGrpSpPr/>
+        <p:nvPr/>
+      </p:nvGrpSpPr>
+      <p:grpSpPr>
+        <a:xfrm>
+          <a:off x="0" y="0"/>
+          <a:ext cx="0" cy="0"/>
+          <a:chOff x="0" y="0"/>
+          <a:chExt cx="0" cy="0"/>
+        </a:xfrm>
+      </p:grpSpPr>
+      <p:sp>
+        <p:nvSpPr>
+          <p:cNvPr id="2" name="Title 1"/>
+          <p:cNvSpPr>
+            <a:spLocks noGrp="1"/>
+          </p:cNvSpPr>
+          <p:nvPr>
+            <p:ph type="title"/>
+          </p:nvPr>
+        </p:nvSpPr>
+        <p:spPr/>
+        <p:txBody>
+          <a:bodyPr/>
+          <a:lstStyle/>
+          <a:p>
+            <a:pPr algn="ctr"/>
+            <a:r>
+              <a:rPr lang="en-IN" dirty="0" smtClean="0">
+                <a:latin typeface="Times New Roman" panose="02020603050405020304" pitchFamily="18" charset="0"/>
+                <a:cs typeface="Times New Roman" panose="02020603050405020304" pitchFamily="18" charset="0"/>
+              </a:rPr>
+              <a:t>Subsystem Address Ranges Definition</a:t>
+            </a:r>
+            <a:endParaRPr lang="en-IN" dirty="0">
+              <a:latin typeface="Times New Roman" panose="02020603050405020304" pitchFamily="18" charset="0"/>
+              <a:cs typeface="Times New Roman" panose="02020603050405020304" pitchFamily="18" charset="0"/>
+            </a:endParaRPr>
+          </a:p>
+        </p:txBody>
+      </p:sp>
+      <p:graphicFrame>
+        <p:nvGraphicFramePr>
+          <p:cNvPr id="6" name="Table 5"/>
+          <p:cNvGraphicFramePr>
+            <a:graphicFrameLocks noGrp="1"/>
+          </p:cNvGraphicFramePr>
+          <p:nvPr>
+            <p:extLst>
+              <p:ext uri="{D42A27DB-BD31-4B8C-83A1-F6EECF244321}">
+                <p14:modId xmlns:p14="http://schemas.microsoft.com/office/powerpoint/2010/main" val="2365094172"/>
+              </p:ext>
+            </p:extLst>
+          </p:nvPr>
+        </p:nvGraphicFramePr>
+        <p:xfrm>
+          <a:off x="2878161" y="2179977"/>
+          <a:ext cx="6992112" cy="2595880"/>
+        </p:xfrm>
+        <a:graphic>
+          <a:graphicData uri="http://schemas.openxmlformats.org/drawingml/2006/table">
+            <a:tbl>
+              <a:tblPr firstRow="1" bandRow="1">
+                <a:tableStyleId>{5C22544A-7EE6-4342-B048-85BDC9FD1C3A}</a:tableStyleId>
+              </a:tblPr>
+              <a:tblGrid>
+                <a:gridCol w="1575816">
+                  <a:extLst>
+                    <a:ext uri="{9D8B030D-6E8A-4147-A177-3AD203B41FA5}">
+                      <a16:colId xmlns:a16="http://schemas.microsoft.com/office/drawing/2014/main" val="4095292889"/>
+                    </a:ext>
+                  </a:extLst>
+                </a:gridCol>
+                <a:gridCol w="1486916">
+                  <a:extLst>
+                    <a:ext uri="{9D8B030D-6E8A-4147-A177-3AD203B41FA5}">
+                      <a16:colId xmlns:a16="http://schemas.microsoft.com/office/drawing/2014/main" val="2435405040"/>
+                    </a:ext>
+                  </a:extLst>
+                </a:gridCol>
+                <a:gridCol w="3929380">
+                  <a:extLst>
+                    <a:ext uri="{9D8B030D-6E8A-4147-A177-3AD203B41FA5}">
+                      <a16:colId xmlns:a16="http://schemas.microsoft.com/office/drawing/2014/main" val="3149681256"/>
+                    </a:ext>
+                  </a:extLst>
+                </a:gridCol>
+              </a:tblGrid>
+              <a:tr h="370840">
+                <a:tc>
+                  <a:txBody>
+                    <a:bodyPr/>
+                    <a:lstStyle/>
+                    <a:p>
+                      <a:pPr algn="ctr"/>
+                      <a:r>
+                        <a:rPr lang="en-IN" dirty="0" smtClean="0">
+                          <a:latin typeface="Times New Roman" panose="02020603050405020304" pitchFamily="18" charset="0"/>
+                          <a:cs typeface="Times New Roman" panose="02020603050405020304" pitchFamily="18" charset="0"/>
+                        </a:rPr>
+                        <a:t>Start Address</a:t>
+                      </a:r>
+                      <a:endParaRPr lang="en-IN" dirty="0">
+                        <a:latin typeface="Times New Roman" panose="02020603050405020304" pitchFamily="18" charset="0"/>
+                        <a:cs typeface="Times New Roman" panose="02020603050405020304" pitchFamily="18" charset="0"/>
+                      </a:endParaRPr>
+                    </a:p>
+                  </a:txBody>
+                  <a:tcPr anchor="ctr"/>
+                </a:tc>
+                <a:tc>
+                  <a:txBody>
+                    <a:bodyPr/>
+                    <a:lstStyle/>
+                    <a:p>
+                      <a:pPr algn="ctr"/>
+                      <a:r>
+                        <a:rPr lang="en-IN" dirty="0" smtClean="0">
+                          <a:latin typeface="Times New Roman" panose="02020603050405020304" pitchFamily="18" charset="0"/>
+                          <a:cs typeface="Times New Roman" panose="02020603050405020304" pitchFamily="18" charset="0"/>
+                        </a:rPr>
+                        <a:t>End Address</a:t>
+                      </a:r>
+                      <a:endParaRPr lang="en-IN" dirty="0">
+                        <a:latin typeface="Times New Roman" panose="02020603050405020304" pitchFamily="18" charset="0"/>
+                        <a:cs typeface="Times New Roman" panose="02020603050405020304" pitchFamily="18" charset="0"/>
+                      </a:endParaRPr>
+                    </a:p>
+                  </a:txBody>
+                  <a:tcPr anchor="ctr"/>
+                </a:tc>
+                <a:tc>
+                  <a:txBody>
+                    <a:bodyPr/>
+                    <a:lstStyle/>
+                    <a:p>
+                      <a:pPr algn="ctr"/>
+                      <a:r>
+                        <a:rPr lang="en-IN" dirty="0" smtClean="0">
+                          <a:latin typeface="Times New Roman" panose="02020603050405020304" pitchFamily="18" charset="0"/>
+                          <a:cs typeface="Times New Roman" panose="02020603050405020304" pitchFamily="18" charset="0"/>
+                        </a:rPr>
+                        <a:t>Type of Subsystem</a:t>
+                      </a:r>
+                      <a:endParaRPr lang="en-IN" dirty="0">
+                        <a:latin typeface="Times New Roman" panose="02020603050405020304" pitchFamily="18" charset="0"/>
+                        <a:cs typeface="Times New Roman" panose="02020603050405020304" pitchFamily="18" charset="0"/>
+                      </a:endParaRPr>
+                    </a:p>
+                  </a:txBody>
+                  <a:tcPr anchor="ctr"/>
+                </a:tc>
+                <a:extLst>
+                  <a:ext uri="{0D108BD9-81ED-4DB2-BD59-A6C34878D82A}">
+                    <a16:rowId xmlns:a16="http://schemas.microsoft.com/office/drawing/2014/main" val="3087072443"/>
+                  </a:ext>
+                </a:extLst>
+              </a:tr>
+              <a:tr h="370840">
+                <a:tc>
+                  <a:txBody>
+                    <a:bodyPr/>
+                    <a:lstStyle/>
+                    <a:p>
+                      <a:pPr algn="ctr"/>
+                      <a:r>
+                        <a:rPr lang="en-IN" dirty="0" smtClean="0">
+                          <a:latin typeface="Times New Roman" panose="02020603050405020304" pitchFamily="18" charset="0"/>
+                          <a:cs typeface="Times New Roman" panose="02020603050405020304" pitchFamily="18" charset="0"/>
+                        </a:rPr>
+                        <a:t>0x10</a:t>
+                      </a:r>
+                      <a:endParaRPr lang="en-IN" dirty="0">
+                        <a:latin typeface="Times New Roman" panose="02020603050405020304" pitchFamily="18" charset="0"/>
+                        <a:cs typeface="Times New Roman" panose="02020603050405020304" pitchFamily="18" charset="0"/>
+                      </a:endParaRPr>
+                    </a:p>
+                  </a:txBody>
+                  <a:tcPr anchor="ctr"/>
+                </a:tc>
+                <a:tc>
+                  <a:txBody>
+                    <a:bodyPr/>
+                    <a:lstStyle/>
+                    <a:p>
+                      <a:pPr algn="ctr"/>
+                      <a:r>
+                        <a:rPr lang="en-IN" dirty="0" smtClean="0">
+                          <a:latin typeface="Times New Roman" panose="02020603050405020304" pitchFamily="18" charset="0"/>
+                          <a:cs typeface="Times New Roman" panose="02020603050405020304" pitchFamily="18" charset="0"/>
+                        </a:rPr>
+                        <a:t>0x19</a:t>
+                      </a:r>
+                      <a:endParaRPr lang="en-IN" dirty="0">
+                        <a:latin typeface="Times New Roman" panose="02020603050405020304" pitchFamily="18" charset="0"/>
+                        <a:cs typeface="Times New Roman" panose="02020603050405020304" pitchFamily="18" charset="0"/>
+                      </a:endParaRPr>
+                    </a:p>
+                  </a:txBody>
+                  <a:tcPr anchor="ctr"/>
+                </a:tc>
+                <a:tc>
+                  <a:txBody>
+                    <a:bodyPr/>
+                    <a:lstStyle/>
+                    <a:p>
+                      <a:pPr algn="l"/>
+                      <a:r>
+                        <a:rPr lang="en-IN" dirty="0" smtClean="0">
+                          <a:latin typeface="Times New Roman" panose="02020603050405020304" pitchFamily="18" charset="0"/>
+                          <a:cs typeface="Times New Roman" panose="02020603050405020304" pitchFamily="18" charset="0"/>
+                        </a:rPr>
+                        <a:t>Relative Position Subsystem</a:t>
+                      </a:r>
+                      <a:endParaRPr lang="en-IN" dirty="0">
+                        <a:latin typeface="Times New Roman" panose="02020603050405020304" pitchFamily="18" charset="0"/>
+                        <a:cs typeface="Times New Roman" panose="02020603050405020304" pitchFamily="18" charset="0"/>
+                      </a:endParaRPr>
+                    </a:p>
+                  </a:txBody>
+                  <a:tcPr anchor="ctr"/>
+                </a:tc>
+                <a:extLst>
+                  <a:ext uri="{0D108BD9-81ED-4DB2-BD59-A6C34878D82A}">
+                    <a16:rowId xmlns:a16="http://schemas.microsoft.com/office/drawing/2014/main" val="3363853376"/>
+                  </a:ext>
+                </a:extLst>
+              </a:tr>
+              <a:tr h="370840">
+                <a:tc>
+                  <a:txBody>
+                    <a:bodyPr/>
+                    <a:lstStyle/>
+                    <a:p>
+                      <a:pPr algn="ctr"/>
+                      <a:r>
+                        <a:rPr lang="en-IN" dirty="0" smtClean="0">
+                          <a:latin typeface="Times New Roman" panose="02020603050405020304" pitchFamily="18" charset="0"/>
+                          <a:cs typeface="Times New Roman" panose="02020603050405020304" pitchFamily="18" charset="0"/>
+                        </a:rPr>
+                        <a:t>0x20</a:t>
+                      </a:r>
+                      <a:endParaRPr lang="en-IN" dirty="0">
+                        <a:latin typeface="Times New Roman" panose="02020603050405020304" pitchFamily="18" charset="0"/>
+                        <a:cs typeface="Times New Roman" panose="02020603050405020304" pitchFamily="18" charset="0"/>
+                      </a:endParaRPr>
+                    </a:p>
+                  </a:txBody>
+                  <a:tcPr anchor="ctr"/>
+                </a:tc>
+                <a:tc>
+                  <a:txBody>
+                    <a:bodyPr/>
+                    <a:lstStyle/>
+                    <a:p>
+                      <a:pPr algn="ctr"/>
+                      <a:r>
+                        <a:rPr lang="en-IN" dirty="0" smtClean="0">
+                          <a:latin typeface="Times New Roman" panose="02020603050405020304" pitchFamily="18" charset="0"/>
+                          <a:cs typeface="Times New Roman" panose="02020603050405020304" pitchFamily="18" charset="0"/>
+                        </a:rPr>
+                        <a:t>0x25</a:t>
+                      </a:r>
+                      <a:endParaRPr lang="en-IN" dirty="0">
+                        <a:latin typeface="Times New Roman" panose="02020603050405020304" pitchFamily="18" charset="0"/>
+                        <a:cs typeface="Times New Roman" panose="02020603050405020304" pitchFamily="18" charset="0"/>
+                      </a:endParaRPr>
+                    </a:p>
+                  </a:txBody>
+                  <a:tcPr anchor="ctr"/>
+                </a:tc>
+                <a:tc>
+                  <a:txBody>
+                    <a:bodyPr/>
+                    <a:lstStyle/>
+                    <a:p>
+                      <a:pPr algn="l"/>
+                      <a:r>
+                        <a:rPr lang="en-IN" dirty="0" smtClean="0">
+                          <a:latin typeface="Times New Roman" panose="02020603050405020304" pitchFamily="18" charset="0"/>
+                          <a:cs typeface="Times New Roman" panose="02020603050405020304" pitchFamily="18" charset="0"/>
+                        </a:rPr>
+                        <a:t>GPS Subsystem</a:t>
+                      </a:r>
+                      <a:endParaRPr lang="en-IN" dirty="0">
+                        <a:latin typeface="Times New Roman" panose="02020603050405020304" pitchFamily="18" charset="0"/>
+                        <a:cs typeface="Times New Roman" panose="02020603050405020304" pitchFamily="18" charset="0"/>
+                      </a:endParaRPr>
+                    </a:p>
+                  </a:txBody>
+                  <a:tcPr anchor="ctr"/>
+                </a:tc>
+                <a:extLst>
+                  <a:ext uri="{0D108BD9-81ED-4DB2-BD59-A6C34878D82A}">
+                    <a16:rowId xmlns:a16="http://schemas.microsoft.com/office/drawing/2014/main" val="1596704810"/>
+                  </a:ext>
+                </a:extLst>
+              </a:tr>
+              <a:tr h="370840">
+                <a:tc>
+                  <a:txBody>
+                    <a:bodyPr/>
+                    <a:lstStyle/>
+                    <a:p>
+                      <a:pPr algn="ctr"/>
+                      <a:r>
+                        <a:rPr lang="en-IN" dirty="0" smtClean="0">
+                          <a:latin typeface="Times New Roman" panose="02020603050405020304" pitchFamily="18" charset="0"/>
+                          <a:cs typeface="Times New Roman" panose="02020603050405020304" pitchFamily="18" charset="0"/>
+                        </a:rPr>
+                        <a:t>0x26</a:t>
+                      </a:r>
+                      <a:endParaRPr lang="en-IN" dirty="0">
+                        <a:latin typeface="Times New Roman" panose="02020603050405020304" pitchFamily="18" charset="0"/>
+                        <a:cs typeface="Times New Roman" panose="02020603050405020304" pitchFamily="18" charset="0"/>
+                      </a:endParaRPr>
+                    </a:p>
+                  </a:txBody>
+                  <a:tcPr anchor="ctr"/>
+                </a:tc>
+                <a:tc>
+                  <a:txBody>
+                    <a:bodyPr/>
+                    <a:lstStyle/>
+                    <a:p>
+                      <a:pPr algn="ctr"/>
+                      <a:r>
+                        <a:rPr lang="en-IN" dirty="0" smtClean="0">
+                          <a:latin typeface="Times New Roman" panose="02020603050405020304" pitchFamily="18" charset="0"/>
+                          <a:cs typeface="Times New Roman" panose="02020603050405020304" pitchFamily="18" charset="0"/>
+                        </a:rPr>
+                        <a:t>0x29</a:t>
+                      </a:r>
+                      <a:endParaRPr lang="en-IN" dirty="0">
+                        <a:latin typeface="Times New Roman" panose="02020603050405020304" pitchFamily="18" charset="0"/>
+                        <a:cs typeface="Times New Roman" panose="02020603050405020304" pitchFamily="18" charset="0"/>
+                      </a:endParaRPr>
+                    </a:p>
+                  </a:txBody>
+                  <a:tcPr anchor="ctr"/>
+                </a:tc>
+                <a:tc>
+                  <a:txBody>
+                    <a:bodyPr/>
+                    <a:lstStyle/>
+                    <a:p>
+                      <a:pPr algn="l"/>
+                      <a:r>
+                        <a:rPr lang="en-IN" dirty="0" smtClean="0">
+                          <a:latin typeface="Times New Roman" panose="02020603050405020304" pitchFamily="18" charset="0"/>
+                          <a:cs typeface="Times New Roman" panose="02020603050405020304" pitchFamily="18" charset="0"/>
+                        </a:rPr>
+                        <a:t>External RF Communication Subsystem</a:t>
+                      </a:r>
+                      <a:endParaRPr lang="en-IN" dirty="0">
+                        <a:latin typeface="Times New Roman" panose="02020603050405020304" pitchFamily="18" charset="0"/>
+                        <a:cs typeface="Times New Roman" panose="02020603050405020304" pitchFamily="18" charset="0"/>
+                      </a:endParaRPr>
+                    </a:p>
+                  </a:txBody>
+                  <a:tcPr anchor="ctr"/>
+                </a:tc>
+                <a:extLst>
+                  <a:ext uri="{0D108BD9-81ED-4DB2-BD59-A6C34878D82A}">
+                    <a16:rowId xmlns:a16="http://schemas.microsoft.com/office/drawing/2014/main" val="621665701"/>
+                  </a:ext>
+                </a:extLst>
+              </a:tr>
+              <a:tr h="370840">
+                <a:tc>
+                  <a:txBody>
+                    <a:bodyPr/>
+                    <a:lstStyle/>
+                    <a:p>
+                      <a:pPr algn="ctr"/>
+                      <a:r>
+                        <a:rPr lang="en-IN" dirty="0" smtClean="0">
+                          <a:latin typeface="Times New Roman" panose="02020603050405020304" pitchFamily="18" charset="0"/>
+                          <a:cs typeface="Times New Roman" panose="02020603050405020304" pitchFamily="18" charset="0"/>
+                        </a:rPr>
+                        <a:t>0x30</a:t>
+                      </a:r>
+                      <a:endParaRPr lang="en-IN" dirty="0">
+                        <a:latin typeface="Times New Roman" panose="02020603050405020304" pitchFamily="18" charset="0"/>
+                        <a:cs typeface="Times New Roman" panose="02020603050405020304" pitchFamily="18" charset="0"/>
+                      </a:endParaRPr>
+                    </a:p>
+                  </a:txBody>
+                  <a:tcPr anchor="ctr"/>
+                </a:tc>
+                <a:tc>
+                  <a:txBody>
+                    <a:bodyPr/>
+                    <a:lstStyle/>
+                    <a:p>
+                      <a:pPr algn="ctr"/>
+                      <a:r>
+                        <a:rPr lang="en-IN" dirty="0" smtClean="0">
+                          <a:latin typeface="Times New Roman" panose="02020603050405020304" pitchFamily="18" charset="0"/>
+                          <a:cs typeface="Times New Roman" panose="02020603050405020304" pitchFamily="18" charset="0"/>
+                        </a:rPr>
+                        <a:t>0x39</a:t>
+                      </a:r>
+                      <a:endParaRPr lang="en-IN" dirty="0">
+                        <a:latin typeface="Times New Roman" panose="02020603050405020304" pitchFamily="18" charset="0"/>
+                        <a:cs typeface="Times New Roman" panose="02020603050405020304" pitchFamily="18" charset="0"/>
+                      </a:endParaRPr>
+                    </a:p>
+                  </a:txBody>
+                  <a:tcPr anchor="ctr"/>
+                </a:tc>
+                <a:tc>
+                  <a:txBody>
+                    <a:bodyPr/>
+                    <a:lstStyle/>
+                    <a:p>
+                      <a:pPr algn="l"/>
+                      <a:r>
+                        <a:rPr lang="en-IN" dirty="0" smtClean="0">
+                          <a:latin typeface="Times New Roman" panose="02020603050405020304" pitchFamily="18" charset="0"/>
+                          <a:cs typeface="Times New Roman" panose="02020603050405020304" pitchFamily="18" charset="0"/>
+                        </a:rPr>
+                        <a:t>Obstacle Avoidance Subsystem</a:t>
+                      </a:r>
+                      <a:endParaRPr lang="en-IN" dirty="0">
+                        <a:latin typeface="Times New Roman" panose="02020603050405020304" pitchFamily="18" charset="0"/>
+                        <a:cs typeface="Times New Roman" panose="02020603050405020304" pitchFamily="18" charset="0"/>
+                      </a:endParaRPr>
+                    </a:p>
+                  </a:txBody>
+                  <a:tcPr anchor="ctr"/>
+                </a:tc>
+                <a:extLst>
+                  <a:ext uri="{0D108BD9-81ED-4DB2-BD59-A6C34878D82A}">
+                    <a16:rowId xmlns:a16="http://schemas.microsoft.com/office/drawing/2014/main" val="1515685180"/>
+                  </a:ext>
+                </a:extLst>
+              </a:tr>
+              <a:tr h="370840">
+                <a:tc>
+                  <a:txBody>
+                    <a:bodyPr/>
+                    <a:lstStyle/>
+                    <a:p>
+                      <a:pPr algn="ctr"/>
+                      <a:r>
+                        <a:rPr lang="en-IN" dirty="0" smtClean="0">
+                          <a:latin typeface="Times New Roman" panose="02020603050405020304" pitchFamily="18" charset="0"/>
+                          <a:cs typeface="Times New Roman" panose="02020603050405020304" pitchFamily="18" charset="0"/>
+                        </a:rPr>
+                        <a:t>0x40</a:t>
+                      </a:r>
+                      <a:endParaRPr lang="en-IN" dirty="0">
+                        <a:latin typeface="Times New Roman" panose="02020603050405020304" pitchFamily="18" charset="0"/>
+                        <a:cs typeface="Times New Roman" panose="02020603050405020304" pitchFamily="18" charset="0"/>
+                      </a:endParaRPr>
+                    </a:p>
+                  </a:txBody>
+                  <a:tcPr anchor="ctr"/>
+                </a:tc>
+                <a:tc>
+                  <a:txBody>
+                    <a:bodyPr/>
+                    <a:lstStyle/>
+                    <a:p>
+                      <a:pPr algn="ctr"/>
+                      <a:r>
+                        <a:rPr lang="en-IN" dirty="0" smtClean="0">
+                          <a:latin typeface="Times New Roman" panose="02020603050405020304" pitchFamily="18" charset="0"/>
+                          <a:cs typeface="Times New Roman" panose="02020603050405020304" pitchFamily="18" charset="0"/>
+                        </a:rPr>
+                        <a:t>0x49</a:t>
+                      </a:r>
+                      <a:endParaRPr lang="en-IN" dirty="0">
+                        <a:latin typeface="Times New Roman" panose="02020603050405020304" pitchFamily="18" charset="0"/>
+                        <a:cs typeface="Times New Roman" panose="02020603050405020304" pitchFamily="18" charset="0"/>
+                      </a:endParaRPr>
+                    </a:p>
+                  </a:txBody>
+                  <a:tcPr anchor="ctr"/>
+                </a:tc>
+                <a:tc>
+                  <a:txBody>
+                    <a:bodyPr/>
+                    <a:lstStyle/>
+                    <a:p>
+                      <a:pPr algn="l"/>
+                      <a:r>
+                        <a:rPr lang="en-IN" dirty="0" smtClean="0">
+                          <a:latin typeface="Times New Roman" panose="02020603050405020304" pitchFamily="18" charset="0"/>
+                          <a:cs typeface="Times New Roman" panose="02020603050405020304" pitchFamily="18" charset="0"/>
+                        </a:rPr>
+                        <a:t>Health</a:t>
+                      </a:r>
+                      <a:r>
+                        <a:rPr lang="en-IN" baseline="0" dirty="0" smtClean="0">
+                          <a:latin typeface="Times New Roman" panose="02020603050405020304" pitchFamily="18" charset="0"/>
+                          <a:cs typeface="Times New Roman" panose="02020603050405020304" pitchFamily="18" charset="0"/>
+                        </a:rPr>
+                        <a:t> Monitoring Subsystem</a:t>
+                      </a:r>
+                    </a:p>
+                  </a:txBody>
+                  <a:tcPr anchor="ctr"/>
+                </a:tc>
+                <a:extLst>
+                  <a:ext uri="{0D108BD9-81ED-4DB2-BD59-A6C34878D82A}">
+                    <a16:rowId xmlns:a16="http://schemas.microsoft.com/office/drawing/2014/main" val="2547034353"/>
+                  </a:ext>
+                </a:extLst>
+              </a:tr>
+              <a:tr h="370840">
+                <a:tc>
+                  <a:txBody>
+                    <a:bodyPr/>
+                    <a:lstStyle/>
+                    <a:p>
+                      <a:pPr algn="ctr"/>
+                      <a:r>
+                        <a:rPr lang="en-IN" dirty="0" smtClean="0">
+                          <a:latin typeface="Times New Roman" panose="02020603050405020304" pitchFamily="18" charset="0"/>
+                          <a:cs typeface="Times New Roman" panose="02020603050405020304" pitchFamily="18" charset="0"/>
+                        </a:rPr>
+                        <a:t>0x50</a:t>
+                      </a:r>
+                      <a:endParaRPr lang="en-IN" dirty="0">
+                        <a:latin typeface="Times New Roman" panose="02020603050405020304" pitchFamily="18" charset="0"/>
+                        <a:cs typeface="Times New Roman" panose="02020603050405020304" pitchFamily="18" charset="0"/>
+                      </a:endParaRPr>
+                    </a:p>
+                  </a:txBody>
+                  <a:tcPr anchor="ctr"/>
+                </a:tc>
+                <a:tc>
+                  <a:txBody>
+                    <a:bodyPr/>
+                    <a:lstStyle/>
+                    <a:p>
+                      <a:pPr algn="ctr"/>
+                      <a:r>
+                        <a:rPr lang="en-IN" dirty="0" smtClean="0">
+                          <a:latin typeface="Times New Roman" panose="02020603050405020304" pitchFamily="18" charset="0"/>
+                          <a:cs typeface="Times New Roman" panose="02020603050405020304" pitchFamily="18" charset="0"/>
+                        </a:rPr>
+                        <a:t>0x59</a:t>
+                      </a:r>
+                      <a:endParaRPr lang="en-IN" dirty="0">
+                        <a:latin typeface="Times New Roman" panose="02020603050405020304" pitchFamily="18" charset="0"/>
+                        <a:cs typeface="Times New Roman" panose="02020603050405020304" pitchFamily="18" charset="0"/>
+                      </a:endParaRPr>
+                    </a:p>
+                  </a:txBody>
+                  <a:tcPr anchor="ctr"/>
+                </a:tc>
+                <a:tc>
+                  <a:txBody>
+                    <a:bodyPr/>
+                    <a:lstStyle/>
+                    <a:p>
+                      <a:pPr algn="l"/>
+                      <a:r>
+                        <a:rPr lang="en-IN" baseline="0" dirty="0" smtClean="0">
+                          <a:latin typeface="Times New Roman" panose="02020603050405020304" pitchFamily="18" charset="0"/>
+                          <a:cs typeface="Times New Roman" panose="02020603050405020304" pitchFamily="18" charset="0"/>
+                        </a:rPr>
+                        <a:t>Communication Subsystem</a:t>
+                      </a:r>
+                    </a:p>
+                  </a:txBody>
+                  <a:tcPr anchor="ctr"/>
+                </a:tc>
+                <a:extLst>
+                  <a:ext uri="{0D108BD9-81ED-4DB2-BD59-A6C34878D82A}">
+                    <a16:rowId xmlns:a16="http://schemas.microsoft.com/office/drawing/2014/main" val="3376754302"/>
+                  </a:ext>
+                </a:extLst>
+              </a:tr>
+            </a:tbl>
+          </a:graphicData>
+        </a:graphic>
+      </p:graphicFrame>
+    </p:spTree>
+    <p:extLst>
+      <p:ext uri="{BB962C8B-B14F-4D97-AF65-F5344CB8AC3E}">
+        <p14:creationId xmlns:p14="http://schemas.microsoft.com/office/powerpoint/2010/main" val="1974901409"/>
+      </p:ext>
+    </p:extLst>
+  </p:cSld>
+  <p:clrMapOvr>
+    <a:masterClrMapping/>
+  </p:clrMapOvr>
+</p:sld>
+</file>
+
+<file path=ppt/slides/slide4.xml><?xml version="1.0" encoding="utf-8"?>
+<p:sld xmlns:a="http://schemas.openxmlformats.org/drawingml/2006/main" xmlns:r="http://schemas.openxmlformats.org/officeDocument/2006/relationships" xmlns:p="http://schemas.openxmlformats.org/presentationml/2006/main">
+  <p:cSld>
+    <p:spTree>
+      <p:nvGrpSpPr>
+        <p:cNvPr id="1" name=""/>
+        <p:cNvGrpSpPr/>
+        <p:nvPr/>
+      </p:nvGrpSpPr>
+      <p:grpSpPr>
+        <a:xfrm>
+          <a:off x="0" y="0"/>
+          <a:ext cx="0" cy="0"/>
+          <a:chOff x="0" y="0"/>
+          <a:chExt cx="0" cy="0"/>
+        </a:xfrm>
+      </p:grpSpPr>
+      <p:sp>
+        <p:nvSpPr>
+          <p:cNvPr id="2" name="Title 1"/>
+          <p:cNvSpPr>
+            <a:spLocks noGrp="1"/>
+          </p:cNvSpPr>
+          <p:nvPr>
+            <p:ph type="title"/>
+          </p:nvPr>
+        </p:nvSpPr>
+        <p:spPr/>
+        <p:txBody>
+          <a:bodyPr/>
+          <a:lstStyle/>
+          <a:p>
+            <a:pPr algn="ctr"/>
+            <a:r>
+              <a:rPr lang="en-IN" dirty="0" smtClean="0">
+                <a:latin typeface="Times New Roman" panose="02020603050405020304" pitchFamily="18" charset="0"/>
+                <a:cs typeface="Times New Roman" panose="02020603050405020304" pitchFamily="18" charset="0"/>
+              </a:rPr>
+              <a:t>GPS Subsystem Register Structure</a:t>
+            </a:r>
+            <a:endParaRPr lang="en-IN" dirty="0">
+              <a:latin typeface="Times New Roman" panose="02020603050405020304" pitchFamily="18" charset="0"/>
+              <a:cs typeface="Times New Roman" panose="02020603050405020304" pitchFamily="18" charset="0"/>
+            </a:endParaRPr>
+          </a:p>
+        </p:txBody>
+      </p:sp>
+      <p:graphicFrame>
+        <p:nvGraphicFramePr>
+          <p:cNvPr id="6" name="Table 5"/>
+          <p:cNvGraphicFramePr>
+            <a:graphicFrameLocks noGrp="1"/>
+          </p:cNvGraphicFramePr>
+          <p:nvPr>
+            <p:extLst>
+              <p:ext uri="{D42A27DB-BD31-4B8C-83A1-F6EECF244321}">
+                <p14:modId xmlns:p14="http://schemas.microsoft.com/office/powerpoint/2010/main" val="2709166606"/>
+              </p:ext>
+            </p:extLst>
+          </p:nvPr>
+        </p:nvGraphicFramePr>
+        <p:xfrm>
+          <a:off x="2591466" y="2396545"/>
+          <a:ext cx="7009067" cy="2966720"/>
+        </p:xfrm>
+        <a:graphic>
+          <a:graphicData uri="http://schemas.openxmlformats.org/drawingml/2006/table">
+            <a:tbl>
+              <a:tblPr firstRow="1" bandRow="1">
+                <a:tableStyleId>{5C22544A-7EE6-4342-B048-85BDC9FD1C3A}</a:tableStyleId>
+              </a:tblPr>
+              <a:tblGrid>
+                <a:gridCol w="1889189">
+                  <a:extLst>
+                    <a:ext uri="{9D8B030D-6E8A-4147-A177-3AD203B41FA5}">
+                      <a16:colId xmlns:a16="http://schemas.microsoft.com/office/drawing/2014/main" val="4095292889"/>
+                    </a:ext>
+                  </a:extLst>
+                </a:gridCol>
+                <a:gridCol w="2422398">
+                  <a:extLst>
+                    <a:ext uri="{9D8B030D-6E8A-4147-A177-3AD203B41FA5}">
+                      <a16:colId xmlns:a16="http://schemas.microsoft.com/office/drawing/2014/main" val="2435405040"/>
+                    </a:ext>
+                  </a:extLst>
+                </a:gridCol>
+                <a:gridCol w="2697480">
+                  <a:extLst>
+                    <a:ext uri="{9D8B030D-6E8A-4147-A177-3AD203B41FA5}">
+                      <a16:colId xmlns:a16="http://schemas.microsoft.com/office/drawing/2014/main" val="3149681256"/>
+                    </a:ext>
+                  </a:extLst>
+                </a:gridCol>
+              </a:tblGrid>
+              <a:tr h="370840">
+                <a:tc>
+                  <a:txBody>
+                    <a:bodyPr/>
+                    <a:lstStyle/>
+                    <a:p>
+                      <a:pPr algn="ctr"/>
+                      <a:r>
+                        <a:rPr lang="en-IN" dirty="0" smtClean="0">
+                          <a:latin typeface="Times New Roman" panose="02020603050405020304" pitchFamily="18" charset="0"/>
+                          <a:cs typeface="Times New Roman" panose="02020603050405020304" pitchFamily="18" charset="0"/>
+                        </a:rPr>
+                        <a:t>Register</a:t>
+                      </a:r>
+                      <a:r>
+                        <a:rPr lang="en-IN" baseline="0" dirty="0" smtClean="0">
+                          <a:latin typeface="Times New Roman" panose="02020603050405020304" pitchFamily="18" charset="0"/>
+                          <a:cs typeface="Times New Roman" panose="02020603050405020304" pitchFamily="18" charset="0"/>
+                        </a:rPr>
+                        <a:t> Address</a:t>
+                      </a:r>
+                      <a:endParaRPr lang="en-IN" dirty="0">
+                        <a:latin typeface="Times New Roman" panose="02020603050405020304" pitchFamily="18" charset="0"/>
+                        <a:cs typeface="Times New Roman" panose="02020603050405020304" pitchFamily="18" charset="0"/>
+                      </a:endParaRPr>
+                    </a:p>
+                  </a:txBody>
+                  <a:tcPr anchor="ctr"/>
+                </a:tc>
+                <a:tc>
+                  <a:txBody>
+                    <a:bodyPr/>
+                    <a:lstStyle/>
+                    <a:p>
+                      <a:pPr algn="ctr"/>
+                      <a:r>
+                        <a:rPr lang="en-IN" dirty="0" smtClean="0">
+                          <a:latin typeface="Times New Roman" panose="02020603050405020304" pitchFamily="18" charset="0"/>
+                          <a:cs typeface="Times New Roman" panose="02020603050405020304" pitchFamily="18" charset="0"/>
+                        </a:rPr>
+                        <a:t>Data Type and Length</a:t>
+                      </a:r>
+                      <a:endParaRPr lang="en-IN" dirty="0">
+                        <a:latin typeface="Times New Roman" panose="02020603050405020304" pitchFamily="18" charset="0"/>
+                        <a:cs typeface="Times New Roman" panose="02020603050405020304" pitchFamily="18" charset="0"/>
+                      </a:endParaRPr>
+                    </a:p>
+                  </a:txBody>
+                  <a:tcPr anchor="ctr"/>
+                </a:tc>
+                <a:tc>
+                  <a:txBody>
+                    <a:bodyPr/>
+                    <a:lstStyle/>
+                    <a:p>
+                      <a:pPr algn="ctr"/>
+                      <a:r>
+                        <a:rPr lang="en-IN" dirty="0" smtClean="0">
+                          <a:latin typeface="Times New Roman" panose="02020603050405020304" pitchFamily="18" charset="0"/>
+                          <a:cs typeface="Times New Roman" panose="02020603050405020304" pitchFamily="18" charset="0"/>
+                        </a:rPr>
+                        <a:t>Description</a:t>
+                      </a:r>
+                      <a:endParaRPr lang="en-IN" dirty="0">
+                        <a:latin typeface="Times New Roman" panose="02020603050405020304" pitchFamily="18" charset="0"/>
+                        <a:cs typeface="Times New Roman" panose="02020603050405020304" pitchFamily="18" charset="0"/>
+                      </a:endParaRPr>
+                    </a:p>
+                  </a:txBody>
+                  <a:tcPr anchor="ctr"/>
+                </a:tc>
+                <a:extLst>
+                  <a:ext uri="{0D108BD9-81ED-4DB2-BD59-A6C34878D82A}">
+                    <a16:rowId xmlns:a16="http://schemas.microsoft.com/office/drawing/2014/main" val="3087072443"/>
+                  </a:ext>
+                </a:extLst>
+              </a:tr>
+              <a:tr h="370840">
+                <a:tc>
+                  <a:txBody>
+                    <a:bodyPr/>
+                    <a:lstStyle/>
+                    <a:p>
+                      <a:pPr algn="ctr"/>
+                      <a:r>
+                        <a:rPr lang="en-IN" dirty="0" smtClean="0">
+                          <a:latin typeface="Times New Roman" panose="02020603050405020304" pitchFamily="18" charset="0"/>
+                          <a:cs typeface="Times New Roman" panose="02020603050405020304" pitchFamily="18" charset="0"/>
+                        </a:rPr>
+                        <a:t>0x01</a:t>
+                      </a:r>
+                      <a:endParaRPr lang="en-IN" dirty="0">
+                        <a:latin typeface="Times New Roman" panose="02020603050405020304" pitchFamily="18" charset="0"/>
+                        <a:cs typeface="Times New Roman" panose="02020603050405020304" pitchFamily="18" charset="0"/>
+                      </a:endParaRPr>
+                    </a:p>
+                  </a:txBody>
+                  <a:tcPr anchor="ctr"/>
+                </a:tc>
+                <a:tc>
+                  <a:txBody>
+                    <a:bodyPr/>
+                    <a:lstStyle/>
+                    <a:p>
+                      <a:pPr algn="ctr"/>
+                      <a:r>
+                        <a:rPr lang="en-IN" dirty="0" smtClean="0">
+                          <a:latin typeface="Times New Roman" panose="02020603050405020304" pitchFamily="18" charset="0"/>
+                          <a:cs typeface="Times New Roman" panose="02020603050405020304" pitchFamily="18" charset="0"/>
+                        </a:rPr>
+                        <a:t>1 – U </a:t>
+                      </a:r>
+                      <a:r>
+                        <a:rPr lang="en-IN" dirty="0" err="1" smtClean="0">
+                          <a:latin typeface="Times New Roman" panose="02020603050405020304" pitchFamily="18" charset="0"/>
+                          <a:cs typeface="Times New Roman" panose="02020603050405020304" pitchFamily="18" charset="0"/>
+                        </a:rPr>
+                        <a:t>Int</a:t>
+                      </a:r>
+                      <a:endParaRPr lang="en-IN" dirty="0">
+                        <a:latin typeface="Times New Roman" panose="02020603050405020304" pitchFamily="18" charset="0"/>
+                        <a:cs typeface="Times New Roman" panose="02020603050405020304" pitchFamily="18" charset="0"/>
+                      </a:endParaRPr>
+                    </a:p>
+                  </a:txBody>
+                  <a:tcPr anchor="ctr"/>
+                </a:tc>
+                <a:tc>
+                  <a:txBody>
+                    <a:bodyPr/>
+                    <a:lstStyle/>
+                    <a:p>
+                      <a:pPr algn="l"/>
+                      <a:r>
+                        <a:rPr lang="en-IN" dirty="0" smtClean="0">
+                          <a:latin typeface="Times New Roman" panose="02020603050405020304" pitchFamily="18" charset="0"/>
+                          <a:cs typeface="Times New Roman" panose="02020603050405020304" pitchFamily="18" charset="0"/>
+                        </a:rPr>
+                        <a:t>No of</a:t>
+                      </a:r>
+                      <a:r>
+                        <a:rPr lang="en-IN" baseline="0" dirty="0" smtClean="0">
+                          <a:latin typeface="Times New Roman" panose="02020603050405020304" pitchFamily="18" charset="0"/>
+                          <a:cs typeface="Times New Roman" panose="02020603050405020304" pitchFamily="18" charset="0"/>
+                        </a:rPr>
+                        <a:t> Satellites Connected</a:t>
+                      </a:r>
+                      <a:endParaRPr lang="en-IN" dirty="0">
+                        <a:latin typeface="Times New Roman" panose="02020603050405020304" pitchFamily="18" charset="0"/>
+                        <a:cs typeface="Times New Roman" panose="02020603050405020304" pitchFamily="18" charset="0"/>
+                      </a:endParaRPr>
+                    </a:p>
+                  </a:txBody>
+                  <a:tcPr anchor="ctr"/>
+                </a:tc>
+                <a:extLst>
+                  <a:ext uri="{0D108BD9-81ED-4DB2-BD59-A6C34878D82A}">
+                    <a16:rowId xmlns:a16="http://schemas.microsoft.com/office/drawing/2014/main" val="3363853376"/>
+                  </a:ext>
+                </a:extLst>
+              </a:tr>
+              <a:tr h="370840">
+                <a:tc>
+                  <a:txBody>
+                    <a:bodyPr/>
+                    <a:lstStyle/>
+                    <a:p>
+                      <a:pPr algn="ctr"/>
+                      <a:r>
+                        <a:rPr lang="en-IN" dirty="0" smtClean="0">
+                          <a:latin typeface="Times New Roman" panose="02020603050405020304" pitchFamily="18" charset="0"/>
+                          <a:cs typeface="Times New Roman" panose="02020603050405020304" pitchFamily="18" charset="0"/>
+                        </a:rPr>
+                        <a:t>0x02</a:t>
+                      </a:r>
+                      <a:endParaRPr lang="en-IN" dirty="0">
+                        <a:latin typeface="Times New Roman" panose="02020603050405020304" pitchFamily="18" charset="0"/>
+                        <a:cs typeface="Times New Roman" panose="02020603050405020304" pitchFamily="18" charset="0"/>
+                      </a:endParaRPr>
+                    </a:p>
+                  </a:txBody>
+                  <a:tcPr anchor="ctr"/>
+                </a:tc>
+                <a:tc>
+                  <a:txBody>
+                    <a:bodyPr/>
+                    <a:lstStyle/>
+                    <a:p>
+                      <a:pPr algn="ctr"/>
+                      <a:r>
+                        <a:rPr lang="en-IN" dirty="0" smtClean="0">
+                          <a:latin typeface="Times New Roman" panose="02020603050405020304" pitchFamily="18" charset="0"/>
+                          <a:cs typeface="Times New Roman" panose="02020603050405020304" pitchFamily="18" charset="0"/>
+                        </a:rPr>
+                        <a:t>4 – Float</a:t>
+                      </a:r>
+                      <a:endParaRPr lang="en-IN" dirty="0">
+                        <a:latin typeface="Times New Roman" panose="02020603050405020304" pitchFamily="18" charset="0"/>
+                        <a:cs typeface="Times New Roman" panose="02020603050405020304" pitchFamily="18" charset="0"/>
+                      </a:endParaRPr>
+                    </a:p>
+                  </a:txBody>
+                  <a:tcPr anchor="ctr"/>
+                </a:tc>
+                <a:tc>
+                  <a:txBody>
+                    <a:bodyPr/>
+                    <a:lstStyle/>
+                    <a:p>
+                      <a:pPr algn="l"/>
+                      <a:r>
+                        <a:rPr lang="en-IN" dirty="0" smtClean="0">
+                          <a:latin typeface="Times New Roman" panose="02020603050405020304" pitchFamily="18" charset="0"/>
+                          <a:cs typeface="Times New Roman" panose="02020603050405020304" pitchFamily="18" charset="0"/>
+                        </a:rPr>
+                        <a:t>Latitude</a:t>
+                      </a:r>
+                      <a:endParaRPr lang="en-IN" dirty="0">
+                        <a:latin typeface="Times New Roman" panose="02020603050405020304" pitchFamily="18" charset="0"/>
+                        <a:cs typeface="Times New Roman" panose="02020603050405020304" pitchFamily="18" charset="0"/>
+                      </a:endParaRPr>
+                    </a:p>
+                  </a:txBody>
+                  <a:tcPr anchor="ctr"/>
+                </a:tc>
+                <a:extLst>
+                  <a:ext uri="{0D108BD9-81ED-4DB2-BD59-A6C34878D82A}">
+                    <a16:rowId xmlns:a16="http://schemas.microsoft.com/office/drawing/2014/main" val="1596704810"/>
+                  </a:ext>
+                </a:extLst>
+              </a:tr>
+              <a:tr h="370840">
+                <a:tc>
+                  <a:txBody>
+                    <a:bodyPr/>
+                    <a:lstStyle/>
+                    <a:p>
+                      <a:pPr algn="ctr"/>
+                      <a:r>
+                        <a:rPr lang="en-IN" dirty="0" smtClean="0">
+                          <a:latin typeface="Times New Roman" panose="02020603050405020304" pitchFamily="18" charset="0"/>
+                          <a:cs typeface="Times New Roman" panose="02020603050405020304" pitchFamily="18" charset="0"/>
+                        </a:rPr>
+                        <a:t>0x03</a:t>
+                      </a:r>
+                      <a:endParaRPr lang="en-IN" dirty="0">
+                        <a:latin typeface="Times New Roman" panose="02020603050405020304" pitchFamily="18" charset="0"/>
+                        <a:cs typeface="Times New Roman" panose="02020603050405020304" pitchFamily="18" charset="0"/>
+                      </a:endParaRPr>
+                    </a:p>
+                  </a:txBody>
+                  <a:tcPr anchor="ctr"/>
+                </a:tc>
+                <a:tc>
+                  <a:txBody>
+                    <a:bodyPr/>
+                    <a:lstStyle/>
+                    <a:p>
+                      <a:pPr algn="ctr"/>
+                      <a:r>
+                        <a:rPr lang="en-IN" dirty="0" smtClean="0">
+                          <a:latin typeface="Times New Roman" panose="02020603050405020304" pitchFamily="18" charset="0"/>
+                          <a:cs typeface="Times New Roman" panose="02020603050405020304" pitchFamily="18" charset="0"/>
+                        </a:rPr>
+                        <a:t>4 – Float </a:t>
+                      </a:r>
+                      <a:endParaRPr lang="en-IN" dirty="0">
+                        <a:latin typeface="Times New Roman" panose="02020603050405020304" pitchFamily="18" charset="0"/>
+                        <a:cs typeface="Times New Roman" panose="02020603050405020304" pitchFamily="18" charset="0"/>
+                      </a:endParaRPr>
+                    </a:p>
+                  </a:txBody>
+                  <a:tcPr anchor="ctr"/>
+                </a:tc>
+                <a:tc>
+                  <a:txBody>
+                    <a:bodyPr/>
+                    <a:lstStyle/>
+                    <a:p>
+                      <a:pPr algn="l"/>
+                      <a:r>
+                        <a:rPr lang="en-IN" dirty="0" smtClean="0">
+                          <a:latin typeface="Times New Roman" panose="02020603050405020304" pitchFamily="18" charset="0"/>
+                          <a:cs typeface="Times New Roman" panose="02020603050405020304" pitchFamily="18" charset="0"/>
+                        </a:rPr>
+                        <a:t>Longitude</a:t>
+                      </a:r>
+                      <a:endParaRPr lang="en-IN" dirty="0">
+                        <a:latin typeface="Times New Roman" panose="02020603050405020304" pitchFamily="18" charset="0"/>
+                        <a:cs typeface="Times New Roman" panose="02020603050405020304" pitchFamily="18" charset="0"/>
+                      </a:endParaRPr>
+                    </a:p>
+                  </a:txBody>
+                  <a:tcPr anchor="ctr"/>
+                </a:tc>
+                <a:extLst>
+                  <a:ext uri="{0D108BD9-81ED-4DB2-BD59-A6C34878D82A}">
+                    <a16:rowId xmlns:a16="http://schemas.microsoft.com/office/drawing/2014/main" val="621665701"/>
+                  </a:ext>
+                </a:extLst>
+              </a:tr>
+              <a:tr h="370840">
+                <a:tc>
+                  <a:txBody>
+                    <a:bodyPr/>
+                    <a:lstStyle/>
+                    <a:p>
+                      <a:pPr algn="ctr"/>
+                      <a:r>
+                        <a:rPr lang="en-IN" dirty="0" smtClean="0">
+                          <a:latin typeface="Times New Roman" panose="02020603050405020304" pitchFamily="18" charset="0"/>
+                          <a:cs typeface="Times New Roman" panose="02020603050405020304" pitchFamily="18" charset="0"/>
+                        </a:rPr>
+                        <a:t>0x04</a:t>
+                      </a:r>
+                      <a:endParaRPr lang="en-IN" dirty="0">
+                        <a:latin typeface="Times New Roman" panose="02020603050405020304" pitchFamily="18" charset="0"/>
+                        <a:cs typeface="Times New Roman" panose="02020603050405020304" pitchFamily="18" charset="0"/>
+                      </a:endParaRPr>
+                    </a:p>
+                  </a:txBody>
+                  <a:tcPr anchor="ctr"/>
+                </a:tc>
+                <a:tc>
+                  <a:txBody>
+                    <a:bodyPr/>
+                    <a:lstStyle/>
+                    <a:p>
+                      <a:pPr algn="ctr"/>
+                      <a:r>
+                        <a:rPr lang="en-IN" dirty="0" smtClean="0">
+                          <a:latin typeface="Times New Roman" panose="02020603050405020304" pitchFamily="18" charset="0"/>
+                          <a:cs typeface="Times New Roman" panose="02020603050405020304" pitchFamily="18" charset="0"/>
+                        </a:rPr>
+                        <a:t>4 – Float</a:t>
+                      </a:r>
+                      <a:endParaRPr lang="en-IN" dirty="0">
+                        <a:latin typeface="Times New Roman" panose="02020603050405020304" pitchFamily="18" charset="0"/>
+                        <a:cs typeface="Times New Roman" panose="02020603050405020304" pitchFamily="18" charset="0"/>
+                      </a:endParaRPr>
+                    </a:p>
+                  </a:txBody>
+                  <a:tcPr anchor="ctr"/>
+                </a:tc>
+                <a:tc>
+                  <a:txBody>
+                    <a:bodyPr/>
+                    <a:lstStyle/>
+                    <a:p>
+                      <a:pPr algn="l"/>
+                      <a:r>
+                        <a:rPr lang="en-IN" dirty="0" smtClean="0">
+                          <a:latin typeface="Times New Roman" panose="02020603050405020304" pitchFamily="18" charset="0"/>
+                          <a:cs typeface="Times New Roman" panose="02020603050405020304" pitchFamily="18" charset="0"/>
+                        </a:rPr>
+                        <a:t>Altitude</a:t>
+                      </a:r>
+                      <a:endParaRPr lang="en-IN" dirty="0">
+                        <a:latin typeface="Times New Roman" panose="02020603050405020304" pitchFamily="18" charset="0"/>
+                        <a:cs typeface="Times New Roman" panose="02020603050405020304" pitchFamily="18" charset="0"/>
+                      </a:endParaRPr>
+                    </a:p>
+                  </a:txBody>
+                  <a:tcPr anchor="ctr"/>
+                </a:tc>
+                <a:extLst>
+                  <a:ext uri="{0D108BD9-81ED-4DB2-BD59-A6C34878D82A}">
+                    <a16:rowId xmlns:a16="http://schemas.microsoft.com/office/drawing/2014/main" val="1515685180"/>
+                  </a:ext>
+                </a:extLst>
+              </a:tr>
+              <a:tr h="370840">
+                <a:tc>
+                  <a:txBody>
+                    <a:bodyPr/>
+                    <a:lstStyle/>
+                    <a:p>
+                      <a:pPr algn="ctr"/>
+                      <a:r>
+                        <a:rPr lang="en-IN" dirty="0" smtClean="0">
+                          <a:latin typeface="Times New Roman" panose="02020603050405020304" pitchFamily="18" charset="0"/>
+                          <a:cs typeface="Times New Roman" panose="02020603050405020304" pitchFamily="18" charset="0"/>
+                        </a:rPr>
+                        <a:t>0x05</a:t>
+                      </a:r>
+                      <a:endParaRPr lang="en-IN" dirty="0">
+                        <a:latin typeface="Times New Roman" panose="02020603050405020304" pitchFamily="18" charset="0"/>
+                        <a:cs typeface="Times New Roman" panose="02020603050405020304" pitchFamily="18" charset="0"/>
+                      </a:endParaRPr>
+                    </a:p>
+                  </a:txBody>
+                  <a:tcPr anchor="ctr"/>
+                </a:tc>
+                <a:tc>
+                  <a:txBody>
+                    <a:bodyPr/>
+                    <a:lstStyle/>
+                    <a:p>
+                      <a:pPr algn="ctr"/>
+                      <a:r>
+                        <a:rPr lang="en-IN" dirty="0" smtClean="0">
+                          <a:latin typeface="Times New Roman" panose="02020603050405020304" pitchFamily="18" charset="0"/>
+                          <a:cs typeface="Times New Roman" panose="02020603050405020304" pitchFamily="18" charset="0"/>
+                        </a:rPr>
+                        <a:t>4 – Float</a:t>
+                      </a:r>
+                      <a:endParaRPr lang="en-IN" dirty="0">
+                        <a:latin typeface="Times New Roman" panose="02020603050405020304" pitchFamily="18" charset="0"/>
+                        <a:cs typeface="Times New Roman" panose="02020603050405020304" pitchFamily="18" charset="0"/>
+                      </a:endParaRPr>
+                    </a:p>
+                  </a:txBody>
+                  <a:tcPr anchor="ctr"/>
+                </a:tc>
+                <a:tc>
+                  <a:txBody>
+                    <a:bodyPr/>
+                    <a:lstStyle/>
+                    <a:p>
+                      <a:pPr algn="l"/>
+                      <a:r>
+                        <a:rPr lang="en-IN" baseline="0" dirty="0" smtClean="0">
+                          <a:latin typeface="Times New Roman" panose="02020603050405020304" pitchFamily="18" charset="0"/>
+                          <a:cs typeface="Times New Roman" panose="02020603050405020304" pitchFamily="18" charset="0"/>
+                        </a:rPr>
+                        <a:t>Horizontal Accuracy</a:t>
+                      </a:r>
+                    </a:p>
+                  </a:txBody>
+                  <a:tcPr anchor="ctr"/>
+                </a:tc>
+                <a:extLst>
+                  <a:ext uri="{0D108BD9-81ED-4DB2-BD59-A6C34878D82A}">
+                    <a16:rowId xmlns:a16="http://schemas.microsoft.com/office/drawing/2014/main" val="2547034353"/>
+                  </a:ext>
+                </a:extLst>
+              </a:tr>
+              <a:tr h="370840">
+                <a:tc>
+                  <a:txBody>
+                    <a:bodyPr/>
+                    <a:lstStyle/>
+                    <a:p>
+                      <a:pPr algn="ctr"/>
+                      <a:r>
+                        <a:rPr lang="en-IN" dirty="0" smtClean="0">
+                          <a:latin typeface="Times New Roman" panose="02020603050405020304" pitchFamily="18" charset="0"/>
+                          <a:cs typeface="Times New Roman" panose="02020603050405020304" pitchFamily="18" charset="0"/>
+                        </a:rPr>
+                        <a:t>0x06</a:t>
+                      </a:r>
+                      <a:endParaRPr lang="en-IN" dirty="0">
+                        <a:latin typeface="Times New Roman" panose="02020603050405020304" pitchFamily="18" charset="0"/>
+                        <a:cs typeface="Times New Roman" panose="02020603050405020304" pitchFamily="18" charset="0"/>
+                      </a:endParaRPr>
+                    </a:p>
+                  </a:txBody>
+                  <a:tcPr anchor="ctr"/>
+                </a:tc>
+                <a:tc>
+                  <a:txBody>
+                    <a:bodyPr/>
+                    <a:lstStyle/>
+                    <a:p>
+                      <a:pPr algn="ctr"/>
+                      <a:r>
+                        <a:rPr lang="en-IN" dirty="0" smtClean="0">
+                          <a:latin typeface="Times New Roman" panose="02020603050405020304" pitchFamily="18" charset="0"/>
+                          <a:cs typeface="Times New Roman" panose="02020603050405020304" pitchFamily="18" charset="0"/>
+                        </a:rPr>
+                        <a:t>4 – Float</a:t>
+                      </a:r>
+                      <a:endParaRPr lang="en-IN" dirty="0">
+                        <a:latin typeface="Times New Roman" panose="02020603050405020304" pitchFamily="18" charset="0"/>
+                        <a:cs typeface="Times New Roman" panose="02020603050405020304" pitchFamily="18" charset="0"/>
+                      </a:endParaRPr>
+                    </a:p>
+                  </a:txBody>
+                  <a:tcPr anchor="ctr"/>
+                </a:tc>
+                <a:tc>
+                  <a:txBody>
+                    <a:bodyPr/>
+                    <a:lstStyle/>
+                    <a:p>
+                      <a:pPr algn="l"/>
+                      <a:r>
+                        <a:rPr lang="en-IN" baseline="0" dirty="0" smtClean="0">
+                          <a:latin typeface="Times New Roman" panose="02020603050405020304" pitchFamily="18" charset="0"/>
+                          <a:cs typeface="Times New Roman" panose="02020603050405020304" pitchFamily="18" charset="0"/>
+                        </a:rPr>
+                        <a:t>Vertical Accuracy</a:t>
+                      </a:r>
+                    </a:p>
+                  </a:txBody>
+                  <a:tcPr anchor="ctr"/>
+                </a:tc>
+                <a:extLst>
+                  <a:ext uri="{0D108BD9-81ED-4DB2-BD59-A6C34878D82A}">
+                    <a16:rowId xmlns:a16="http://schemas.microsoft.com/office/drawing/2014/main" val="3376754302"/>
+                  </a:ext>
+                </a:extLst>
+              </a:tr>
+              <a:tr h="370840">
+                <a:tc>
+                  <a:txBody>
+                    <a:bodyPr/>
+                    <a:lstStyle/>
+                    <a:p>
+                      <a:pPr algn="ctr"/>
+                      <a:r>
+                        <a:rPr lang="en-IN" dirty="0" smtClean="0">
+                          <a:latin typeface="Times New Roman" panose="02020603050405020304" pitchFamily="18" charset="0"/>
+                          <a:cs typeface="Times New Roman" panose="02020603050405020304" pitchFamily="18" charset="0"/>
+                        </a:rPr>
+                        <a:t>0x07</a:t>
+                      </a:r>
+                      <a:endParaRPr lang="en-IN" dirty="0">
+                        <a:latin typeface="Times New Roman" panose="02020603050405020304" pitchFamily="18" charset="0"/>
+                        <a:cs typeface="Times New Roman" panose="02020603050405020304" pitchFamily="18" charset="0"/>
+                      </a:endParaRPr>
+                    </a:p>
+                  </a:txBody>
+                  <a:tcPr anchor="ctr"/>
+                </a:tc>
+                <a:tc>
+                  <a:txBody>
+                    <a:bodyPr/>
+                    <a:lstStyle/>
+                    <a:p>
+                      <a:pPr algn="ctr"/>
+                      <a:r>
+                        <a:rPr lang="en-IN" dirty="0" smtClean="0">
+                          <a:latin typeface="Times New Roman" panose="02020603050405020304" pitchFamily="18" charset="0"/>
+                          <a:cs typeface="Times New Roman" panose="02020603050405020304" pitchFamily="18" charset="0"/>
+                        </a:rPr>
+                        <a:t>4 - Float</a:t>
+                      </a:r>
+                      <a:endParaRPr lang="en-IN" dirty="0">
+                        <a:latin typeface="Times New Roman" panose="02020603050405020304" pitchFamily="18" charset="0"/>
+                        <a:cs typeface="Times New Roman" panose="02020603050405020304" pitchFamily="18" charset="0"/>
+                      </a:endParaRPr>
+                    </a:p>
+                  </a:txBody>
+                  <a:tcPr anchor="ctr"/>
+                </a:tc>
+                <a:tc>
+                  <a:txBody>
+                    <a:bodyPr/>
+                    <a:lstStyle/>
+                    <a:p>
+                      <a:pPr algn="l"/>
+                      <a:r>
+                        <a:rPr lang="en-IN" baseline="0" dirty="0" smtClean="0">
+                          <a:latin typeface="Times New Roman" panose="02020603050405020304" pitchFamily="18" charset="0"/>
+                          <a:cs typeface="Times New Roman" panose="02020603050405020304" pitchFamily="18" charset="0"/>
+                        </a:rPr>
+                        <a:t>Refresh Rate (in </a:t>
+                      </a:r>
+                      <a:r>
+                        <a:rPr lang="en-IN" baseline="0" dirty="0" err="1" smtClean="0">
+                          <a:latin typeface="Times New Roman" panose="02020603050405020304" pitchFamily="18" charset="0"/>
+                          <a:cs typeface="Times New Roman" panose="02020603050405020304" pitchFamily="18" charset="0"/>
+                        </a:rPr>
+                        <a:t>ms</a:t>
+                      </a:r>
+                      <a:r>
+                        <a:rPr lang="en-IN" baseline="0" dirty="0" smtClean="0">
+                          <a:latin typeface="Times New Roman" panose="02020603050405020304" pitchFamily="18" charset="0"/>
+                          <a:cs typeface="Times New Roman" panose="02020603050405020304" pitchFamily="18" charset="0"/>
+                        </a:rPr>
+                        <a:t>)</a:t>
+                      </a:r>
+                    </a:p>
+                  </a:txBody>
+                  <a:tcPr anchor="ctr"/>
+                </a:tc>
+                <a:extLst>
+                  <a:ext uri="{0D108BD9-81ED-4DB2-BD59-A6C34878D82A}">
+                    <a16:rowId xmlns:a16="http://schemas.microsoft.com/office/drawing/2014/main" val="242766362"/>
+                  </a:ext>
+                </a:extLst>
+              </a:tr>
+            </a:tbl>
+          </a:graphicData>
+        </a:graphic>
+      </p:graphicFrame>
+    </p:spTree>
+    <p:extLst>
+      <p:ext uri="{BB962C8B-B14F-4D97-AF65-F5344CB8AC3E}">
+        <p14:creationId xmlns:p14="http://schemas.microsoft.com/office/powerpoint/2010/main" val="1242421862"/>
+      </p:ext>
+    </p:extLst>
+  </p:cSld>
+  <p:clrMapOvr>
+    <a:masterClrMapping/>
+  </p:clrMapOvr>
+</p:sld>
+</file>
+
+<file path=ppt/slides/slide5.xml><?xml version="1.0" encoding="utf-8"?>
+<p:sld xmlns:a="http://schemas.openxmlformats.org/drawingml/2006/main" xmlns:r="http://schemas.openxmlformats.org/officeDocument/2006/relationships" xmlns:p="http://schemas.openxmlformats.org/presentationml/2006/main">
+  <p:cSld>
+    <p:spTree>
+      <p:nvGrpSpPr>
+        <p:cNvPr id="1" name=""/>
+        <p:cNvGrpSpPr/>
+        <p:nvPr/>
+      </p:nvGrpSpPr>
+      <p:grpSpPr>
+        <a:xfrm>
+          <a:off x="0" y="0"/>
+          <a:ext cx="0" cy="0"/>
+          <a:chOff x="0" y="0"/>
+          <a:chExt cx="0" cy="0"/>
+        </a:xfrm>
+      </p:grpSpPr>
+      <p:sp>
+        <p:nvSpPr>
+          <p:cNvPr id="2" name="Title 1"/>
+          <p:cNvSpPr>
+            <a:spLocks noGrp="1"/>
+          </p:cNvSpPr>
+          <p:nvPr>
+            <p:ph type="title"/>
+          </p:nvPr>
+        </p:nvSpPr>
+        <p:spPr/>
+        <p:txBody>
+          <a:bodyPr/>
+          <a:lstStyle/>
+          <a:p>
+            <a:pPr algn="ctr"/>
+            <a:r>
+              <a:rPr lang="en-IN" dirty="0" smtClean="0">
+                <a:latin typeface="Times New Roman" panose="02020603050405020304" pitchFamily="18" charset="0"/>
+                <a:cs typeface="Times New Roman" panose="02020603050405020304" pitchFamily="18" charset="0"/>
+              </a:rPr>
+              <a:t>Relative Position Subsystem Register Structure</a:t>
+            </a:r>
+            <a:endParaRPr lang="en-IN" dirty="0">
+              <a:latin typeface="Times New Roman" panose="02020603050405020304" pitchFamily="18" charset="0"/>
+              <a:cs typeface="Times New Roman" panose="02020603050405020304" pitchFamily="18" charset="0"/>
+            </a:endParaRPr>
+          </a:p>
+        </p:txBody>
+      </p:sp>
+      <p:graphicFrame>
+        <p:nvGraphicFramePr>
+          <p:cNvPr id="6" name="Table 5"/>
+          <p:cNvGraphicFramePr>
+            <a:graphicFrameLocks noGrp="1"/>
+          </p:cNvGraphicFramePr>
+          <p:nvPr>
+            <p:extLst>
+              <p:ext uri="{D42A27DB-BD31-4B8C-83A1-F6EECF244321}">
+                <p14:modId xmlns:p14="http://schemas.microsoft.com/office/powerpoint/2010/main" val="368017334"/>
+              </p:ext>
+            </p:extLst>
+          </p:nvPr>
+        </p:nvGraphicFramePr>
+        <p:xfrm>
+          <a:off x="2870866" y="2613114"/>
+          <a:ext cx="6450267" cy="2225040"/>
+        </p:xfrm>
+        <a:graphic>
+          <a:graphicData uri="http://schemas.openxmlformats.org/drawingml/2006/table">
+            <a:tbl>
+              <a:tblPr firstRow="1" bandRow="1">
+                <a:tableStyleId>{5C22544A-7EE6-4342-B048-85BDC9FD1C3A}</a:tableStyleId>
+              </a:tblPr>
+              <a:tblGrid>
+                <a:gridCol w="1889189">
+                  <a:extLst>
+                    <a:ext uri="{9D8B030D-6E8A-4147-A177-3AD203B41FA5}">
+                      <a16:colId xmlns:a16="http://schemas.microsoft.com/office/drawing/2014/main" val="4095292889"/>
+                    </a:ext>
+                  </a:extLst>
+                </a:gridCol>
+                <a:gridCol w="2422398">
+                  <a:extLst>
+                    <a:ext uri="{9D8B030D-6E8A-4147-A177-3AD203B41FA5}">
+                      <a16:colId xmlns:a16="http://schemas.microsoft.com/office/drawing/2014/main" val="2435405040"/>
+                    </a:ext>
+                  </a:extLst>
+                </a:gridCol>
+                <a:gridCol w="2138680">
+                  <a:extLst>
+                    <a:ext uri="{9D8B030D-6E8A-4147-A177-3AD203B41FA5}">
+                      <a16:colId xmlns:a16="http://schemas.microsoft.com/office/drawing/2014/main" val="3149681256"/>
+                    </a:ext>
+                  </a:extLst>
+                </a:gridCol>
+              </a:tblGrid>
+              <a:tr h="370840">
+                <a:tc>
+                  <a:txBody>
+                    <a:bodyPr/>
+                    <a:lstStyle/>
+                    <a:p>
+                      <a:pPr algn="ctr"/>
+                      <a:r>
+                        <a:rPr lang="en-IN" dirty="0" smtClean="0">
+                          <a:latin typeface="Times New Roman" panose="02020603050405020304" pitchFamily="18" charset="0"/>
+                          <a:cs typeface="Times New Roman" panose="02020603050405020304" pitchFamily="18" charset="0"/>
+                        </a:rPr>
+                        <a:t>Register</a:t>
+                      </a:r>
+                      <a:r>
+                        <a:rPr lang="en-IN" baseline="0" dirty="0" smtClean="0">
+                          <a:latin typeface="Times New Roman" panose="02020603050405020304" pitchFamily="18" charset="0"/>
+                          <a:cs typeface="Times New Roman" panose="02020603050405020304" pitchFamily="18" charset="0"/>
+                        </a:rPr>
+                        <a:t> Address</a:t>
+                      </a:r>
+                      <a:endParaRPr lang="en-IN" dirty="0">
+                        <a:latin typeface="Times New Roman" panose="02020603050405020304" pitchFamily="18" charset="0"/>
+                        <a:cs typeface="Times New Roman" panose="02020603050405020304" pitchFamily="18" charset="0"/>
+                      </a:endParaRPr>
+                    </a:p>
+                  </a:txBody>
+                  <a:tcPr anchor="ctr"/>
+                </a:tc>
+                <a:tc>
+                  <a:txBody>
+                    <a:bodyPr/>
+                    <a:lstStyle/>
+                    <a:p>
+                      <a:pPr algn="ctr"/>
+                      <a:r>
+                        <a:rPr lang="en-IN" dirty="0" smtClean="0">
+                          <a:latin typeface="Times New Roman" panose="02020603050405020304" pitchFamily="18" charset="0"/>
+                          <a:cs typeface="Times New Roman" panose="02020603050405020304" pitchFamily="18" charset="0"/>
+                        </a:rPr>
+                        <a:t>Data Type and Length</a:t>
+                      </a:r>
+                      <a:endParaRPr lang="en-IN" dirty="0">
+                        <a:latin typeface="Times New Roman" panose="02020603050405020304" pitchFamily="18" charset="0"/>
+                        <a:cs typeface="Times New Roman" panose="02020603050405020304" pitchFamily="18" charset="0"/>
+                      </a:endParaRPr>
+                    </a:p>
+                  </a:txBody>
+                  <a:tcPr anchor="ctr"/>
+                </a:tc>
+                <a:tc>
+                  <a:txBody>
+                    <a:bodyPr/>
+                    <a:lstStyle/>
+                    <a:p>
+                      <a:pPr algn="ctr"/>
+                      <a:r>
+                        <a:rPr lang="en-IN" dirty="0" smtClean="0">
+                          <a:latin typeface="Times New Roman" panose="02020603050405020304" pitchFamily="18" charset="0"/>
+                          <a:cs typeface="Times New Roman" panose="02020603050405020304" pitchFamily="18" charset="0"/>
+                        </a:rPr>
+                        <a:t>Description</a:t>
+                      </a:r>
+                      <a:endParaRPr lang="en-IN" dirty="0">
+                        <a:latin typeface="Times New Roman" panose="02020603050405020304" pitchFamily="18" charset="0"/>
+                        <a:cs typeface="Times New Roman" panose="02020603050405020304" pitchFamily="18" charset="0"/>
+                      </a:endParaRPr>
+                    </a:p>
+                  </a:txBody>
+                  <a:tcPr anchor="ctr"/>
+                </a:tc>
+                <a:extLst>
+                  <a:ext uri="{0D108BD9-81ED-4DB2-BD59-A6C34878D82A}">
+                    <a16:rowId xmlns:a16="http://schemas.microsoft.com/office/drawing/2014/main" val="3087072443"/>
+                  </a:ext>
+                </a:extLst>
+              </a:tr>
+              <a:tr h="370840">
+                <a:tc>
+                  <a:txBody>
+                    <a:bodyPr/>
+                    <a:lstStyle/>
+                    <a:p>
+                      <a:pPr algn="ctr"/>
+                      <a:r>
+                        <a:rPr lang="en-IN" dirty="0" smtClean="0">
+                          <a:latin typeface="Times New Roman" panose="02020603050405020304" pitchFamily="18" charset="0"/>
+                          <a:cs typeface="Times New Roman" panose="02020603050405020304" pitchFamily="18" charset="0"/>
+                        </a:rPr>
+                        <a:t>0x01</a:t>
+                      </a:r>
+                      <a:endParaRPr lang="en-IN" dirty="0">
+                        <a:latin typeface="Times New Roman" panose="02020603050405020304" pitchFamily="18" charset="0"/>
+                        <a:cs typeface="Times New Roman" panose="02020603050405020304" pitchFamily="18" charset="0"/>
+                      </a:endParaRPr>
+                    </a:p>
+                  </a:txBody>
+                  <a:tcPr anchor="ctr"/>
+                </a:tc>
+                <a:tc>
+                  <a:txBody>
+                    <a:bodyPr/>
+                    <a:lstStyle/>
+                    <a:p>
+                      <a:pPr algn="ctr"/>
+                      <a:r>
+                        <a:rPr lang="en-IN" dirty="0" smtClean="0">
+                          <a:latin typeface="Times New Roman" panose="02020603050405020304" pitchFamily="18" charset="0"/>
+                          <a:cs typeface="Times New Roman" panose="02020603050405020304" pitchFamily="18" charset="0"/>
+                        </a:rPr>
+                        <a:t>1 – U </a:t>
+                      </a:r>
+                      <a:r>
+                        <a:rPr lang="en-IN" dirty="0" err="1" smtClean="0">
+                          <a:latin typeface="Times New Roman" panose="02020603050405020304" pitchFamily="18" charset="0"/>
+                          <a:cs typeface="Times New Roman" panose="02020603050405020304" pitchFamily="18" charset="0"/>
+                        </a:rPr>
+                        <a:t>Int</a:t>
+                      </a:r>
+                      <a:endParaRPr lang="en-IN" dirty="0">
+                        <a:latin typeface="Times New Roman" panose="02020603050405020304" pitchFamily="18" charset="0"/>
+                        <a:cs typeface="Times New Roman" panose="02020603050405020304" pitchFamily="18" charset="0"/>
+                      </a:endParaRPr>
+                    </a:p>
+                  </a:txBody>
+                  <a:tcPr anchor="ctr"/>
+                </a:tc>
+                <a:tc>
+                  <a:txBody>
+                    <a:bodyPr/>
+                    <a:lstStyle/>
+                    <a:p>
+                      <a:pPr algn="l"/>
+                      <a:r>
+                        <a:rPr lang="en-IN" dirty="0" smtClean="0">
+                          <a:latin typeface="Times New Roman" panose="02020603050405020304" pitchFamily="18" charset="0"/>
+                          <a:cs typeface="Times New Roman" panose="02020603050405020304" pitchFamily="18" charset="0"/>
+                        </a:rPr>
+                        <a:t>Type of Subsystem</a:t>
+                      </a:r>
+                      <a:endParaRPr lang="en-IN" dirty="0">
+                        <a:latin typeface="Times New Roman" panose="02020603050405020304" pitchFamily="18" charset="0"/>
+                        <a:cs typeface="Times New Roman" panose="02020603050405020304" pitchFamily="18" charset="0"/>
+                      </a:endParaRPr>
+                    </a:p>
+                  </a:txBody>
+                  <a:tcPr anchor="ctr"/>
+                </a:tc>
+                <a:extLst>
+                  <a:ext uri="{0D108BD9-81ED-4DB2-BD59-A6C34878D82A}">
+                    <a16:rowId xmlns:a16="http://schemas.microsoft.com/office/drawing/2014/main" val="3363853376"/>
+                  </a:ext>
+                </a:extLst>
+              </a:tr>
+              <a:tr h="370840">
+                <a:tc>
+                  <a:txBody>
+                    <a:bodyPr/>
+                    <a:lstStyle/>
+                    <a:p>
+                      <a:pPr algn="ctr"/>
+                      <a:r>
+                        <a:rPr lang="en-IN" dirty="0" smtClean="0">
+                          <a:latin typeface="Times New Roman" panose="02020603050405020304" pitchFamily="18" charset="0"/>
+                          <a:cs typeface="Times New Roman" panose="02020603050405020304" pitchFamily="18" charset="0"/>
+                        </a:rPr>
+                        <a:t>0x02</a:t>
+                      </a:r>
+                      <a:endParaRPr lang="en-IN" dirty="0">
+                        <a:latin typeface="Times New Roman" panose="02020603050405020304" pitchFamily="18" charset="0"/>
+                        <a:cs typeface="Times New Roman" panose="02020603050405020304" pitchFamily="18" charset="0"/>
+                      </a:endParaRPr>
+                    </a:p>
+                  </a:txBody>
+                  <a:tcPr anchor="ctr"/>
+                </a:tc>
+                <a:tc>
+                  <a:txBody>
+                    <a:bodyPr/>
+                    <a:lstStyle/>
+                    <a:p>
+                      <a:pPr algn="ctr"/>
+                      <a:r>
+                        <a:rPr lang="en-IN" dirty="0" smtClean="0">
+                          <a:latin typeface="Times New Roman" panose="02020603050405020304" pitchFamily="18" charset="0"/>
+                          <a:cs typeface="Times New Roman" panose="02020603050405020304" pitchFamily="18" charset="0"/>
+                        </a:rPr>
+                        <a:t>4 – Float</a:t>
+                      </a:r>
+                      <a:endParaRPr lang="en-IN" dirty="0">
+                        <a:latin typeface="Times New Roman" panose="02020603050405020304" pitchFamily="18" charset="0"/>
+                        <a:cs typeface="Times New Roman" panose="02020603050405020304" pitchFamily="18" charset="0"/>
+                      </a:endParaRPr>
+                    </a:p>
+                  </a:txBody>
+                  <a:tcPr anchor="ctr"/>
+                </a:tc>
+                <a:tc>
+                  <a:txBody>
+                    <a:bodyPr/>
+                    <a:lstStyle/>
+                    <a:p>
+                      <a:pPr algn="l"/>
+                      <a:r>
+                        <a:rPr lang="en-IN" dirty="0" smtClean="0">
+                          <a:latin typeface="Times New Roman" panose="02020603050405020304" pitchFamily="18" charset="0"/>
+                          <a:cs typeface="Times New Roman" panose="02020603050405020304" pitchFamily="18" charset="0"/>
+                        </a:rPr>
+                        <a:t>X-Value</a:t>
+                      </a:r>
+                      <a:endParaRPr lang="en-IN" dirty="0">
+                        <a:latin typeface="Times New Roman" panose="02020603050405020304" pitchFamily="18" charset="0"/>
+                        <a:cs typeface="Times New Roman" panose="02020603050405020304" pitchFamily="18" charset="0"/>
+                      </a:endParaRPr>
+                    </a:p>
+                  </a:txBody>
+                  <a:tcPr anchor="ctr"/>
+                </a:tc>
+                <a:extLst>
+                  <a:ext uri="{0D108BD9-81ED-4DB2-BD59-A6C34878D82A}">
+                    <a16:rowId xmlns:a16="http://schemas.microsoft.com/office/drawing/2014/main" val="1596704810"/>
+                  </a:ext>
+                </a:extLst>
+              </a:tr>
+              <a:tr h="370840">
+                <a:tc>
+                  <a:txBody>
+                    <a:bodyPr/>
+                    <a:lstStyle/>
+                    <a:p>
+                      <a:pPr algn="ctr"/>
+                      <a:r>
+                        <a:rPr lang="en-IN" dirty="0" smtClean="0">
+                          <a:latin typeface="Times New Roman" panose="02020603050405020304" pitchFamily="18" charset="0"/>
+                          <a:cs typeface="Times New Roman" panose="02020603050405020304" pitchFamily="18" charset="0"/>
+                        </a:rPr>
+                        <a:t>0x03</a:t>
+                      </a:r>
+                      <a:endParaRPr lang="en-IN" dirty="0">
+                        <a:latin typeface="Times New Roman" panose="02020603050405020304" pitchFamily="18" charset="0"/>
+                        <a:cs typeface="Times New Roman" panose="02020603050405020304" pitchFamily="18" charset="0"/>
+                      </a:endParaRPr>
+                    </a:p>
+                  </a:txBody>
+                  <a:tcPr anchor="ctr"/>
+                </a:tc>
+                <a:tc>
+                  <a:txBody>
+                    <a:bodyPr/>
+                    <a:lstStyle/>
+                    <a:p>
+                      <a:pPr algn="ctr"/>
+                      <a:r>
+                        <a:rPr lang="en-IN" dirty="0" smtClean="0">
+                          <a:latin typeface="Times New Roman" panose="02020603050405020304" pitchFamily="18" charset="0"/>
+                          <a:cs typeface="Times New Roman" panose="02020603050405020304" pitchFamily="18" charset="0"/>
+                        </a:rPr>
+                        <a:t>4 – Float </a:t>
+                      </a:r>
+                      <a:endParaRPr lang="en-IN" dirty="0">
+                        <a:latin typeface="Times New Roman" panose="02020603050405020304" pitchFamily="18" charset="0"/>
+                        <a:cs typeface="Times New Roman" panose="02020603050405020304" pitchFamily="18" charset="0"/>
+                      </a:endParaRPr>
+                    </a:p>
+                  </a:txBody>
+                  <a:tcPr anchor="ctr"/>
+                </a:tc>
+                <a:tc>
+                  <a:txBody>
+                    <a:bodyPr/>
+                    <a:lstStyle/>
+                    <a:p>
+                      <a:pPr algn="l"/>
+                      <a:r>
+                        <a:rPr lang="en-IN" dirty="0" smtClean="0">
+                          <a:latin typeface="Times New Roman" panose="02020603050405020304" pitchFamily="18" charset="0"/>
+                          <a:cs typeface="Times New Roman" panose="02020603050405020304" pitchFamily="18" charset="0"/>
+                        </a:rPr>
+                        <a:t>Y-Value</a:t>
+                      </a:r>
+                      <a:endParaRPr lang="en-IN" dirty="0">
+                        <a:latin typeface="Times New Roman" panose="02020603050405020304" pitchFamily="18" charset="0"/>
+                        <a:cs typeface="Times New Roman" panose="02020603050405020304" pitchFamily="18" charset="0"/>
+                      </a:endParaRPr>
+                    </a:p>
+                  </a:txBody>
+                  <a:tcPr anchor="ctr"/>
+                </a:tc>
+                <a:extLst>
+                  <a:ext uri="{0D108BD9-81ED-4DB2-BD59-A6C34878D82A}">
+                    <a16:rowId xmlns:a16="http://schemas.microsoft.com/office/drawing/2014/main" val="621665701"/>
+                  </a:ext>
+                </a:extLst>
+              </a:tr>
+              <a:tr h="370840">
+                <a:tc>
+                  <a:txBody>
+                    <a:bodyPr/>
+                    <a:lstStyle/>
+                    <a:p>
+                      <a:pPr algn="ctr"/>
+                      <a:r>
+                        <a:rPr lang="en-IN" dirty="0" smtClean="0">
+                          <a:latin typeface="Times New Roman" panose="02020603050405020304" pitchFamily="18" charset="0"/>
+                          <a:cs typeface="Times New Roman" panose="02020603050405020304" pitchFamily="18" charset="0"/>
+                        </a:rPr>
+                        <a:t>0x04</a:t>
+                      </a:r>
+                      <a:endParaRPr lang="en-IN" dirty="0">
+                        <a:latin typeface="Times New Roman" panose="02020603050405020304" pitchFamily="18" charset="0"/>
+                        <a:cs typeface="Times New Roman" panose="02020603050405020304" pitchFamily="18" charset="0"/>
+                      </a:endParaRPr>
+                    </a:p>
+                  </a:txBody>
+                  <a:tcPr anchor="ctr"/>
+                </a:tc>
+                <a:tc>
+                  <a:txBody>
+                    <a:bodyPr/>
+                    <a:lstStyle/>
+                    <a:p>
+                      <a:pPr algn="ctr"/>
+                      <a:r>
+                        <a:rPr lang="en-IN" dirty="0" smtClean="0">
+                          <a:latin typeface="Times New Roman" panose="02020603050405020304" pitchFamily="18" charset="0"/>
+                          <a:cs typeface="Times New Roman" panose="02020603050405020304" pitchFamily="18" charset="0"/>
+                        </a:rPr>
+                        <a:t>4 – Float</a:t>
+                      </a:r>
+                      <a:endParaRPr lang="en-IN" dirty="0">
+                        <a:latin typeface="Times New Roman" panose="02020603050405020304" pitchFamily="18" charset="0"/>
+                        <a:cs typeface="Times New Roman" panose="02020603050405020304" pitchFamily="18" charset="0"/>
+                      </a:endParaRPr>
+                    </a:p>
+                  </a:txBody>
+                  <a:tcPr anchor="ctr"/>
+                </a:tc>
+                <a:tc>
+                  <a:txBody>
+                    <a:bodyPr/>
+                    <a:lstStyle/>
+                    <a:p>
+                      <a:pPr algn="l"/>
+                      <a:r>
+                        <a:rPr lang="en-IN" dirty="0" smtClean="0">
+                          <a:latin typeface="Times New Roman" panose="02020603050405020304" pitchFamily="18" charset="0"/>
+                          <a:cs typeface="Times New Roman" panose="02020603050405020304" pitchFamily="18" charset="0"/>
+                        </a:rPr>
+                        <a:t>Z-Value</a:t>
+                      </a:r>
+                      <a:endParaRPr lang="en-IN" dirty="0">
+                        <a:latin typeface="Times New Roman" panose="02020603050405020304" pitchFamily="18" charset="0"/>
+                        <a:cs typeface="Times New Roman" panose="02020603050405020304" pitchFamily="18" charset="0"/>
+                      </a:endParaRPr>
+                    </a:p>
+                  </a:txBody>
+                  <a:tcPr anchor="ctr"/>
+                </a:tc>
+                <a:extLst>
+                  <a:ext uri="{0D108BD9-81ED-4DB2-BD59-A6C34878D82A}">
+                    <a16:rowId xmlns:a16="http://schemas.microsoft.com/office/drawing/2014/main" val="1515685180"/>
+                  </a:ext>
+                </a:extLst>
+              </a:tr>
+              <a:tr h="370840">
+                <a:tc>
+                  <a:txBody>
+                    <a:bodyPr/>
+                    <a:lstStyle/>
+                    <a:p>
+                      <a:pPr algn="ctr"/>
+                      <a:r>
+                        <a:rPr lang="en-IN" dirty="0" smtClean="0">
+                          <a:latin typeface="Times New Roman" panose="02020603050405020304" pitchFamily="18" charset="0"/>
+                          <a:cs typeface="Times New Roman" panose="02020603050405020304" pitchFamily="18" charset="0"/>
+                        </a:rPr>
+                        <a:t>0x05</a:t>
+                      </a:r>
+                      <a:endParaRPr lang="en-IN" dirty="0">
+                        <a:latin typeface="Times New Roman" panose="02020603050405020304" pitchFamily="18" charset="0"/>
+                        <a:cs typeface="Times New Roman" panose="02020603050405020304" pitchFamily="18" charset="0"/>
+                      </a:endParaRPr>
+                    </a:p>
+                  </a:txBody>
+                  <a:tcPr anchor="ctr"/>
+                </a:tc>
+                <a:tc>
+                  <a:txBody>
+                    <a:bodyPr/>
+                    <a:lstStyle/>
+                    <a:p>
+                      <a:pPr algn="ctr"/>
+                      <a:r>
+                        <a:rPr lang="en-IN" dirty="0" smtClean="0">
+                          <a:latin typeface="Times New Roman" panose="02020603050405020304" pitchFamily="18" charset="0"/>
+                          <a:cs typeface="Times New Roman" panose="02020603050405020304" pitchFamily="18" charset="0"/>
+                        </a:rPr>
+                        <a:t>4 – Float</a:t>
+                      </a:r>
+                      <a:endParaRPr lang="en-IN" dirty="0">
+                        <a:latin typeface="Times New Roman" panose="02020603050405020304" pitchFamily="18" charset="0"/>
+                        <a:cs typeface="Times New Roman" panose="02020603050405020304" pitchFamily="18" charset="0"/>
+                      </a:endParaRPr>
+                    </a:p>
+                  </a:txBody>
+                  <a:tcPr anchor="ctr"/>
+                </a:tc>
+                <a:tc>
+                  <a:txBody>
+                    <a:bodyPr/>
+                    <a:lstStyle/>
+                    <a:p>
+                      <a:pPr algn="l"/>
+                      <a:r>
+                        <a:rPr lang="en-IN" baseline="0" dirty="0" smtClean="0">
+                          <a:latin typeface="Times New Roman" panose="02020603050405020304" pitchFamily="18" charset="0"/>
+                          <a:cs typeface="Times New Roman" panose="02020603050405020304" pitchFamily="18" charset="0"/>
+                        </a:rPr>
+                        <a:t>Refresh Rate (in </a:t>
+                      </a:r>
+                      <a:r>
+                        <a:rPr lang="en-IN" baseline="0" dirty="0" err="1" smtClean="0">
+                          <a:latin typeface="Times New Roman" panose="02020603050405020304" pitchFamily="18" charset="0"/>
+                          <a:cs typeface="Times New Roman" panose="02020603050405020304" pitchFamily="18" charset="0"/>
+                        </a:rPr>
+                        <a:t>ms</a:t>
+                      </a:r>
+                      <a:r>
+                        <a:rPr lang="en-IN" baseline="0" dirty="0" smtClean="0">
+                          <a:latin typeface="Times New Roman" panose="02020603050405020304" pitchFamily="18" charset="0"/>
+                          <a:cs typeface="Times New Roman" panose="02020603050405020304" pitchFamily="18" charset="0"/>
+                        </a:rPr>
+                        <a:t>)</a:t>
+                      </a:r>
+                    </a:p>
+                  </a:txBody>
+                  <a:tcPr anchor="ctr"/>
+                </a:tc>
+                <a:extLst>
+                  <a:ext uri="{0D108BD9-81ED-4DB2-BD59-A6C34878D82A}">
+                    <a16:rowId xmlns:a16="http://schemas.microsoft.com/office/drawing/2014/main" val="2547034353"/>
+                  </a:ext>
+                </a:extLst>
+              </a:tr>
+            </a:tbl>
+          </a:graphicData>
+        </a:graphic>
+      </p:graphicFrame>
+    </p:spTree>
+    <p:extLst>
+      <p:ext uri="{BB962C8B-B14F-4D97-AF65-F5344CB8AC3E}">
+        <p14:creationId xmlns:p14="http://schemas.microsoft.com/office/powerpoint/2010/main" val="3501085859"/>
+      </p:ext>
+    </p:extLst>
+  </p:cSld>
+  <p:clrMapOvr>
+    <a:masterClrMapping/>
+  </p:clrMapOvr>
+</p:sld>
+</file>
+
+<file path=ppt/slides/slide6.xml><?xml version="1.0" encoding="utf-8"?>
+<p:sld xmlns:a="http://schemas.openxmlformats.org/drawingml/2006/main" xmlns:r="http://schemas.openxmlformats.org/officeDocument/2006/relationships" xmlns:p="http://schemas.openxmlformats.org/presentationml/2006/main">
+  <p:cSld>
+    <p:spTree>
+      <p:nvGrpSpPr>
+        <p:cNvPr id="1" name=""/>
+        <p:cNvGrpSpPr/>
+        <p:nvPr/>
+      </p:nvGrpSpPr>
+      <p:grpSpPr>
+        <a:xfrm>
+          <a:off x="0" y="0"/>
+          <a:ext cx="0" cy="0"/>
+          <a:chOff x="0" y="0"/>
+          <a:chExt cx="0" cy="0"/>
+        </a:xfrm>
+      </p:grpSpPr>
+      <p:sp>
+        <p:nvSpPr>
+          <p:cNvPr id="2" name="Title 1"/>
+          <p:cNvSpPr>
+            <a:spLocks noGrp="1"/>
+          </p:cNvSpPr>
+          <p:nvPr>
+            <p:ph type="title"/>
+          </p:nvPr>
+        </p:nvSpPr>
+        <p:spPr/>
+        <p:txBody>
+          <a:bodyPr/>
+          <a:lstStyle/>
+          <a:p>
+            <a:pPr algn="ctr"/>
+            <a:r>
+              <a:rPr lang="en-IN" dirty="0" smtClean="0">
+                <a:latin typeface="Times New Roman" panose="02020603050405020304" pitchFamily="18" charset="0"/>
+                <a:cs typeface="Times New Roman" panose="02020603050405020304" pitchFamily="18" charset="0"/>
+              </a:rPr>
+              <a:t>Obstacle Avoidance Subsystem Register Structure</a:t>
+            </a:r>
+            <a:endParaRPr lang="en-IN" dirty="0">
+              <a:latin typeface="Times New Roman" panose="02020603050405020304" pitchFamily="18" charset="0"/>
+              <a:cs typeface="Times New Roman" panose="02020603050405020304" pitchFamily="18" charset="0"/>
+            </a:endParaRPr>
+          </a:p>
+        </p:txBody>
+      </p:sp>
+      <p:graphicFrame>
+        <p:nvGraphicFramePr>
+          <p:cNvPr id="6" name="Table 5"/>
+          <p:cNvGraphicFramePr>
+            <a:graphicFrameLocks noGrp="1"/>
+          </p:cNvGraphicFramePr>
+          <p:nvPr>
+            <p:extLst>
+              <p:ext uri="{D42A27DB-BD31-4B8C-83A1-F6EECF244321}">
+                <p14:modId xmlns:p14="http://schemas.microsoft.com/office/powerpoint/2010/main" val="4201074815"/>
+              </p:ext>
+            </p:extLst>
+          </p:nvPr>
+        </p:nvGraphicFramePr>
+        <p:xfrm>
+          <a:off x="2356516" y="2805619"/>
+          <a:ext cx="7478967" cy="1854200"/>
+        </p:xfrm>
+        <a:graphic>
+          <a:graphicData uri="http://schemas.openxmlformats.org/drawingml/2006/table">
+            <a:tbl>
+              <a:tblPr firstRow="1" bandRow="1">
+                <a:tableStyleId>{5C22544A-7EE6-4342-B048-85BDC9FD1C3A}</a:tableStyleId>
+              </a:tblPr>
+              <a:tblGrid>
+                <a:gridCol w="1889189">
+                  <a:extLst>
+                    <a:ext uri="{9D8B030D-6E8A-4147-A177-3AD203B41FA5}">
+                      <a16:colId xmlns:a16="http://schemas.microsoft.com/office/drawing/2014/main" val="4095292889"/>
+                    </a:ext>
+                  </a:extLst>
+                </a:gridCol>
+                <a:gridCol w="2422398">
+                  <a:extLst>
+                    <a:ext uri="{9D8B030D-6E8A-4147-A177-3AD203B41FA5}">
+                      <a16:colId xmlns:a16="http://schemas.microsoft.com/office/drawing/2014/main" val="2435405040"/>
+                    </a:ext>
+                  </a:extLst>
+                </a:gridCol>
+                <a:gridCol w="3167380">
+                  <a:extLst>
+                    <a:ext uri="{9D8B030D-6E8A-4147-A177-3AD203B41FA5}">
+                      <a16:colId xmlns:a16="http://schemas.microsoft.com/office/drawing/2014/main" val="3149681256"/>
+                    </a:ext>
+                  </a:extLst>
+                </a:gridCol>
+              </a:tblGrid>
+              <a:tr h="370840">
+                <a:tc>
+                  <a:txBody>
+                    <a:bodyPr/>
+                    <a:lstStyle/>
+                    <a:p>
+                      <a:pPr algn="ctr"/>
+                      <a:r>
+                        <a:rPr lang="en-IN" dirty="0" smtClean="0">
+                          <a:latin typeface="Times New Roman" panose="02020603050405020304" pitchFamily="18" charset="0"/>
+                          <a:cs typeface="Times New Roman" panose="02020603050405020304" pitchFamily="18" charset="0"/>
+                        </a:rPr>
+                        <a:t>Register</a:t>
+                      </a:r>
+                      <a:r>
+                        <a:rPr lang="en-IN" baseline="0" dirty="0" smtClean="0">
+                          <a:latin typeface="Times New Roman" panose="02020603050405020304" pitchFamily="18" charset="0"/>
+                          <a:cs typeface="Times New Roman" panose="02020603050405020304" pitchFamily="18" charset="0"/>
+                        </a:rPr>
+                        <a:t> Address</a:t>
+                      </a:r>
+                      <a:endParaRPr lang="en-IN" dirty="0">
+                        <a:latin typeface="Times New Roman" panose="02020603050405020304" pitchFamily="18" charset="0"/>
+                        <a:cs typeface="Times New Roman" panose="02020603050405020304" pitchFamily="18" charset="0"/>
+                      </a:endParaRPr>
+                    </a:p>
+                  </a:txBody>
+                  <a:tcPr anchor="ctr"/>
+                </a:tc>
+                <a:tc>
+                  <a:txBody>
+                    <a:bodyPr/>
+                    <a:lstStyle/>
+                    <a:p>
+                      <a:pPr algn="ctr"/>
+                      <a:r>
+                        <a:rPr lang="en-IN" dirty="0" smtClean="0">
+                          <a:latin typeface="Times New Roman" panose="02020603050405020304" pitchFamily="18" charset="0"/>
+                          <a:cs typeface="Times New Roman" panose="02020603050405020304" pitchFamily="18" charset="0"/>
+                        </a:rPr>
+                        <a:t>Data Type and Length</a:t>
+                      </a:r>
+                      <a:endParaRPr lang="en-IN" dirty="0">
+                        <a:latin typeface="Times New Roman" panose="02020603050405020304" pitchFamily="18" charset="0"/>
+                        <a:cs typeface="Times New Roman" panose="02020603050405020304" pitchFamily="18" charset="0"/>
+                      </a:endParaRPr>
+                    </a:p>
+                  </a:txBody>
+                  <a:tcPr anchor="ctr"/>
+                </a:tc>
+                <a:tc>
+                  <a:txBody>
+                    <a:bodyPr/>
+                    <a:lstStyle/>
+                    <a:p>
+                      <a:pPr algn="ctr"/>
+                      <a:r>
+                        <a:rPr lang="en-IN" dirty="0" smtClean="0">
+                          <a:latin typeface="Times New Roman" panose="02020603050405020304" pitchFamily="18" charset="0"/>
+                          <a:cs typeface="Times New Roman" panose="02020603050405020304" pitchFamily="18" charset="0"/>
+                        </a:rPr>
+                        <a:t>Description</a:t>
+                      </a:r>
+                      <a:endParaRPr lang="en-IN" dirty="0">
+                        <a:latin typeface="Times New Roman" panose="02020603050405020304" pitchFamily="18" charset="0"/>
+                        <a:cs typeface="Times New Roman" panose="02020603050405020304" pitchFamily="18" charset="0"/>
+                      </a:endParaRPr>
+                    </a:p>
+                  </a:txBody>
+                  <a:tcPr anchor="ctr"/>
+                </a:tc>
+                <a:extLst>
+                  <a:ext uri="{0D108BD9-81ED-4DB2-BD59-A6C34878D82A}">
+                    <a16:rowId xmlns:a16="http://schemas.microsoft.com/office/drawing/2014/main" val="3087072443"/>
+                  </a:ext>
+                </a:extLst>
+              </a:tr>
+              <a:tr h="370840">
+                <a:tc>
+                  <a:txBody>
+                    <a:bodyPr/>
+                    <a:lstStyle/>
+                    <a:p>
+                      <a:pPr algn="ctr"/>
+                      <a:r>
+                        <a:rPr lang="en-IN" dirty="0" smtClean="0">
+                          <a:latin typeface="Times New Roman" panose="02020603050405020304" pitchFamily="18" charset="0"/>
+                          <a:cs typeface="Times New Roman" panose="02020603050405020304" pitchFamily="18" charset="0"/>
+                        </a:rPr>
+                        <a:t>0x01</a:t>
+                      </a:r>
+                      <a:endParaRPr lang="en-IN" dirty="0">
+                        <a:latin typeface="Times New Roman" panose="02020603050405020304" pitchFamily="18" charset="0"/>
+                        <a:cs typeface="Times New Roman" panose="02020603050405020304" pitchFamily="18" charset="0"/>
+                      </a:endParaRPr>
+                    </a:p>
+                  </a:txBody>
+                  <a:tcPr anchor="ctr"/>
+                </a:tc>
+                <a:tc>
+                  <a:txBody>
+                    <a:bodyPr/>
+                    <a:lstStyle/>
+                    <a:p>
+                      <a:pPr algn="ctr"/>
+                      <a:r>
+                        <a:rPr lang="en-IN" dirty="0" smtClean="0">
+                          <a:latin typeface="Times New Roman" panose="02020603050405020304" pitchFamily="18" charset="0"/>
+                          <a:cs typeface="Times New Roman" panose="02020603050405020304" pitchFamily="18" charset="0"/>
+                        </a:rPr>
+                        <a:t>1 – U </a:t>
+                      </a:r>
+                      <a:r>
+                        <a:rPr lang="en-IN" dirty="0" err="1" smtClean="0">
+                          <a:latin typeface="Times New Roman" panose="02020603050405020304" pitchFamily="18" charset="0"/>
+                          <a:cs typeface="Times New Roman" panose="02020603050405020304" pitchFamily="18" charset="0"/>
+                        </a:rPr>
+                        <a:t>Int</a:t>
+                      </a:r>
+                      <a:endParaRPr lang="en-IN" dirty="0">
+                        <a:latin typeface="Times New Roman" panose="02020603050405020304" pitchFamily="18" charset="0"/>
+                        <a:cs typeface="Times New Roman" panose="02020603050405020304" pitchFamily="18" charset="0"/>
+                      </a:endParaRPr>
+                    </a:p>
+                  </a:txBody>
+                  <a:tcPr anchor="ctr"/>
+                </a:tc>
+                <a:tc>
+                  <a:txBody>
+                    <a:bodyPr/>
+                    <a:lstStyle/>
+                    <a:p>
+                      <a:pPr algn="l"/>
+                      <a:r>
+                        <a:rPr lang="en-IN" dirty="0" smtClean="0">
+                          <a:latin typeface="Times New Roman" panose="02020603050405020304" pitchFamily="18" charset="0"/>
+                          <a:cs typeface="Times New Roman" panose="02020603050405020304" pitchFamily="18" charset="0"/>
+                        </a:rPr>
+                        <a:t>Reserved (Type of Subsystem)</a:t>
+                      </a:r>
+                      <a:endParaRPr lang="en-IN" dirty="0">
+                        <a:latin typeface="Times New Roman" panose="02020603050405020304" pitchFamily="18" charset="0"/>
+                        <a:cs typeface="Times New Roman" panose="02020603050405020304" pitchFamily="18" charset="0"/>
+                      </a:endParaRPr>
+                    </a:p>
+                  </a:txBody>
+                  <a:tcPr anchor="ctr"/>
+                </a:tc>
+                <a:extLst>
+                  <a:ext uri="{0D108BD9-81ED-4DB2-BD59-A6C34878D82A}">
+                    <a16:rowId xmlns:a16="http://schemas.microsoft.com/office/drawing/2014/main" val="3363853376"/>
+                  </a:ext>
+                </a:extLst>
+              </a:tr>
+              <a:tr h="370840">
+                <a:tc>
+                  <a:txBody>
+                    <a:bodyPr/>
+                    <a:lstStyle/>
+                    <a:p>
+                      <a:pPr algn="ctr"/>
+                      <a:r>
+                        <a:rPr lang="en-IN" dirty="0" smtClean="0">
+                          <a:latin typeface="Times New Roman" panose="02020603050405020304" pitchFamily="18" charset="0"/>
+                          <a:cs typeface="Times New Roman" panose="02020603050405020304" pitchFamily="18" charset="0"/>
+                        </a:rPr>
+                        <a:t>0x02</a:t>
+                      </a:r>
+                      <a:endParaRPr lang="en-IN" dirty="0">
+                        <a:latin typeface="Times New Roman" panose="02020603050405020304" pitchFamily="18" charset="0"/>
+                        <a:cs typeface="Times New Roman" panose="02020603050405020304" pitchFamily="18" charset="0"/>
+                      </a:endParaRPr>
+                    </a:p>
+                  </a:txBody>
+                  <a:tcPr anchor="ctr"/>
+                </a:tc>
+                <a:tc>
+                  <a:txBody>
+                    <a:bodyPr/>
+                    <a:lstStyle/>
+                    <a:p>
+                      <a:pPr algn="ctr"/>
+                      <a:r>
+                        <a:rPr lang="en-IN" dirty="0" smtClean="0">
+                          <a:latin typeface="Times New Roman" panose="02020603050405020304" pitchFamily="18" charset="0"/>
+                          <a:cs typeface="Times New Roman" panose="02020603050405020304" pitchFamily="18" charset="0"/>
+                        </a:rPr>
+                        <a:t>4 – Float</a:t>
+                      </a:r>
+                      <a:endParaRPr lang="en-IN" dirty="0">
+                        <a:latin typeface="Times New Roman" panose="02020603050405020304" pitchFamily="18" charset="0"/>
+                        <a:cs typeface="Times New Roman" panose="02020603050405020304" pitchFamily="18" charset="0"/>
+                      </a:endParaRPr>
+                    </a:p>
+                  </a:txBody>
+                  <a:tcPr anchor="ctr"/>
+                </a:tc>
+                <a:tc>
+                  <a:txBody>
+                    <a:bodyPr/>
+                    <a:lstStyle/>
+                    <a:p>
+                      <a:pPr algn="l"/>
+                      <a:r>
+                        <a:rPr lang="en-IN" dirty="0" smtClean="0">
+                          <a:latin typeface="Times New Roman" panose="02020603050405020304" pitchFamily="18" charset="0"/>
+                          <a:cs typeface="Times New Roman" panose="02020603050405020304" pitchFamily="18" charset="0"/>
+                        </a:rPr>
+                        <a:t>Direction</a:t>
+                      </a:r>
+                      <a:r>
+                        <a:rPr lang="en-IN" baseline="0" dirty="0" smtClean="0">
+                          <a:latin typeface="Times New Roman" panose="02020603050405020304" pitchFamily="18" charset="0"/>
+                          <a:cs typeface="Times New Roman" panose="02020603050405020304" pitchFamily="18" charset="0"/>
+                        </a:rPr>
+                        <a:t> of Obstacle (Degrees)</a:t>
+                      </a:r>
+                      <a:endParaRPr lang="en-IN" dirty="0">
+                        <a:latin typeface="Times New Roman" panose="02020603050405020304" pitchFamily="18" charset="0"/>
+                        <a:cs typeface="Times New Roman" panose="02020603050405020304" pitchFamily="18" charset="0"/>
+                      </a:endParaRPr>
+                    </a:p>
+                  </a:txBody>
+                  <a:tcPr anchor="ctr"/>
+                </a:tc>
+                <a:extLst>
+                  <a:ext uri="{0D108BD9-81ED-4DB2-BD59-A6C34878D82A}">
+                    <a16:rowId xmlns:a16="http://schemas.microsoft.com/office/drawing/2014/main" val="1596704810"/>
+                  </a:ext>
+                </a:extLst>
+              </a:tr>
+              <a:tr h="370840">
+                <a:tc>
+                  <a:txBody>
+                    <a:bodyPr/>
+                    <a:lstStyle/>
+                    <a:p>
+                      <a:pPr algn="ctr"/>
+                      <a:r>
+                        <a:rPr lang="en-IN" dirty="0" smtClean="0">
+                          <a:latin typeface="Times New Roman" panose="02020603050405020304" pitchFamily="18" charset="0"/>
+                          <a:cs typeface="Times New Roman" panose="02020603050405020304" pitchFamily="18" charset="0"/>
+                        </a:rPr>
+                        <a:t>0x03</a:t>
+                      </a:r>
+                      <a:endParaRPr lang="en-IN" dirty="0">
+                        <a:latin typeface="Times New Roman" panose="02020603050405020304" pitchFamily="18" charset="0"/>
+                        <a:cs typeface="Times New Roman" panose="02020603050405020304" pitchFamily="18" charset="0"/>
+                      </a:endParaRPr>
+                    </a:p>
+                  </a:txBody>
+                  <a:tcPr anchor="ctr"/>
+                </a:tc>
+                <a:tc>
+                  <a:txBody>
+                    <a:bodyPr/>
+                    <a:lstStyle/>
+                    <a:p>
+                      <a:pPr algn="ctr"/>
+                      <a:r>
+                        <a:rPr lang="en-IN" dirty="0" smtClean="0">
+                          <a:latin typeface="Times New Roman" panose="02020603050405020304" pitchFamily="18" charset="0"/>
+                          <a:cs typeface="Times New Roman" panose="02020603050405020304" pitchFamily="18" charset="0"/>
+                        </a:rPr>
+                        <a:t>4 – Float </a:t>
+                      </a:r>
+                      <a:endParaRPr lang="en-IN" dirty="0">
+                        <a:latin typeface="Times New Roman" panose="02020603050405020304" pitchFamily="18" charset="0"/>
+                        <a:cs typeface="Times New Roman" panose="02020603050405020304" pitchFamily="18" charset="0"/>
+                      </a:endParaRPr>
+                    </a:p>
+                  </a:txBody>
+                  <a:tcPr anchor="ctr"/>
+                </a:tc>
+                <a:tc>
+                  <a:txBody>
+                    <a:bodyPr/>
+                    <a:lstStyle/>
+                    <a:p>
+                      <a:pPr algn="l"/>
+                      <a:r>
+                        <a:rPr lang="en-IN" dirty="0" smtClean="0">
+                          <a:latin typeface="Times New Roman" panose="02020603050405020304" pitchFamily="18" charset="0"/>
+                          <a:cs typeface="Times New Roman" panose="02020603050405020304" pitchFamily="18" charset="0"/>
+                        </a:rPr>
+                        <a:t>Distance</a:t>
+                      </a:r>
+                      <a:r>
+                        <a:rPr lang="en-IN" baseline="0" dirty="0" smtClean="0">
+                          <a:latin typeface="Times New Roman" panose="02020603050405020304" pitchFamily="18" charset="0"/>
+                          <a:cs typeface="Times New Roman" panose="02020603050405020304" pitchFamily="18" charset="0"/>
+                        </a:rPr>
+                        <a:t> to Impact (Metres)</a:t>
+                      </a:r>
+                      <a:endParaRPr lang="en-IN" dirty="0">
+                        <a:latin typeface="Times New Roman" panose="02020603050405020304" pitchFamily="18" charset="0"/>
+                        <a:cs typeface="Times New Roman" panose="02020603050405020304" pitchFamily="18" charset="0"/>
+                      </a:endParaRPr>
+                    </a:p>
+                  </a:txBody>
+                  <a:tcPr anchor="ctr"/>
+                </a:tc>
+                <a:extLst>
+                  <a:ext uri="{0D108BD9-81ED-4DB2-BD59-A6C34878D82A}">
+                    <a16:rowId xmlns:a16="http://schemas.microsoft.com/office/drawing/2014/main" val="621665701"/>
+                  </a:ext>
+                </a:extLst>
+              </a:tr>
+              <a:tr h="370840">
+                <a:tc>
+                  <a:txBody>
+                    <a:bodyPr/>
+                    <a:lstStyle/>
+                    <a:p>
+                      <a:pPr algn="ctr"/>
+                      <a:r>
+                        <a:rPr lang="en-IN" dirty="0" smtClean="0">
+                          <a:latin typeface="Times New Roman" panose="02020603050405020304" pitchFamily="18" charset="0"/>
+                          <a:cs typeface="Times New Roman" panose="02020603050405020304" pitchFamily="18" charset="0"/>
+                        </a:rPr>
+                        <a:t>0x04</a:t>
+                      </a:r>
+                      <a:endParaRPr lang="en-IN" dirty="0">
+                        <a:latin typeface="Times New Roman" panose="02020603050405020304" pitchFamily="18" charset="0"/>
+                        <a:cs typeface="Times New Roman" panose="02020603050405020304" pitchFamily="18" charset="0"/>
+                      </a:endParaRPr>
+                    </a:p>
+                  </a:txBody>
+                  <a:tcPr anchor="ctr"/>
+                </a:tc>
+                <a:tc>
+                  <a:txBody>
+                    <a:bodyPr/>
+                    <a:lstStyle/>
+                    <a:p>
+                      <a:pPr algn="ctr"/>
+                      <a:r>
+                        <a:rPr lang="en-IN" dirty="0" smtClean="0">
+                          <a:latin typeface="Times New Roman" panose="02020603050405020304" pitchFamily="18" charset="0"/>
+                          <a:cs typeface="Times New Roman" panose="02020603050405020304" pitchFamily="18" charset="0"/>
+                        </a:rPr>
+                        <a:t>4 – Float</a:t>
+                      </a:r>
+                      <a:endParaRPr lang="en-IN" dirty="0">
+                        <a:latin typeface="Times New Roman" panose="02020603050405020304" pitchFamily="18" charset="0"/>
+                        <a:cs typeface="Times New Roman" panose="02020603050405020304" pitchFamily="18" charset="0"/>
+                      </a:endParaRPr>
+                    </a:p>
+                  </a:txBody>
+                  <a:tcPr anchor="ctr"/>
+                </a:tc>
+                <a:tc>
+                  <a:txBody>
+                    <a:bodyPr/>
+                    <a:lstStyle/>
+                    <a:p>
+                      <a:pPr algn="l"/>
+                      <a:r>
+                        <a:rPr lang="en-IN" baseline="0" dirty="0" smtClean="0">
+                          <a:latin typeface="Times New Roman" panose="02020603050405020304" pitchFamily="18" charset="0"/>
+                          <a:cs typeface="Times New Roman" panose="02020603050405020304" pitchFamily="18" charset="0"/>
+                        </a:rPr>
+                        <a:t>Refresh Rate (in </a:t>
+                      </a:r>
+                      <a:r>
+                        <a:rPr lang="en-IN" baseline="0" dirty="0" err="1" smtClean="0">
+                          <a:latin typeface="Times New Roman" panose="02020603050405020304" pitchFamily="18" charset="0"/>
+                          <a:cs typeface="Times New Roman" panose="02020603050405020304" pitchFamily="18" charset="0"/>
+                        </a:rPr>
+                        <a:t>ms</a:t>
+                      </a:r>
+                      <a:r>
+                        <a:rPr lang="en-IN" baseline="0" dirty="0" smtClean="0">
+                          <a:latin typeface="Times New Roman" panose="02020603050405020304" pitchFamily="18" charset="0"/>
+                          <a:cs typeface="Times New Roman" panose="02020603050405020304" pitchFamily="18" charset="0"/>
+                        </a:rPr>
+                        <a:t>)</a:t>
+                      </a:r>
+                    </a:p>
+                  </a:txBody>
+                  <a:tcPr anchor="ctr"/>
+                </a:tc>
+                <a:extLst>
+                  <a:ext uri="{0D108BD9-81ED-4DB2-BD59-A6C34878D82A}">
+                    <a16:rowId xmlns:a16="http://schemas.microsoft.com/office/drawing/2014/main" val="2547034353"/>
+                  </a:ext>
+                </a:extLst>
+              </a:tr>
+            </a:tbl>
+          </a:graphicData>
+        </a:graphic>
+      </p:graphicFrame>
+    </p:spTree>
+    <p:extLst>
+      <p:ext uri="{BB962C8B-B14F-4D97-AF65-F5344CB8AC3E}">
+        <p14:creationId xmlns:p14="http://schemas.microsoft.com/office/powerpoint/2010/main" val="2302047459"/>
+      </p:ext>
+    </p:extLst>
+  </p:cSld>
+  <p:clrMapOvr>
+    <a:masterClrMapping/>
+  </p:clrMapOvr>
+</p:sld>
+</file>
+
+<file path=ppt/slides/slide7.xml><?xml version="1.0" encoding="utf-8"?>
+<p:sld xmlns:a="http://schemas.openxmlformats.org/drawingml/2006/main" xmlns:r="http://schemas.openxmlformats.org/officeDocument/2006/relationships" xmlns:p="http://schemas.openxmlformats.org/presentationml/2006/main">
+  <p:cSld>
+    <p:spTree>
+      <p:nvGrpSpPr>
+        <p:cNvPr id="1" name=""/>
+        <p:cNvGrpSpPr/>
+        <p:nvPr/>
+      </p:nvGrpSpPr>
+      <p:grpSpPr>
+        <a:xfrm>
+          <a:off x="0" y="0"/>
+          <a:ext cx="0" cy="0"/>
+          <a:chOff x="0" y="0"/>
+          <a:chExt cx="0" cy="0"/>
+        </a:xfrm>
+      </p:grpSpPr>
+      <p:sp>
+        <p:nvSpPr>
+          <p:cNvPr id="2" name="Title 1"/>
+          <p:cNvSpPr>
+            <a:spLocks noGrp="1"/>
+          </p:cNvSpPr>
+          <p:nvPr>
+            <p:ph type="title"/>
+          </p:nvPr>
+        </p:nvSpPr>
+        <p:spPr/>
+        <p:txBody>
+          <a:bodyPr/>
+          <a:lstStyle/>
+          <a:p>
+            <a:pPr algn="ctr"/>
+            <a:r>
+              <a:rPr lang="en-IN" dirty="0" smtClean="0">
+                <a:latin typeface="Times New Roman" panose="02020603050405020304" pitchFamily="18" charset="0"/>
+                <a:cs typeface="Times New Roman" panose="02020603050405020304" pitchFamily="18" charset="0"/>
+              </a:rPr>
+              <a:t>Communication Subsystem Register Structure</a:t>
+            </a:r>
+            <a:endParaRPr lang="en-IN" dirty="0">
+              <a:latin typeface="Times New Roman" panose="02020603050405020304" pitchFamily="18" charset="0"/>
+              <a:cs typeface="Times New Roman" panose="02020603050405020304" pitchFamily="18" charset="0"/>
+            </a:endParaRPr>
+          </a:p>
+        </p:txBody>
+      </p:sp>
+      <p:graphicFrame>
+        <p:nvGraphicFramePr>
+          <p:cNvPr id="6" name="Table 5"/>
+          <p:cNvGraphicFramePr>
+            <a:graphicFrameLocks noGrp="1"/>
+          </p:cNvGraphicFramePr>
+          <p:nvPr>
+            <p:extLst>
+              <p:ext uri="{D42A27DB-BD31-4B8C-83A1-F6EECF244321}">
+                <p14:modId xmlns:p14="http://schemas.microsoft.com/office/powerpoint/2010/main" val="115687776"/>
+              </p:ext>
+            </p:extLst>
+          </p:nvPr>
+        </p:nvGraphicFramePr>
+        <p:xfrm>
+          <a:off x="2704210" y="2805619"/>
+          <a:ext cx="6783579" cy="2225040"/>
+        </p:xfrm>
+        <a:graphic>
+          <a:graphicData uri="http://schemas.openxmlformats.org/drawingml/2006/table">
+            <a:tbl>
+              <a:tblPr firstRow="1" bandRow="1">
+                <a:tableStyleId>{5C22544A-7EE6-4342-B048-85BDC9FD1C3A}</a:tableStyleId>
+              </a:tblPr>
+              <a:tblGrid>
+                <a:gridCol w="1889189">
+                  <a:extLst>
+                    <a:ext uri="{9D8B030D-6E8A-4147-A177-3AD203B41FA5}">
+                      <a16:colId xmlns:a16="http://schemas.microsoft.com/office/drawing/2014/main" val="4095292889"/>
+                    </a:ext>
+                  </a:extLst>
+                </a:gridCol>
+                <a:gridCol w="2422398">
+                  <a:extLst>
+                    <a:ext uri="{9D8B030D-6E8A-4147-A177-3AD203B41FA5}">
+                      <a16:colId xmlns:a16="http://schemas.microsoft.com/office/drawing/2014/main" val="2435405040"/>
+                    </a:ext>
+                  </a:extLst>
+                </a:gridCol>
+                <a:gridCol w="2471992">
+                  <a:extLst>
+                    <a:ext uri="{9D8B030D-6E8A-4147-A177-3AD203B41FA5}">
+                      <a16:colId xmlns:a16="http://schemas.microsoft.com/office/drawing/2014/main" val="3149681256"/>
+                    </a:ext>
+                  </a:extLst>
+                </a:gridCol>
+              </a:tblGrid>
+              <a:tr h="370840">
+                <a:tc>
+                  <a:txBody>
+                    <a:bodyPr/>
+                    <a:lstStyle/>
+                    <a:p>
+                      <a:pPr algn="ctr"/>
+                      <a:r>
+                        <a:rPr lang="en-IN" dirty="0" smtClean="0">
+                          <a:latin typeface="Times New Roman" panose="02020603050405020304" pitchFamily="18" charset="0"/>
+                          <a:cs typeface="Times New Roman" panose="02020603050405020304" pitchFamily="18" charset="0"/>
+                        </a:rPr>
+                        <a:t>Register</a:t>
+                      </a:r>
+                      <a:r>
+                        <a:rPr lang="en-IN" baseline="0" dirty="0" smtClean="0">
+                          <a:latin typeface="Times New Roman" panose="02020603050405020304" pitchFamily="18" charset="0"/>
+                          <a:cs typeface="Times New Roman" panose="02020603050405020304" pitchFamily="18" charset="0"/>
+                        </a:rPr>
+                        <a:t> Address</a:t>
+                      </a:r>
+                      <a:endParaRPr lang="en-IN" dirty="0">
+                        <a:latin typeface="Times New Roman" panose="02020603050405020304" pitchFamily="18" charset="0"/>
+                        <a:cs typeface="Times New Roman" panose="02020603050405020304" pitchFamily="18" charset="0"/>
+                      </a:endParaRPr>
+                    </a:p>
+                  </a:txBody>
+                  <a:tcPr anchor="ctr"/>
+                </a:tc>
+                <a:tc>
+                  <a:txBody>
+                    <a:bodyPr/>
+                    <a:lstStyle/>
+                    <a:p>
+                      <a:pPr algn="ctr"/>
+                      <a:r>
+                        <a:rPr lang="en-IN" dirty="0" smtClean="0">
+                          <a:latin typeface="Times New Roman" panose="02020603050405020304" pitchFamily="18" charset="0"/>
+                          <a:cs typeface="Times New Roman" panose="02020603050405020304" pitchFamily="18" charset="0"/>
+                        </a:rPr>
+                        <a:t>Data Type and Length</a:t>
+                      </a:r>
+                      <a:endParaRPr lang="en-IN" dirty="0">
+                        <a:latin typeface="Times New Roman" panose="02020603050405020304" pitchFamily="18" charset="0"/>
+                        <a:cs typeface="Times New Roman" panose="02020603050405020304" pitchFamily="18" charset="0"/>
+                      </a:endParaRPr>
+                    </a:p>
+                  </a:txBody>
+                  <a:tcPr anchor="ctr"/>
+                </a:tc>
+                <a:tc>
+                  <a:txBody>
+                    <a:bodyPr/>
+                    <a:lstStyle/>
+                    <a:p>
+                      <a:pPr algn="ctr"/>
+                      <a:r>
+                        <a:rPr lang="en-IN" dirty="0" smtClean="0">
+                          <a:latin typeface="Times New Roman" panose="02020603050405020304" pitchFamily="18" charset="0"/>
+                          <a:cs typeface="Times New Roman" panose="02020603050405020304" pitchFamily="18" charset="0"/>
+                        </a:rPr>
+                        <a:t>Description</a:t>
+                      </a:r>
+                      <a:endParaRPr lang="en-IN" dirty="0">
+                        <a:latin typeface="Times New Roman" panose="02020603050405020304" pitchFamily="18" charset="0"/>
+                        <a:cs typeface="Times New Roman" panose="02020603050405020304" pitchFamily="18" charset="0"/>
+                      </a:endParaRPr>
+                    </a:p>
+                  </a:txBody>
+                  <a:tcPr anchor="ctr"/>
+                </a:tc>
+                <a:extLst>
+                  <a:ext uri="{0D108BD9-81ED-4DB2-BD59-A6C34878D82A}">
+                    <a16:rowId xmlns:a16="http://schemas.microsoft.com/office/drawing/2014/main" val="3087072443"/>
+                  </a:ext>
+                </a:extLst>
+              </a:tr>
+              <a:tr h="370840">
+                <a:tc>
+                  <a:txBody>
+                    <a:bodyPr/>
+                    <a:lstStyle/>
+                    <a:p>
+                      <a:pPr algn="ctr"/>
+                      <a:r>
+                        <a:rPr lang="en-IN" dirty="0" smtClean="0">
+                          <a:latin typeface="Times New Roman" panose="02020603050405020304" pitchFamily="18" charset="0"/>
+                          <a:cs typeface="Times New Roman" panose="02020603050405020304" pitchFamily="18" charset="0"/>
+                        </a:rPr>
+                        <a:t>0x01</a:t>
+                      </a:r>
+                      <a:endParaRPr lang="en-IN" dirty="0">
+                        <a:latin typeface="Times New Roman" panose="02020603050405020304" pitchFamily="18" charset="0"/>
+                        <a:cs typeface="Times New Roman" panose="02020603050405020304" pitchFamily="18" charset="0"/>
+                      </a:endParaRPr>
+                    </a:p>
+                  </a:txBody>
+                  <a:tcPr anchor="ctr"/>
+                </a:tc>
+                <a:tc>
+                  <a:txBody>
+                    <a:bodyPr/>
+                    <a:lstStyle/>
+                    <a:p>
+                      <a:pPr algn="ctr"/>
+                      <a:r>
+                        <a:rPr lang="en-IN" dirty="0" smtClean="0">
+                          <a:latin typeface="Times New Roman" panose="02020603050405020304" pitchFamily="18" charset="0"/>
+                          <a:cs typeface="Times New Roman" panose="02020603050405020304" pitchFamily="18" charset="0"/>
+                        </a:rPr>
+                        <a:t>1 – U </a:t>
+                      </a:r>
+                      <a:r>
+                        <a:rPr lang="en-IN" dirty="0" err="1" smtClean="0">
+                          <a:latin typeface="Times New Roman" panose="02020603050405020304" pitchFamily="18" charset="0"/>
+                          <a:cs typeface="Times New Roman" panose="02020603050405020304" pitchFamily="18" charset="0"/>
+                        </a:rPr>
+                        <a:t>Int</a:t>
+                      </a:r>
+                      <a:endParaRPr lang="en-IN" dirty="0">
+                        <a:latin typeface="Times New Roman" panose="02020603050405020304" pitchFamily="18" charset="0"/>
+                        <a:cs typeface="Times New Roman" panose="02020603050405020304" pitchFamily="18" charset="0"/>
+                      </a:endParaRPr>
+                    </a:p>
+                  </a:txBody>
+                  <a:tcPr anchor="ctr"/>
+                </a:tc>
+                <a:tc>
+                  <a:txBody>
+                    <a:bodyPr/>
+                    <a:lstStyle/>
+                    <a:p>
+                      <a:pPr algn="l"/>
+                      <a:r>
+                        <a:rPr lang="en-IN" dirty="0" smtClean="0">
+                          <a:latin typeface="Times New Roman" panose="02020603050405020304" pitchFamily="18" charset="0"/>
+                          <a:cs typeface="Times New Roman" panose="02020603050405020304" pitchFamily="18" charset="0"/>
+                        </a:rPr>
+                        <a:t>Type</a:t>
+                      </a:r>
+                      <a:r>
+                        <a:rPr lang="en-IN" baseline="0" dirty="0" smtClean="0">
+                          <a:latin typeface="Times New Roman" panose="02020603050405020304" pitchFamily="18" charset="0"/>
+                          <a:cs typeface="Times New Roman" panose="02020603050405020304" pitchFamily="18" charset="0"/>
+                        </a:rPr>
+                        <a:t> of Communication</a:t>
+                      </a:r>
+                      <a:endParaRPr lang="en-IN" dirty="0">
+                        <a:latin typeface="Times New Roman" panose="02020603050405020304" pitchFamily="18" charset="0"/>
+                        <a:cs typeface="Times New Roman" panose="02020603050405020304" pitchFamily="18" charset="0"/>
+                      </a:endParaRPr>
+                    </a:p>
+                  </a:txBody>
+                  <a:tcPr anchor="ctr"/>
+                </a:tc>
+                <a:extLst>
+                  <a:ext uri="{0D108BD9-81ED-4DB2-BD59-A6C34878D82A}">
+                    <a16:rowId xmlns:a16="http://schemas.microsoft.com/office/drawing/2014/main" val="3363853376"/>
+                  </a:ext>
+                </a:extLst>
+              </a:tr>
+              <a:tr h="370840">
+                <a:tc>
+                  <a:txBody>
+                    <a:bodyPr/>
+                    <a:lstStyle/>
+                    <a:p>
+                      <a:pPr algn="ctr"/>
+                      <a:r>
+                        <a:rPr lang="en-IN" dirty="0" smtClean="0">
+                          <a:latin typeface="Times New Roman" panose="02020603050405020304" pitchFamily="18" charset="0"/>
+                          <a:cs typeface="Times New Roman" panose="02020603050405020304" pitchFamily="18" charset="0"/>
+                        </a:rPr>
+                        <a:t>0x02</a:t>
+                      </a:r>
+                      <a:endParaRPr lang="en-IN" dirty="0">
+                        <a:latin typeface="Times New Roman" panose="02020603050405020304" pitchFamily="18" charset="0"/>
+                        <a:cs typeface="Times New Roman" panose="02020603050405020304" pitchFamily="18" charset="0"/>
+                      </a:endParaRPr>
+                    </a:p>
+                  </a:txBody>
+                  <a:tcPr anchor="ctr"/>
+                </a:tc>
+                <a:tc>
+                  <a:txBody>
+                    <a:bodyPr/>
+                    <a:lstStyle/>
+                    <a:p>
+                      <a:pPr algn="ctr"/>
+                      <a:r>
+                        <a:rPr lang="en-IN" dirty="0" smtClean="0">
+                          <a:latin typeface="Times New Roman" panose="02020603050405020304" pitchFamily="18" charset="0"/>
+                          <a:cs typeface="Times New Roman" panose="02020603050405020304" pitchFamily="18" charset="0"/>
+                        </a:rPr>
+                        <a:t>4 – Float</a:t>
+                      </a:r>
+                      <a:endParaRPr lang="en-IN" dirty="0">
+                        <a:latin typeface="Times New Roman" panose="02020603050405020304" pitchFamily="18" charset="0"/>
+                        <a:cs typeface="Times New Roman" panose="02020603050405020304" pitchFamily="18" charset="0"/>
+                      </a:endParaRPr>
+                    </a:p>
+                  </a:txBody>
+                  <a:tcPr anchor="ctr"/>
+                </a:tc>
+                <a:tc>
+                  <a:txBody>
+                    <a:bodyPr/>
+                    <a:lstStyle/>
+                    <a:p>
+                      <a:pPr algn="l"/>
+                      <a:r>
+                        <a:rPr lang="en-IN" dirty="0" smtClean="0">
+                          <a:latin typeface="Times New Roman" panose="02020603050405020304" pitchFamily="18" charset="0"/>
+                          <a:cs typeface="Times New Roman" panose="02020603050405020304" pitchFamily="18" charset="0"/>
+                        </a:rPr>
+                        <a:t>Latitude</a:t>
+                      </a:r>
+                      <a:endParaRPr lang="en-IN" dirty="0">
+                        <a:latin typeface="Times New Roman" panose="02020603050405020304" pitchFamily="18" charset="0"/>
+                        <a:cs typeface="Times New Roman" panose="02020603050405020304" pitchFamily="18" charset="0"/>
+                      </a:endParaRPr>
+                    </a:p>
+                  </a:txBody>
+                  <a:tcPr anchor="ctr"/>
+                </a:tc>
+                <a:extLst>
+                  <a:ext uri="{0D108BD9-81ED-4DB2-BD59-A6C34878D82A}">
+                    <a16:rowId xmlns:a16="http://schemas.microsoft.com/office/drawing/2014/main" val="1596704810"/>
+                  </a:ext>
+                </a:extLst>
+              </a:tr>
+              <a:tr h="370840">
+                <a:tc>
+                  <a:txBody>
+                    <a:bodyPr/>
+                    <a:lstStyle/>
+                    <a:p>
+                      <a:pPr algn="ctr"/>
+                      <a:r>
+                        <a:rPr lang="en-IN" dirty="0" smtClean="0">
+                          <a:latin typeface="Times New Roman" panose="02020603050405020304" pitchFamily="18" charset="0"/>
+                          <a:cs typeface="Times New Roman" panose="02020603050405020304" pitchFamily="18" charset="0"/>
+                        </a:rPr>
+                        <a:t>0x03</a:t>
+                      </a:r>
+                      <a:endParaRPr lang="en-IN" dirty="0">
+                        <a:latin typeface="Times New Roman" panose="02020603050405020304" pitchFamily="18" charset="0"/>
+                        <a:cs typeface="Times New Roman" panose="02020603050405020304" pitchFamily="18" charset="0"/>
+                      </a:endParaRPr>
+                    </a:p>
+                  </a:txBody>
+                  <a:tcPr anchor="ctr"/>
+                </a:tc>
+                <a:tc>
+                  <a:txBody>
+                    <a:bodyPr/>
+                    <a:lstStyle/>
+                    <a:p>
+                      <a:pPr algn="ctr"/>
+                      <a:r>
+                        <a:rPr lang="en-IN" dirty="0" smtClean="0">
+                          <a:latin typeface="Times New Roman" panose="02020603050405020304" pitchFamily="18" charset="0"/>
+                          <a:cs typeface="Times New Roman" panose="02020603050405020304" pitchFamily="18" charset="0"/>
+                        </a:rPr>
+                        <a:t>4 – Float </a:t>
+                      </a:r>
+                      <a:endParaRPr lang="en-IN" dirty="0">
+                        <a:latin typeface="Times New Roman" panose="02020603050405020304" pitchFamily="18" charset="0"/>
+                        <a:cs typeface="Times New Roman" panose="02020603050405020304" pitchFamily="18" charset="0"/>
+                      </a:endParaRPr>
+                    </a:p>
+                  </a:txBody>
+                  <a:tcPr anchor="ctr"/>
+                </a:tc>
+                <a:tc>
+                  <a:txBody>
+                    <a:bodyPr/>
+                    <a:lstStyle/>
+                    <a:p>
+                      <a:pPr algn="l"/>
+                      <a:r>
+                        <a:rPr lang="en-IN" dirty="0" smtClean="0">
+                          <a:latin typeface="Times New Roman" panose="02020603050405020304" pitchFamily="18" charset="0"/>
+                          <a:cs typeface="Times New Roman" panose="02020603050405020304" pitchFamily="18" charset="0"/>
+                        </a:rPr>
+                        <a:t>Longitude</a:t>
+                      </a:r>
+                      <a:endParaRPr lang="en-IN" dirty="0">
+                        <a:latin typeface="Times New Roman" panose="02020603050405020304" pitchFamily="18" charset="0"/>
+                        <a:cs typeface="Times New Roman" panose="02020603050405020304" pitchFamily="18" charset="0"/>
+                      </a:endParaRPr>
+                    </a:p>
+                  </a:txBody>
+                  <a:tcPr anchor="ctr"/>
+                </a:tc>
+                <a:extLst>
+                  <a:ext uri="{0D108BD9-81ED-4DB2-BD59-A6C34878D82A}">
+                    <a16:rowId xmlns:a16="http://schemas.microsoft.com/office/drawing/2014/main" val="621665701"/>
+                  </a:ext>
+                </a:extLst>
+              </a:tr>
+              <a:tr h="370840">
+                <a:tc>
+                  <a:txBody>
+                    <a:bodyPr/>
+                    <a:lstStyle/>
+                    <a:p>
+                      <a:pPr algn="ctr"/>
+                      <a:r>
+                        <a:rPr lang="en-IN" dirty="0" smtClean="0">
+                          <a:latin typeface="Times New Roman" panose="02020603050405020304" pitchFamily="18" charset="0"/>
+                          <a:cs typeface="Times New Roman" panose="02020603050405020304" pitchFamily="18" charset="0"/>
+                        </a:rPr>
+                        <a:t>0x04</a:t>
+                      </a:r>
+                      <a:endParaRPr lang="en-IN" dirty="0">
+                        <a:latin typeface="Times New Roman" panose="02020603050405020304" pitchFamily="18" charset="0"/>
+                        <a:cs typeface="Times New Roman" panose="02020603050405020304" pitchFamily="18" charset="0"/>
+                      </a:endParaRPr>
+                    </a:p>
+                  </a:txBody>
+                  <a:tcPr anchor="ctr"/>
+                </a:tc>
+                <a:tc>
+                  <a:txBody>
+                    <a:bodyPr/>
+                    <a:lstStyle/>
+                    <a:p>
+                      <a:pPr algn="ctr"/>
+                      <a:r>
+                        <a:rPr lang="en-IN" dirty="0" smtClean="0">
+                          <a:latin typeface="Times New Roman" panose="02020603050405020304" pitchFamily="18" charset="0"/>
+                          <a:cs typeface="Times New Roman" panose="02020603050405020304" pitchFamily="18" charset="0"/>
+                        </a:rPr>
+                        <a:t>4 – Float</a:t>
+                      </a:r>
+                      <a:endParaRPr lang="en-IN" dirty="0">
+                        <a:latin typeface="Times New Roman" panose="02020603050405020304" pitchFamily="18" charset="0"/>
+                        <a:cs typeface="Times New Roman" panose="02020603050405020304" pitchFamily="18" charset="0"/>
+                      </a:endParaRPr>
+                    </a:p>
+                  </a:txBody>
+                  <a:tcPr anchor="ctr"/>
+                </a:tc>
+                <a:tc>
+                  <a:txBody>
+                    <a:bodyPr/>
+                    <a:lstStyle/>
+                    <a:p>
+                      <a:pPr algn="l"/>
+                      <a:r>
+                        <a:rPr lang="en-IN" baseline="0" dirty="0" smtClean="0">
+                          <a:latin typeface="Times New Roman" panose="02020603050405020304" pitchFamily="18" charset="0"/>
+                          <a:cs typeface="Times New Roman" panose="02020603050405020304" pitchFamily="18" charset="0"/>
+                        </a:rPr>
+                        <a:t>Altitude</a:t>
+                      </a:r>
+                    </a:p>
+                  </a:txBody>
+                  <a:tcPr anchor="ctr"/>
+                </a:tc>
+                <a:extLst>
+                  <a:ext uri="{0D108BD9-81ED-4DB2-BD59-A6C34878D82A}">
+                    <a16:rowId xmlns:a16="http://schemas.microsoft.com/office/drawing/2014/main" val="2547034353"/>
+                  </a:ext>
+                </a:extLst>
+              </a:tr>
+              <a:tr h="370840">
+                <a:tc>
+                  <a:txBody>
+                    <a:bodyPr/>
+                    <a:lstStyle/>
+                    <a:p>
+                      <a:pPr algn="ctr"/>
+                      <a:r>
+                        <a:rPr lang="en-IN" dirty="0" smtClean="0">
+                          <a:latin typeface="Times New Roman" panose="02020603050405020304" pitchFamily="18" charset="0"/>
+                          <a:cs typeface="Times New Roman" panose="02020603050405020304" pitchFamily="18" charset="0"/>
+                        </a:rPr>
+                        <a:t>0x05</a:t>
+                      </a:r>
+                      <a:endParaRPr lang="en-IN" dirty="0">
+                        <a:latin typeface="Times New Roman" panose="02020603050405020304" pitchFamily="18" charset="0"/>
+                        <a:cs typeface="Times New Roman" panose="02020603050405020304" pitchFamily="18" charset="0"/>
+                      </a:endParaRPr>
+                    </a:p>
+                  </a:txBody>
+                  <a:tcPr anchor="ctr"/>
+                </a:tc>
+                <a:tc>
+                  <a:txBody>
+                    <a:bodyPr/>
+                    <a:lstStyle/>
+                    <a:p>
+                      <a:pPr algn="ctr"/>
+                      <a:r>
+                        <a:rPr lang="en-IN" dirty="0" smtClean="0">
+                          <a:latin typeface="Times New Roman" panose="02020603050405020304" pitchFamily="18" charset="0"/>
+                          <a:cs typeface="Times New Roman" panose="02020603050405020304" pitchFamily="18" charset="0"/>
+                        </a:rPr>
+                        <a:t>1</a:t>
+                      </a:r>
+                      <a:r>
+                        <a:rPr lang="en-IN" baseline="0" dirty="0" smtClean="0">
+                          <a:latin typeface="Times New Roman" panose="02020603050405020304" pitchFamily="18" charset="0"/>
+                          <a:cs typeface="Times New Roman" panose="02020603050405020304" pitchFamily="18" charset="0"/>
+                        </a:rPr>
+                        <a:t> – U </a:t>
+                      </a:r>
+                      <a:r>
+                        <a:rPr lang="en-IN" baseline="0" dirty="0" err="1" smtClean="0">
+                          <a:latin typeface="Times New Roman" panose="02020603050405020304" pitchFamily="18" charset="0"/>
+                          <a:cs typeface="Times New Roman" panose="02020603050405020304" pitchFamily="18" charset="0"/>
+                        </a:rPr>
+                        <a:t>Int</a:t>
+                      </a:r>
+                      <a:endParaRPr lang="en-IN" dirty="0">
+                        <a:latin typeface="Times New Roman" panose="02020603050405020304" pitchFamily="18" charset="0"/>
+                        <a:cs typeface="Times New Roman" panose="02020603050405020304" pitchFamily="18" charset="0"/>
+                      </a:endParaRPr>
+                    </a:p>
+                  </a:txBody>
+                  <a:tcPr anchor="ctr"/>
+                </a:tc>
+                <a:tc>
+                  <a:txBody>
+                    <a:bodyPr/>
+                    <a:lstStyle/>
+                    <a:p>
+                      <a:pPr algn="l"/>
+                      <a:r>
+                        <a:rPr lang="en-IN" baseline="0" dirty="0" smtClean="0">
+                          <a:latin typeface="Times New Roman" panose="02020603050405020304" pitchFamily="18" charset="0"/>
+                          <a:cs typeface="Times New Roman" panose="02020603050405020304" pitchFamily="18" charset="0"/>
+                        </a:rPr>
+                        <a:t>Back to Origin</a:t>
+                      </a:r>
+                    </a:p>
+                  </a:txBody>
+                  <a:tcPr anchor="ctr"/>
+                </a:tc>
+                <a:extLst>
+                  <a:ext uri="{0D108BD9-81ED-4DB2-BD59-A6C34878D82A}">
+                    <a16:rowId xmlns:a16="http://schemas.microsoft.com/office/drawing/2014/main" val="2202116174"/>
+                  </a:ext>
+                </a:extLst>
+              </a:tr>
+            </a:tbl>
+          </a:graphicData>
+        </a:graphic>
+      </p:graphicFrame>
+    </p:spTree>
+    <p:extLst>
+      <p:ext uri="{BB962C8B-B14F-4D97-AF65-F5344CB8AC3E}">
+        <p14:creationId xmlns:p14="http://schemas.microsoft.com/office/powerpoint/2010/main" val="1977469422"/>
+      </p:ext>
+    </p:extLst>
+  </p:cSld>
+  <p:clrMapOvr>
+    <a:masterClrMapping/>
+  </p:clrMapOvr>
+</p:sld>
+</file>
+
+<file path=ppt/slides/slide8.xml><?xml version="1.0" encoding="utf-8"?>
+<p:sld xmlns:a="http://schemas.openxmlformats.org/drawingml/2006/main" xmlns:r="http://schemas.openxmlformats.org/officeDocument/2006/relationships" xmlns:p="http://schemas.openxmlformats.org/presentationml/2006/main">
+  <p:cSld>
+    <p:spTree>
+      <p:nvGrpSpPr>
+        <p:cNvPr id="1" name=""/>
+        <p:cNvGrpSpPr/>
+        <p:nvPr/>
+      </p:nvGrpSpPr>
+      <p:grpSpPr>
+        <a:xfrm>
+          <a:off x="0" y="0"/>
+          <a:ext cx="0" cy="0"/>
+          <a:chOff x="0" y="0"/>
+          <a:chExt cx="0" cy="0"/>
+        </a:xfrm>
+      </p:grpSpPr>
+      <p:sp>
+        <p:nvSpPr>
+          <p:cNvPr id="2" name="Title 1"/>
+          <p:cNvSpPr>
+            <a:spLocks noGrp="1"/>
+          </p:cNvSpPr>
+          <p:nvPr>
+            <p:ph type="title"/>
+          </p:nvPr>
+        </p:nvSpPr>
+        <p:spPr/>
+        <p:txBody>
+          <a:bodyPr/>
+          <a:lstStyle/>
+          <a:p>
+            <a:pPr algn="ctr"/>
+            <a:r>
+              <a:rPr lang="en-IN" dirty="0" smtClean="0">
+                <a:latin typeface="Times New Roman" panose="02020603050405020304" pitchFamily="18" charset="0"/>
+                <a:cs typeface="Times New Roman" panose="02020603050405020304" pitchFamily="18" charset="0"/>
+              </a:rPr>
+              <a:t>External RF Communication Register Structure</a:t>
+            </a:r>
+            <a:endParaRPr lang="en-IN" dirty="0">
+              <a:latin typeface="Times New Roman" panose="02020603050405020304" pitchFamily="18" charset="0"/>
+              <a:cs typeface="Times New Roman" panose="02020603050405020304" pitchFamily="18" charset="0"/>
+            </a:endParaRPr>
+          </a:p>
+        </p:txBody>
+      </p:sp>
+      <p:graphicFrame>
+        <p:nvGraphicFramePr>
+          <p:cNvPr id="6" name="Table 5"/>
+          <p:cNvGraphicFramePr>
+            <a:graphicFrameLocks noGrp="1"/>
+          </p:cNvGraphicFramePr>
+          <p:nvPr>
+            <p:extLst>
+              <p:ext uri="{D42A27DB-BD31-4B8C-83A1-F6EECF244321}">
+                <p14:modId xmlns:p14="http://schemas.microsoft.com/office/powerpoint/2010/main" val="1086865700"/>
+              </p:ext>
+            </p:extLst>
+          </p:nvPr>
+        </p:nvGraphicFramePr>
+        <p:xfrm>
+          <a:off x="3255041" y="2468734"/>
+          <a:ext cx="5681917" cy="2966720"/>
+        </p:xfrm>
+        <a:graphic>
+          <a:graphicData uri="http://schemas.openxmlformats.org/drawingml/2006/table">
+            <a:tbl>
+              <a:tblPr firstRow="1" bandRow="1">
+                <a:tableStyleId>{5C22544A-7EE6-4342-B048-85BDC9FD1C3A}</a:tableStyleId>
+              </a:tblPr>
+              <a:tblGrid>
+                <a:gridCol w="1889189">
+                  <a:extLst>
+                    <a:ext uri="{9D8B030D-6E8A-4147-A177-3AD203B41FA5}">
+                      <a16:colId xmlns:a16="http://schemas.microsoft.com/office/drawing/2014/main" val="4095292889"/>
+                    </a:ext>
+                  </a:extLst>
+                </a:gridCol>
+                <a:gridCol w="2422398">
+                  <a:extLst>
+                    <a:ext uri="{9D8B030D-6E8A-4147-A177-3AD203B41FA5}">
+                      <a16:colId xmlns:a16="http://schemas.microsoft.com/office/drawing/2014/main" val="2435405040"/>
+                    </a:ext>
+                  </a:extLst>
+                </a:gridCol>
+                <a:gridCol w="1370330">
+                  <a:extLst>
+                    <a:ext uri="{9D8B030D-6E8A-4147-A177-3AD203B41FA5}">
+                      <a16:colId xmlns:a16="http://schemas.microsoft.com/office/drawing/2014/main" val="3149681256"/>
+                    </a:ext>
+                  </a:extLst>
+                </a:gridCol>
+              </a:tblGrid>
+              <a:tr h="370840">
+                <a:tc>
+                  <a:txBody>
+                    <a:bodyPr/>
+                    <a:lstStyle/>
+                    <a:p>
+                      <a:pPr algn="ctr"/>
+                      <a:r>
+                        <a:rPr lang="en-IN" dirty="0" smtClean="0">
+                          <a:latin typeface="Times New Roman" panose="02020603050405020304" pitchFamily="18" charset="0"/>
+                          <a:cs typeface="Times New Roman" panose="02020603050405020304" pitchFamily="18" charset="0"/>
+                        </a:rPr>
+                        <a:t>Register</a:t>
+                      </a:r>
+                      <a:r>
+                        <a:rPr lang="en-IN" baseline="0" dirty="0" smtClean="0">
+                          <a:latin typeface="Times New Roman" panose="02020603050405020304" pitchFamily="18" charset="0"/>
+                          <a:cs typeface="Times New Roman" panose="02020603050405020304" pitchFamily="18" charset="0"/>
+                        </a:rPr>
+                        <a:t> Address</a:t>
+                      </a:r>
+                      <a:endParaRPr lang="en-IN" dirty="0">
+                        <a:latin typeface="Times New Roman" panose="02020603050405020304" pitchFamily="18" charset="0"/>
+                        <a:cs typeface="Times New Roman" panose="02020603050405020304" pitchFamily="18" charset="0"/>
+                      </a:endParaRPr>
+                    </a:p>
+                  </a:txBody>
+                  <a:tcPr anchor="ctr"/>
+                </a:tc>
+                <a:tc>
+                  <a:txBody>
+                    <a:bodyPr/>
+                    <a:lstStyle/>
+                    <a:p>
+                      <a:pPr algn="ctr"/>
+                      <a:r>
+                        <a:rPr lang="en-IN" dirty="0" smtClean="0">
+                          <a:latin typeface="Times New Roman" panose="02020603050405020304" pitchFamily="18" charset="0"/>
+                          <a:cs typeface="Times New Roman" panose="02020603050405020304" pitchFamily="18" charset="0"/>
+                        </a:rPr>
+                        <a:t>Data Type and Length</a:t>
+                      </a:r>
+                      <a:endParaRPr lang="en-IN" dirty="0">
+                        <a:latin typeface="Times New Roman" panose="02020603050405020304" pitchFamily="18" charset="0"/>
+                        <a:cs typeface="Times New Roman" panose="02020603050405020304" pitchFamily="18" charset="0"/>
+                      </a:endParaRPr>
+                    </a:p>
+                  </a:txBody>
+                  <a:tcPr anchor="ctr"/>
+                </a:tc>
+                <a:tc>
+                  <a:txBody>
+                    <a:bodyPr/>
+                    <a:lstStyle/>
+                    <a:p>
+                      <a:pPr algn="ctr"/>
+                      <a:r>
+                        <a:rPr lang="en-IN" dirty="0" smtClean="0">
+                          <a:latin typeface="Times New Roman" panose="02020603050405020304" pitchFamily="18" charset="0"/>
+                          <a:cs typeface="Times New Roman" panose="02020603050405020304" pitchFamily="18" charset="0"/>
+                        </a:rPr>
+                        <a:t>Description</a:t>
+                      </a:r>
+                      <a:endParaRPr lang="en-IN" dirty="0">
+                        <a:latin typeface="Times New Roman" panose="02020603050405020304" pitchFamily="18" charset="0"/>
+                        <a:cs typeface="Times New Roman" panose="02020603050405020304" pitchFamily="18" charset="0"/>
+                      </a:endParaRPr>
+                    </a:p>
+                  </a:txBody>
+                  <a:tcPr anchor="ctr"/>
+                </a:tc>
+                <a:extLst>
+                  <a:ext uri="{0D108BD9-81ED-4DB2-BD59-A6C34878D82A}">
+                    <a16:rowId xmlns:a16="http://schemas.microsoft.com/office/drawing/2014/main" val="3087072443"/>
+                  </a:ext>
+                </a:extLst>
+              </a:tr>
+              <a:tr h="370840">
+                <a:tc>
+                  <a:txBody>
+                    <a:bodyPr/>
+                    <a:lstStyle/>
+                    <a:p>
+                      <a:pPr algn="ctr"/>
+                      <a:r>
+                        <a:rPr lang="en-IN" dirty="0" smtClean="0">
+                          <a:latin typeface="Times New Roman" panose="02020603050405020304" pitchFamily="18" charset="0"/>
+                          <a:cs typeface="Times New Roman" panose="02020603050405020304" pitchFamily="18" charset="0"/>
+                        </a:rPr>
+                        <a:t>0x01</a:t>
+                      </a:r>
+                      <a:endParaRPr lang="en-IN" dirty="0">
+                        <a:latin typeface="Times New Roman" panose="02020603050405020304" pitchFamily="18" charset="0"/>
+                        <a:cs typeface="Times New Roman" panose="02020603050405020304" pitchFamily="18" charset="0"/>
+                      </a:endParaRPr>
+                    </a:p>
+                  </a:txBody>
+                  <a:tcPr anchor="ctr"/>
+                </a:tc>
+                <a:tc>
+                  <a:txBody>
+                    <a:bodyPr/>
+                    <a:lstStyle/>
+                    <a:p>
+                      <a:pPr algn="ctr"/>
+                      <a:r>
+                        <a:rPr lang="en-IN" dirty="0" smtClean="0">
+                          <a:latin typeface="Times New Roman" panose="02020603050405020304" pitchFamily="18" charset="0"/>
+                          <a:cs typeface="Times New Roman" panose="02020603050405020304" pitchFamily="18" charset="0"/>
+                        </a:rPr>
+                        <a:t>1 – U </a:t>
+                      </a:r>
+                      <a:r>
+                        <a:rPr lang="en-IN" dirty="0" err="1" smtClean="0">
+                          <a:latin typeface="Times New Roman" panose="02020603050405020304" pitchFamily="18" charset="0"/>
+                          <a:cs typeface="Times New Roman" panose="02020603050405020304" pitchFamily="18" charset="0"/>
+                        </a:rPr>
+                        <a:t>Int</a:t>
+                      </a:r>
+                      <a:endParaRPr lang="en-IN" dirty="0">
+                        <a:latin typeface="Times New Roman" panose="02020603050405020304" pitchFamily="18" charset="0"/>
+                        <a:cs typeface="Times New Roman" panose="02020603050405020304" pitchFamily="18" charset="0"/>
+                      </a:endParaRPr>
+                    </a:p>
+                  </a:txBody>
+                  <a:tcPr anchor="ctr"/>
+                </a:tc>
+                <a:tc>
+                  <a:txBody>
+                    <a:bodyPr/>
+                    <a:lstStyle/>
+                    <a:p>
+                      <a:pPr algn="l"/>
+                      <a:r>
+                        <a:rPr lang="en-IN" baseline="0" dirty="0" smtClean="0">
+                          <a:latin typeface="Times New Roman" panose="02020603050405020304" pitchFamily="18" charset="0"/>
+                          <a:cs typeface="Times New Roman" panose="02020603050405020304" pitchFamily="18" charset="0"/>
+                        </a:rPr>
+                        <a:t>Type of RF</a:t>
+                      </a:r>
+                      <a:endParaRPr lang="en-IN" dirty="0">
+                        <a:latin typeface="Times New Roman" panose="02020603050405020304" pitchFamily="18" charset="0"/>
+                        <a:cs typeface="Times New Roman" panose="02020603050405020304" pitchFamily="18" charset="0"/>
+                      </a:endParaRPr>
+                    </a:p>
+                  </a:txBody>
+                  <a:tcPr anchor="ctr"/>
+                </a:tc>
+                <a:extLst>
+                  <a:ext uri="{0D108BD9-81ED-4DB2-BD59-A6C34878D82A}">
+                    <a16:rowId xmlns:a16="http://schemas.microsoft.com/office/drawing/2014/main" val="3363853376"/>
+                  </a:ext>
+                </a:extLst>
+              </a:tr>
+              <a:tr h="370840">
+                <a:tc>
+                  <a:txBody>
+                    <a:bodyPr/>
+                    <a:lstStyle/>
+                    <a:p>
+                      <a:pPr algn="ctr"/>
+                      <a:r>
+                        <a:rPr lang="en-IN" dirty="0" smtClean="0">
+                          <a:latin typeface="Times New Roman" panose="02020603050405020304" pitchFamily="18" charset="0"/>
+                          <a:cs typeface="Times New Roman" panose="02020603050405020304" pitchFamily="18" charset="0"/>
+                        </a:rPr>
+                        <a:t>0x02</a:t>
+                      </a:r>
+                      <a:endParaRPr lang="en-IN" dirty="0">
+                        <a:latin typeface="Times New Roman" panose="02020603050405020304" pitchFamily="18" charset="0"/>
+                        <a:cs typeface="Times New Roman" panose="02020603050405020304" pitchFamily="18" charset="0"/>
+                      </a:endParaRPr>
+                    </a:p>
+                  </a:txBody>
+                  <a:tcPr anchor="ctr"/>
+                </a:tc>
+                <a:tc>
+                  <a:txBody>
+                    <a:bodyPr/>
+                    <a:lstStyle/>
+                    <a:p>
+                      <a:pPr algn="ctr"/>
+                      <a:r>
+                        <a:rPr lang="en-IN" dirty="0" smtClean="0">
+                          <a:latin typeface="Times New Roman" panose="02020603050405020304" pitchFamily="18" charset="0"/>
+                          <a:cs typeface="Times New Roman" panose="02020603050405020304" pitchFamily="18" charset="0"/>
+                        </a:rPr>
+                        <a:t>2</a:t>
+                      </a:r>
+                      <a:r>
+                        <a:rPr lang="en-IN" baseline="0" dirty="0" smtClean="0">
+                          <a:latin typeface="Times New Roman" panose="02020603050405020304" pitchFamily="18" charset="0"/>
+                          <a:cs typeface="Times New Roman" panose="02020603050405020304" pitchFamily="18" charset="0"/>
+                        </a:rPr>
+                        <a:t> – U </a:t>
+                      </a:r>
+                      <a:r>
+                        <a:rPr lang="en-IN" baseline="0" dirty="0" err="1" smtClean="0">
+                          <a:latin typeface="Times New Roman" panose="02020603050405020304" pitchFamily="18" charset="0"/>
+                          <a:cs typeface="Times New Roman" panose="02020603050405020304" pitchFamily="18" charset="0"/>
+                        </a:rPr>
+                        <a:t>Int</a:t>
+                      </a:r>
+                      <a:endParaRPr lang="en-IN" dirty="0">
+                        <a:latin typeface="Times New Roman" panose="02020603050405020304" pitchFamily="18" charset="0"/>
+                        <a:cs typeface="Times New Roman" panose="02020603050405020304" pitchFamily="18" charset="0"/>
+                      </a:endParaRPr>
+                    </a:p>
+                  </a:txBody>
+                  <a:tcPr anchor="ctr"/>
+                </a:tc>
+                <a:tc>
+                  <a:txBody>
+                    <a:bodyPr/>
+                    <a:lstStyle/>
+                    <a:p>
+                      <a:pPr algn="l"/>
+                      <a:r>
+                        <a:rPr lang="en-IN" dirty="0" smtClean="0">
+                          <a:latin typeface="Times New Roman" panose="02020603050405020304" pitchFamily="18" charset="0"/>
+                          <a:cs typeface="Times New Roman" panose="02020603050405020304" pitchFamily="18" charset="0"/>
+                        </a:rPr>
+                        <a:t>Channel</a:t>
+                      </a:r>
+                      <a:r>
+                        <a:rPr lang="en-IN" baseline="0" dirty="0" smtClean="0">
+                          <a:latin typeface="Times New Roman" panose="02020603050405020304" pitchFamily="18" charset="0"/>
+                          <a:cs typeface="Times New Roman" panose="02020603050405020304" pitchFamily="18" charset="0"/>
+                        </a:rPr>
+                        <a:t> 1</a:t>
+                      </a:r>
+                      <a:endParaRPr lang="en-IN" dirty="0">
+                        <a:latin typeface="Times New Roman" panose="02020603050405020304" pitchFamily="18" charset="0"/>
+                        <a:cs typeface="Times New Roman" panose="02020603050405020304" pitchFamily="18" charset="0"/>
+                      </a:endParaRPr>
+                    </a:p>
+                  </a:txBody>
+                  <a:tcPr anchor="ctr"/>
+                </a:tc>
+                <a:extLst>
+                  <a:ext uri="{0D108BD9-81ED-4DB2-BD59-A6C34878D82A}">
+                    <a16:rowId xmlns:a16="http://schemas.microsoft.com/office/drawing/2014/main" val="1596704810"/>
+                  </a:ext>
+                </a:extLst>
+              </a:tr>
+              <a:tr h="370840">
+                <a:tc>
+                  <a:txBody>
+                    <a:bodyPr/>
+                    <a:lstStyle/>
+                    <a:p>
+                      <a:pPr algn="ctr"/>
+                      <a:r>
+                        <a:rPr lang="en-IN" dirty="0" smtClean="0">
+                          <a:latin typeface="Times New Roman" panose="02020603050405020304" pitchFamily="18" charset="0"/>
+                          <a:cs typeface="Times New Roman" panose="02020603050405020304" pitchFamily="18" charset="0"/>
+                        </a:rPr>
+                        <a:t>0x03</a:t>
+                      </a:r>
+                      <a:endParaRPr lang="en-IN" dirty="0">
+                        <a:latin typeface="Times New Roman" panose="02020603050405020304" pitchFamily="18" charset="0"/>
+                        <a:cs typeface="Times New Roman" panose="02020603050405020304" pitchFamily="18" charset="0"/>
+                      </a:endParaRPr>
+                    </a:p>
+                  </a:txBody>
+                  <a:tcPr anchor="ctr"/>
+                </a:tc>
+                <a:tc>
+                  <a:txBody>
+                    <a:bodyPr/>
+                    <a:lstStyle/>
+                    <a:p>
+                      <a:pPr algn="ctr"/>
+                      <a:r>
+                        <a:rPr lang="en-IN" dirty="0" smtClean="0">
+                          <a:latin typeface="Times New Roman" panose="02020603050405020304" pitchFamily="18" charset="0"/>
+                          <a:cs typeface="Times New Roman" panose="02020603050405020304" pitchFamily="18" charset="0"/>
+                        </a:rPr>
+                        <a:t>2</a:t>
+                      </a:r>
+                      <a:r>
+                        <a:rPr lang="en-IN" baseline="0" dirty="0" smtClean="0">
+                          <a:latin typeface="Times New Roman" panose="02020603050405020304" pitchFamily="18" charset="0"/>
+                          <a:cs typeface="Times New Roman" panose="02020603050405020304" pitchFamily="18" charset="0"/>
+                        </a:rPr>
+                        <a:t> – U </a:t>
+                      </a:r>
+                      <a:r>
+                        <a:rPr lang="en-IN" baseline="0" dirty="0" err="1" smtClean="0">
+                          <a:latin typeface="Times New Roman" panose="02020603050405020304" pitchFamily="18" charset="0"/>
+                          <a:cs typeface="Times New Roman" panose="02020603050405020304" pitchFamily="18" charset="0"/>
+                        </a:rPr>
+                        <a:t>Int</a:t>
+                      </a:r>
+                      <a:r>
+                        <a:rPr lang="en-IN" dirty="0" smtClean="0">
+                          <a:latin typeface="Times New Roman" panose="02020603050405020304" pitchFamily="18" charset="0"/>
+                          <a:cs typeface="Times New Roman" panose="02020603050405020304" pitchFamily="18" charset="0"/>
+                        </a:rPr>
+                        <a:t> </a:t>
+                      </a:r>
+                      <a:endParaRPr lang="en-IN" dirty="0">
+                        <a:latin typeface="Times New Roman" panose="02020603050405020304" pitchFamily="18" charset="0"/>
+                        <a:cs typeface="Times New Roman" panose="02020603050405020304" pitchFamily="18" charset="0"/>
+                      </a:endParaRPr>
+                    </a:p>
+                  </a:txBody>
+                  <a:tcPr anchor="ctr"/>
+                </a:tc>
+                <a:tc>
+                  <a:txBody>
+                    <a:bodyPr/>
+                    <a:lstStyle/>
+                    <a:p>
+                      <a:pPr algn="l"/>
+                      <a:r>
+                        <a:rPr lang="en-IN" baseline="0" dirty="0" smtClean="0">
+                          <a:latin typeface="Times New Roman" panose="02020603050405020304" pitchFamily="18" charset="0"/>
+                          <a:cs typeface="Times New Roman" panose="02020603050405020304" pitchFamily="18" charset="0"/>
+                        </a:rPr>
+                        <a:t>Channel 2</a:t>
+                      </a:r>
+                      <a:endParaRPr lang="en-IN" dirty="0">
+                        <a:latin typeface="Times New Roman" panose="02020603050405020304" pitchFamily="18" charset="0"/>
+                        <a:cs typeface="Times New Roman" panose="02020603050405020304" pitchFamily="18" charset="0"/>
+                      </a:endParaRPr>
+                    </a:p>
+                  </a:txBody>
+                  <a:tcPr anchor="ctr"/>
+                </a:tc>
+                <a:extLst>
+                  <a:ext uri="{0D108BD9-81ED-4DB2-BD59-A6C34878D82A}">
+                    <a16:rowId xmlns:a16="http://schemas.microsoft.com/office/drawing/2014/main" val="621665701"/>
+                  </a:ext>
+                </a:extLst>
+              </a:tr>
+              <a:tr h="370840">
+                <a:tc>
+                  <a:txBody>
+                    <a:bodyPr/>
+                    <a:lstStyle/>
+                    <a:p>
+                      <a:pPr algn="ctr"/>
+                      <a:r>
+                        <a:rPr lang="en-IN" dirty="0" smtClean="0">
+                          <a:latin typeface="Times New Roman" panose="02020603050405020304" pitchFamily="18" charset="0"/>
+                          <a:cs typeface="Times New Roman" panose="02020603050405020304" pitchFamily="18" charset="0"/>
+                        </a:rPr>
+                        <a:t>0x04</a:t>
+                      </a:r>
+                      <a:endParaRPr lang="en-IN" dirty="0">
+                        <a:latin typeface="Times New Roman" panose="02020603050405020304" pitchFamily="18" charset="0"/>
+                        <a:cs typeface="Times New Roman" panose="02020603050405020304" pitchFamily="18" charset="0"/>
+                      </a:endParaRPr>
+                    </a:p>
+                  </a:txBody>
+                  <a:tcPr anchor="ctr"/>
+                </a:tc>
+                <a:tc>
+                  <a:txBody>
+                    <a:bodyPr/>
+                    <a:lstStyle/>
+                    <a:p>
+                      <a:pPr algn="ctr"/>
+                      <a:r>
+                        <a:rPr lang="en-IN" dirty="0" smtClean="0">
+                          <a:latin typeface="Times New Roman" panose="02020603050405020304" pitchFamily="18" charset="0"/>
+                          <a:cs typeface="Times New Roman" panose="02020603050405020304" pitchFamily="18" charset="0"/>
+                        </a:rPr>
+                        <a:t>2</a:t>
+                      </a:r>
+                      <a:r>
+                        <a:rPr lang="en-IN" baseline="0" dirty="0" smtClean="0">
+                          <a:latin typeface="Times New Roman" panose="02020603050405020304" pitchFamily="18" charset="0"/>
+                          <a:cs typeface="Times New Roman" panose="02020603050405020304" pitchFamily="18" charset="0"/>
+                        </a:rPr>
+                        <a:t> – U </a:t>
+                      </a:r>
+                      <a:r>
+                        <a:rPr lang="en-IN" baseline="0" dirty="0" err="1" smtClean="0">
+                          <a:latin typeface="Times New Roman" panose="02020603050405020304" pitchFamily="18" charset="0"/>
+                          <a:cs typeface="Times New Roman" panose="02020603050405020304" pitchFamily="18" charset="0"/>
+                        </a:rPr>
+                        <a:t>Int</a:t>
+                      </a:r>
+                      <a:endParaRPr lang="en-IN" dirty="0">
+                        <a:latin typeface="Times New Roman" panose="02020603050405020304" pitchFamily="18" charset="0"/>
+                        <a:cs typeface="Times New Roman" panose="02020603050405020304" pitchFamily="18" charset="0"/>
+                      </a:endParaRPr>
+                    </a:p>
+                  </a:txBody>
+                  <a:tcPr anchor="ctr"/>
+                </a:tc>
+                <a:tc>
+                  <a:txBody>
+                    <a:bodyPr/>
+                    <a:lstStyle/>
+                    <a:p>
+                      <a:pPr algn="l"/>
+                      <a:r>
+                        <a:rPr lang="en-IN" dirty="0" smtClean="0">
+                          <a:latin typeface="Times New Roman" panose="02020603050405020304" pitchFamily="18" charset="0"/>
+                          <a:cs typeface="Times New Roman" panose="02020603050405020304" pitchFamily="18" charset="0"/>
+                        </a:rPr>
+                        <a:t>Channel</a:t>
+                      </a:r>
+                      <a:r>
+                        <a:rPr lang="en-IN" baseline="0" dirty="0" smtClean="0">
+                          <a:latin typeface="Times New Roman" panose="02020603050405020304" pitchFamily="18" charset="0"/>
+                          <a:cs typeface="Times New Roman" panose="02020603050405020304" pitchFamily="18" charset="0"/>
+                        </a:rPr>
+                        <a:t> 3</a:t>
+                      </a:r>
+                      <a:endParaRPr lang="en-IN" dirty="0">
+                        <a:latin typeface="Times New Roman" panose="02020603050405020304" pitchFamily="18" charset="0"/>
+                        <a:cs typeface="Times New Roman" panose="02020603050405020304" pitchFamily="18" charset="0"/>
+                      </a:endParaRPr>
+                    </a:p>
+                  </a:txBody>
+                  <a:tcPr anchor="ctr"/>
+                </a:tc>
+                <a:extLst>
+                  <a:ext uri="{0D108BD9-81ED-4DB2-BD59-A6C34878D82A}">
+                    <a16:rowId xmlns:a16="http://schemas.microsoft.com/office/drawing/2014/main" val="1515685180"/>
+                  </a:ext>
+                </a:extLst>
+              </a:tr>
+              <a:tr h="370840">
+                <a:tc>
+                  <a:txBody>
+                    <a:bodyPr/>
+                    <a:lstStyle/>
+                    <a:p>
+                      <a:pPr algn="ctr"/>
+                      <a:r>
+                        <a:rPr lang="en-IN" dirty="0" smtClean="0">
+                          <a:latin typeface="Times New Roman" panose="02020603050405020304" pitchFamily="18" charset="0"/>
+                          <a:cs typeface="Times New Roman" panose="02020603050405020304" pitchFamily="18" charset="0"/>
+                        </a:rPr>
+                        <a:t>0x05</a:t>
+                      </a:r>
+                      <a:endParaRPr lang="en-IN" dirty="0">
+                        <a:latin typeface="Times New Roman" panose="02020603050405020304" pitchFamily="18" charset="0"/>
+                        <a:cs typeface="Times New Roman" panose="02020603050405020304" pitchFamily="18" charset="0"/>
+                      </a:endParaRPr>
+                    </a:p>
+                  </a:txBody>
+                  <a:tcPr anchor="ctr"/>
+                </a:tc>
+                <a:tc>
+                  <a:txBody>
+                    <a:bodyPr/>
+                    <a:lstStyle/>
+                    <a:p>
+                      <a:pPr algn="ctr"/>
+                      <a:r>
+                        <a:rPr lang="en-IN" dirty="0" smtClean="0">
+                          <a:latin typeface="Times New Roman" panose="02020603050405020304" pitchFamily="18" charset="0"/>
+                          <a:cs typeface="Times New Roman" panose="02020603050405020304" pitchFamily="18" charset="0"/>
+                        </a:rPr>
+                        <a:t>2</a:t>
+                      </a:r>
+                      <a:r>
+                        <a:rPr lang="en-IN" baseline="0" dirty="0" smtClean="0">
+                          <a:latin typeface="Times New Roman" panose="02020603050405020304" pitchFamily="18" charset="0"/>
+                          <a:cs typeface="Times New Roman" panose="02020603050405020304" pitchFamily="18" charset="0"/>
+                        </a:rPr>
+                        <a:t> – U </a:t>
+                      </a:r>
+                      <a:r>
+                        <a:rPr lang="en-IN" baseline="0" dirty="0" err="1" smtClean="0">
+                          <a:latin typeface="Times New Roman" panose="02020603050405020304" pitchFamily="18" charset="0"/>
+                          <a:cs typeface="Times New Roman" panose="02020603050405020304" pitchFamily="18" charset="0"/>
+                        </a:rPr>
+                        <a:t>Int</a:t>
+                      </a:r>
+                      <a:endParaRPr lang="en-IN" dirty="0">
+                        <a:latin typeface="Times New Roman" panose="02020603050405020304" pitchFamily="18" charset="0"/>
+                        <a:cs typeface="Times New Roman" panose="02020603050405020304" pitchFamily="18" charset="0"/>
+                      </a:endParaRPr>
+                    </a:p>
+                  </a:txBody>
+                  <a:tcPr anchor="ctr"/>
+                </a:tc>
+                <a:tc>
+                  <a:txBody>
+                    <a:bodyPr/>
+                    <a:lstStyle/>
+                    <a:p>
+                      <a:pPr algn="l"/>
+                      <a:r>
+                        <a:rPr lang="en-IN" baseline="0" dirty="0" smtClean="0">
+                          <a:latin typeface="Times New Roman" panose="02020603050405020304" pitchFamily="18" charset="0"/>
+                          <a:cs typeface="Times New Roman" panose="02020603050405020304" pitchFamily="18" charset="0"/>
+                        </a:rPr>
+                        <a:t>Channel 4</a:t>
+                      </a:r>
+                    </a:p>
+                  </a:txBody>
+                  <a:tcPr anchor="ctr"/>
+                </a:tc>
+                <a:extLst>
+                  <a:ext uri="{0D108BD9-81ED-4DB2-BD59-A6C34878D82A}">
+                    <a16:rowId xmlns:a16="http://schemas.microsoft.com/office/drawing/2014/main" val="2547034353"/>
+                  </a:ext>
+                </a:extLst>
+              </a:tr>
+              <a:tr h="370840">
+                <a:tc>
+                  <a:txBody>
+                    <a:bodyPr/>
+                    <a:lstStyle/>
+                    <a:p>
+                      <a:pPr algn="ctr"/>
+                      <a:r>
+                        <a:rPr lang="en-IN" dirty="0" smtClean="0">
+                          <a:latin typeface="Times New Roman" panose="02020603050405020304" pitchFamily="18" charset="0"/>
+                          <a:cs typeface="Times New Roman" panose="02020603050405020304" pitchFamily="18" charset="0"/>
+                        </a:rPr>
+                        <a:t>0x06</a:t>
+                      </a:r>
+                      <a:endParaRPr lang="en-IN" dirty="0">
+                        <a:latin typeface="Times New Roman" panose="02020603050405020304" pitchFamily="18" charset="0"/>
+                        <a:cs typeface="Times New Roman" panose="02020603050405020304" pitchFamily="18" charset="0"/>
+                      </a:endParaRPr>
+                    </a:p>
+                  </a:txBody>
+                  <a:tcPr anchor="ctr"/>
+                </a:tc>
+                <a:tc>
+                  <a:txBody>
+                    <a:bodyPr/>
+                    <a:lstStyle/>
+                    <a:p>
+                      <a:pPr algn="ctr"/>
+                      <a:r>
+                        <a:rPr lang="en-IN" dirty="0" smtClean="0">
+                          <a:latin typeface="Times New Roman" panose="02020603050405020304" pitchFamily="18" charset="0"/>
+                          <a:cs typeface="Times New Roman" panose="02020603050405020304" pitchFamily="18" charset="0"/>
+                        </a:rPr>
+                        <a:t>2</a:t>
+                      </a:r>
+                      <a:r>
+                        <a:rPr lang="en-IN" baseline="0" dirty="0" smtClean="0">
+                          <a:latin typeface="Times New Roman" panose="02020603050405020304" pitchFamily="18" charset="0"/>
+                          <a:cs typeface="Times New Roman" panose="02020603050405020304" pitchFamily="18" charset="0"/>
+                        </a:rPr>
+                        <a:t> – U </a:t>
+                      </a:r>
+                      <a:r>
+                        <a:rPr lang="en-IN" baseline="0" dirty="0" err="1" smtClean="0">
+                          <a:latin typeface="Times New Roman" panose="02020603050405020304" pitchFamily="18" charset="0"/>
+                          <a:cs typeface="Times New Roman" panose="02020603050405020304" pitchFamily="18" charset="0"/>
+                        </a:rPr>
+                        <a:t>Int</a:t>
+                      </a:r>
+                      <a:endParaRPr lang="en-IN" dirty="0">
+                        <a:latin typeface="Times New Roman" panose="02020603050405020304" pitchFamily="18" charset="0"/>
+                        <a:cs typeface="Times New Roman" panose="02020603050405020304" pitchFamily="18" charset="0"/>
+                      </a:endParaRPr>
+                    </a:p>
+                  </a:txBody>
+                  <a:tcPr anchor="ctr"/>
+                </a:tc>
+                <a:tc>
+                  <a:txBody>
+                    <a:bodyPr/>
+                    <a:lstStyle/>
+                    <a:p>
+                      <a:pPr algn="l"/>
+                      <a:r>
+                        <a:rPr lang="en-IN" baseline="0" dirty="0" smtClean="0">
+                          <a:latin typeface="Times New Roman" panose="02020603050405020304" pitchFamily="18" charset="0"/>
+                          <a:cs typeface="Times New Roman" panose="02020603050405020304" pitchFamily="18" charset="0"/>
+                        </a:rPr>
+                        <a:t>Channel 5</a:t>
+                      </a:r>
+                    </a:p>
+                  </a:txBody>
+                  <a:tcPr anchor="ctr"/>
+                </a:tc>
+                <a:extLst>
+                  <a:ext uri="{0D108BD9-81ED-4DB2-BD59-A6C34878D82A}">
+                    <a16:rowId xmlns:a16="http://schemas.microsoft.com/office/drawing/2014/main" val="3376754302"/>
+                  </a:ext>
+                </a:extLst>
+              </a:tr>
+              <a:tr h="370840">
+                <a:tc>
+                  <a:txBody>
+                    <a:bodyPr/>
+                    <a:lstStyle/>
+                    <a:p>
+                      <a:pPr algn="ctr"/>
+                      <a:r>
+                        <a:rPr lang="en-IN" dirty="0" smtClean="0">
+                          <a:latin typeface="Times New Roman" panose="02020603050405020304" pitchFamily="18" charset="0"/>
+                          <a:cs typeface="Times New Roman" panose="02020603050405020304" pitchFamily="18" charset="0"/>
+                        </a:rPr>
+                        <a:t>0x07</a:t>
+                      </a:r>
+                      <a:endParaRPr lang="en-IN" dirty="0">
+                        <a:latin typeface="Times New Roman" panose="02020603050405020304" pitchFamily="18" charset="0"/>
+                        <a:cs typeface="Times New Roman" panose="02020603050405020304" pitchFamily="18" charset="0"/>
+                      </a:endParaRPr>
+                    </a:p>
+                  </a:txBody>
+                  <a:tcPr anchor="ctr"/>
+                </a:tc>
+                <a:tc>
+                  <a:txBody>
+                    <a:bodyPr/>
+                    <a:lstStyle/>
+                    <a:p>
+                      <a:pPr algn="ctr"/>
+                      <a:r>
+                        <a:rPr lang="en-IN" dirty="0" smtClean="0">
+                          <a:latin typeface="Times New Roman" panose="02020603050405020304" pitchFamily="18" charset="0"/>
+                          <a:cs typeface="Times New Roman" panose="02020603050405020304" pitchFamily="18" charset="0"/>
+                        </a:rPr>
+                        <a:t>2</a:t>
+                      </a:r>
+                      <a:r>
+                        <a:rPr lang="en-IN" baseline="0" dirty="0" smtClean="0">
+                          <a:latin typeface="Times New Roman" panose="02020603050405020304" pitchFamily="18" charset="0"/>
+                          <a:cs typeface="Times New Roman" panose="02020603050405020304" pitchFamily="18" charset="0"/>
+                        </a:rPr>
+                        <a:t> – U </a:t>
+                      </a:r>
+                      <a:r>
+                        <a:rPr lang="en-IN" baseline="0" dirty="0" err="1" smtClean="0">
+                          <a:latin typeface="Times New Roman" panose="02020603050405020304" pitchFamily="18" charset="0"/>
+                          <a:cs typeface="Times New Roman" panose="02020603050405020304" pitchFamily="18" charset="0"/>
+                        </a:rPr>
+                        <a:t>Int</a:t>
+                      </a:r>
+                      <a:endParaRPr lang="en-IN" dirty="0">
+                        <a:latin typeface="Times New Roman" panose="02020603050405020304" pitchFamily="18" charset="0"/>
+                        <a:cs typeface="Times New Roman" panose="02020603050405020304" pitchFamily="18" charset="0"/>
+                      </a:endParaRPr>
+                    </a:p>
+                  </a:txBody>
+                  <a:tcPr anchor="ctr"/>
+                </a:tc>
+                <a:tc>
+                  <a:txBody>
+                    <a:bodyPr/>
+                    <a:lstStyle/>
+                    <a:p>
+                      <a:pPr algn="l"/>
+                      <a:r>
+                        <a:rPr lang="en-IN" baseline="0" dirty="0" smtClean="0">
+                          <a:latin typeface="Times New Roman" panose="02020603050405020304" pitchFamily="18" charset="0"/>
+                          <a:cs typeface="Times New Roman" panose="02020603050405020304" pitchFamily="18" charset="0"/>
+                        </a:rPr>
+                        <a:t>Channel 6</a:t>
+                      </a:r>
+                    </a:p>
+                  </a:txBody>
+                  <a:tcPr anchor="ctr"/>
+                </a:tc>
+                <a:extLst>
+                  <a:ext uri="{0D108BD9-81ED-4DB2-BD59-A6C34878D82A}">
+                    <a16:rowId xmlns:a16="http://schemas.microsoft.com/office/drawing/2014/main" val="242766362"/>
+                  </a:ext>
+                </a:extLst>
+              </a:tr>
+            </a:tbl>
+          </a:graphicData>
+        </a:graphic>
+      </p:graphicFrame>
+    </p:spTree>
+    <p:extLst>
+      <p:ext uri="{BB962C8B-B14F-4D97-AF65-F5344CB8AC3E}">
+        <p14:creationId xmlns:p14="http://schemas.microsoft.com/office/powerpoint/2010/main" val="3200936797"/>
+      </p:ext>
+    </p:extLst>
+  </p:cSld>
+  <p:clrMapOvr>
+    <a:masterClrMapping/>
+  </p:clrMapOvr>
+</p:sld>
+</file>
+
 <file path=ppt/theme/theme1.xml><?xml version="1.0" encoding="utf-8"?>
 <a:theme xmlns:a="http://schemas.openxmlformats.org/drawingml/2006/main" name="Office Theme">
   <a:themeElements>

</xml_diff>